<commit_message>
mise en page très bien avancée
</commit_message>
<xml_diff>
--- a/dossier de conception.pptx
+++ b/dossier de conception.pptx
@@ -5,7 +5,9 @@
     <p:sldMasterId id="2147483648" r:id="rId1"/>
   </p:sldMasterIdLst>
   <p:sldIdLst>
-    <p:sldId id="256" r:id="rId2"/>
+    <p:sldId id="257" r:id="rId2"/>
+    <p:sldId id="258" r:id="rId3"/>
+    <p:sldId id="256" r:id="rId4"/>
   </p:sldIdLst>
   <p:sldSz cx="12192000" cy="6858000"/>
   <p:notesSz cx="6858000" cy="9144000"/>
@@ -104,6 +106,11 @@
       </a:defRPr>
     </a:lvl9pPr>
   </p:defaultTextStyle>
+  <p:extLst>
+    <p:ext uri="{EFAFB233-063F-42B5-8137-9DF3F51BA10A}">
+      <p15:sldGuideLst xmlns:p15="http://schemas.microsoft.com/office/powerpoint/2012/main"/>
+    </p:ext>
+  </p:extLst>
 </p:presentation>
 </file>
 
@@ -254,7 +261,7 @@
           <a:p>
             <a:fld id="{AAFC192E-AD9A-4E5F-9BCB-0D6705619E5D}" type="datetimeFigureOut">
               <a:rPr lang="fr-FR" smtClean="0"/>
-              <a:t>08/04/2021</a:t>
+              <a:t>13/04/2021</a:t>
             </a:fld>
             <a:endParaRPr lang="fr-FR"/>
           </a:p>
@@ -452,7 +459,7 @@
           <a:p>
             <a:fld id="{AAFC192E-AD9A-4E5F-9BCB-0D6705619E5D}" type="datetimeFigureOut">
               <a:rPr lang="fr-FR" smtClean="0"/>
-              <a:t>08/04/2021</a:t>
+              <a:t>13/04/2021</a:t>
             </a:fld>
             <a:endParaRPr lang="fr-FR"/>
           </a:p>
@@ -660,7 +667,7 @@
           <a:p>
             <a:fld id="{AAFC192E-AD9A-4E5F-9BCB-0D6705619E5D}" type="datetimeFigureOut">
               <a:rPr lang="fr-FR" smtClean="0"/>
-              <a:t>08/04/2021</a:t>
+              <a:t>13/04/2021</a:t>
             </a:fld>
             <a:endParaRPr lang="fr-FR"/>
           </a:p>
@@ -858,7 +865,7 @@
           <a:p>
             <a:fld id="{AAFC192E-AD9A-4E5F-9BCB-0D6705619E5D}" type="datetimeFigureOut">
               <a:rPr lang="fr-FR" smtClean="0"/>
-              <a:t>08/04/2021</a:t>
+              <a:t>13/04/2021</a:t>
             </a:fld>
             <a:endParaRPr lang="fr-FR"/>
           </a:p>
@@ -1133,7 +1140,7 @@
           <a:p>
             <a:fld id="{AAFC192E-AD9A-4E5F-9BCB-0D6705619E5D}" type="datetimeFigureOut">
               <a:rPr lang="fr-FR" smtClean="0"/>
-              <a:t>08/04/2021</a:t>
+              <a:t>13/04/2021</a:t>
             </a:fld>
             <a:endParaRPr lang="fr-FR"/>
           </a:p>
@@ -1398,7 +1405,7 @@
           <a:p>
             <a:fld id="{AAFC192E-AD9A-4E5F-9BCB-0D6705619E5D}" type="datetimeFigureOut">
               <a:rPr lang="fr-FR" smtClean="0"/>
-              <a:t>08/04/2021</a:t>
+              <a:t>13/04/2021</a:t>
             </a:fld>
             <a:endParaRPr lang="fr-FR"/>
           </a:p>
@@ -1810,7 +1817,7 @@
           <a:p>
             <a:fld id="{AAFC192E-AD9A-4E5F-9BCB-0D6705619E5D}" type="datetimeFigureOut">
               <a:rPr lang="fr-FR" smtClean="0"/>
-              <a:t>08/04/2021</a:t>
+              <a:t>13/04/2021</a:t>
             </a:fld>
             <a:endParaRPr lang="fr-FR"/>
           </a:p>
@@ -1951,7 +1958,7 @@
           <a:p>
             <a:fld id="{AAFC192E-AD9A-4E5F-9BCB-0D6705619E5D}" type="datetimeFigureOut">
               <a:rPr lang="fr-FR" smtClean="0"/>
-              <a:t>08/04/2021</a:t>
+              <a:t>13/04/2021</a:t>
             </a:fld>
             <a:endParaRPr lang="fr-FR"/>
           </a:p>
@@ -2064,7 +2071,7 @@
           <a:p>
             <a:fld id="{AAFC192E-AD9A-4E5F-9BCB-0D6705619E5D}" type="datetimeFigureOut">
               <a:rPr lang="fr-FR" smtClean="0"/>
-              <a:t>08/04/2021</a:t>
+              <a:t>13/04/2021</a:t>
             </a:fld>
             <a:endParaRPr lang="fr-FR"/>
           </a:p>
@@ -2375,7 +2382,7 @@
           <a:p>
             <a:fld id="{AAFC192E-AD9A-4E5F-9BCB-0D6705619E5D}" type="datetimeFigureOut">
               <a:rPr lang="fr-FR" smtClean="0"/>
-              <a:t>08/04/2021</a:t>
+              <a:t>13/04/2021</a:t>
             </a:fld>
             <a:endParaRPr lang="fr-FR"/>
           </a:p>
@@ -2663,7 +2670,7 @@
           <a:p>
             <a:fld id="{AAFC192E-AD9A-4E5F-9BCB-0D6705619E5D}" type="datetimeFigureOut">
               <a:rPr lang="fr-FR" smtClean="0"/>
-              <a:t>08/04/2021</a:t>
+              <a:t>13/04/2021</a:t>
             </a:fld>
             <a:endParaRPr lang="fr-FR"/>
           </a:p>
@@ -2904,7 +2911,7 @@
           <a:p>
             <a:fld id="{AAFC192E-AD9A-4E5F-9BCB-0D6705619E5D}" type="datetimeFigureOut">
               <a:rPr lang="fr-FR" smtClean="0"/>
-              <a:t>08/04/2021</a:t>
+              <a:t>13/04/2021</a:t>
             </a:fld>
             <a:endParaRPr lang="fr-FR"/>
           </a:p>
@@ -3305,6 +3312,238 @@
 </file>
 
 <file path=ppt/slides/slide1.xml><?xml version="1.0" encoding="utf-8"?>
+<p:sld xmlns:a="http://schemas.openxmlformats.org/drawingml/2006/main" xmlns:r="http://schemas.openxmlformats.org/officeDocument/2006/relationships" xmlns:p="http://schemas.openxmlformats.org/presentationml/2006/main">
+  <p:cSld>
+    <p:spTree>
+      <p:nvGrpSpPr>
+        <p:cNvPr id="1" name=""/>
+        <p:cNvGrpSpPr/>
+        <p:nvPr/>
+      </p:nvGrpSpPr>
+      <p:grpSpPr>
+        <a:xfrm>
+          <a:off x="0" y="0"/>
+          <a:ext cx="0" cy="0"/>
+          <a:chOff x="0" y="0"/>
+          <a:chExt cx="0" cy="0"/>
+        </a:xfrm>
+      </p:grpSpPr>
+      <p:pic>
+        <p:nvPicPr>
+          <p:cNvPr id="5" name="Image 4">
+            <a:extLst>
+              <a:ext uri="{FF2B5EF4-FFF2-40B4-BE49-F238E27FC236}">
+                <a16:creationId xmlns:a16="http://schemas.microsoft.com/office/drawing/2014/main" id="{0DFBC4A4-D796-434C-9970-C9DB8233D1FD}"/>
+              </a:ext>
+            </a:extLst>
+          </p:cNvPr>
+          <p:cNvPicPr>
+            <a:picLocks noChangeAspect="1"/>
+          </p:cNvPicPr>
+          <p:nvPr/>
+        </p:nvPicPr>
+        <p:blipFill>
+          <a:blip r:embed="rId2">
+            <a:extLst>
+              <a:ext uri="{28A0092B-C50C-407E-A947-70E740481C1C}">
+                <a14:useLocalDpi xmlns:a14="http://schemas.microsoft.com/office/drawing/2010/main" val="0"/>
+              </a:ext>
+            </a:extLst>
+          </a:blip>
+          <a:stretch>
+            <a:fillRect/>
+          </a:stretch>
+        </p:blipFill>
+        <p:spPr>
+          <a:xfrm>
+            <a:off x="3000375" y="2619375"/>
+            <a:ext cx="6191250" cy="1619250"/>
+          </a:xfrm>
+          <a:prstGeom prst="rect">
+            <a:avLst/>
+          </a:prstGeom>
+        </p:spPr>
+      </p:pic>
+      <p:sp>
+        <p:nvSpPr>
+          <p:cNvPr id="6" name="ZoneTexte 5">
+            <a:extLst>
+              <a:ext uri="{FF2B5EF4-FFF2-40B4-BE49-F238E27FC236}">
+                <a16:creationId xmlns:a16="http://schemas.microsoft.com/office/drawing/2014/main" id="{8835F426-F821-4EC1-A559-FF9A7B27E0D3}"/>
+              </a:ext>
+            </a:extLst>
+          </p:cNvPr>
+          <p:cNvSpPr txBox="1"/>
+          <p:nvPr/>
+        </p:nvSpPr>
+        <p:spPr>
+          <a:xfrm>
+            <a:off x="4356100" y="6388101"/>
+            <a:ext cx="4241800" cy="646331"/>
+          </a:xfrm>
+          <a:prstGeom prst="rect">
+            <a:avLst/>
+          </a:prstGeom>
+          <a:noFill/>
+        </p:spPr>
+        <p:txBody>
+          <a:bodyPr wrap="square" rtlCol="0">
+            <a:spAutoFit/>
+          </a:bodyPr>
+          <a:lstStyle/>
+          <a:p>
+            <a:r>
+              <a:rPr lang="fr-FR" dirty="0">
+                <a:latin typeface="Nunito Sans" panose="00000500000000000000" pitchFamily="2" charset="0"/>
+              </a:rPr>
+              <a:t>Luc </a:t>
+            </a:r>
+            <a:r>
+              <a:rPr lang="fr-FR" dirty="0" err="1">
+                <a:latin typeface="Nunito Sans" panose="00000500000000000000" pitchFamily="2" charset="0"/>
+              </a:rPr>
+              <a:t>Leneuf</a:t>
+            </a:r>
+            <a:r>
+              <a:rPr lang="fr-FR" dirty="0">
+                <a:latin typeface="Nunito Sans" panose="00000500000000000000" pitchFamily="2" charset="0"/>
+              </a:rPr>
+              <a:t> -2021- Nicolas Maes</a:t>
+            </a:r>
+          </a:p>
+          <a:p>
+            <a:endParaRPr lang="fr-FR" dirty="0">
+              <a:latin typeface="Nunito Sans" panose="00000500000000000000" pitchFamily="2" charset="0"/>
+            </a:endParaRPr>
+          </a:p>
+        </p:txBody>
+      </p:sp>
+    </p:spTree>
+    <p:extLst>
+      <p:ext uri="{BB962C8B-B14F-4D97-AF65-F5344CB8AC3E}">
+        <p14:creationId xmlns:p14="http://schemas.microsoft.com/office/powerpoint/2010/main" val="3035106419"/>
+      </p:ext>
+    </p:extLst>
+  </p:cSld>
+  <p:clrMapOvr>
+    <a:masterClrMapping/>
+  </p:clrMapOvr>
+</p:sld>
+</file>
+
+<file path=ppt/slides/slide2.xml><?xml version="1.0" encoding="utf-8"?>
+<p:sld xmlns:a="http://schemas.openxmlformats.org/drawingml/2006/main" xmlns:r="http://schemas.openxmlformats.org/officeDocument/2006/relationships" xmlns:p="http://schemas.openxmlformats.org/presentationml/2006/main">
+  <p:cSld>
+    <p:spTree>
+      <p:nvGrpSpPr>
+        <p:cNvPr id="1" name=""/>
+        <p:cNvGrpSpPr/>
+        <p:nvPr/>
+      </p:nvGrpSpPr>
+      <p:grpSpPr>
+        <a:xfrm>
+          <a:off x="0" y="0"/>
+          <a:ext cx="0" cy="0"/>
+          <a:chOff x="0" y="0"/>
+          <a:chExt cx="0" cy="0"/>
+        </a:xfrm>
+      </p:grpSpPr>
+      <p:pic>
+        <p:nvPicPr>
+          <p:cNvPr id="4" name="Image 3">
+            <a:extLst>
+              <a:ext uri="{FF2B5EF4-FFF2-40B4-BE49-F238E27FC236}">
+                <a16:creationId xmlns:a16="http://schemas.microsoft.com/office/drawing/2014/main" id="{73C06D9E-47A3-42D2-9C61-BC112CF18DDD}"/>
+              </a:ext>
+            </a:extLst>
+          </p:cNvPr>
+          <p:cNvPicPr>
+            <a:picLocks noChangeAspect="1"/>
+          </p:cNvPicPr>
+          <p:nvPr/>
+        </p:nvPicPr>
+        <p:blipFill>
+          <a:blip r:embed="rId2">
+            <a:extLst>
+              <a:ext uri="{28A0092B-C50C-407E-A947-70E740481C1C}">
+                <a14:useLocalDpi xmlns:a14="http://schemas.microsoft.com/office/drawing/2010/main" val="0"/>
+              </a:ext>
+            </a:extLst>
+          </a:blip>
+          <a:stretch>
+            <a:fillRect/>
+          </a:stretch>
+        </p:blipFill>
+        <p:spPr>
+          <a:xfrm>
+            <a:off x="0" y="0"/>
+            <a:ext cx="6191250" cy="1619250"/>
+          </a:xfrm>
+          <a:prstGeom prst="rect">
+            <a:avLst/>
+          </a:prstGeom>
+        </p:spPr>
+      </p:pic>
+      <p:sp>
+        <p:nvSpPr>
+          <p:cNvPr id="5" name="ZoneTexte 4">
+            <a:extLst>
+              <a:ext uri="{FF2B5EF4-FFF2-40B4-BE49-F238E27FC236}">
+                <a16:creationId xmlns:a16="http://schemas.microsoft.com/office/drawing/2014/main" id="{D45D29E9-A1B7-4913-BE2E-0F126D4650D3}"/>
+              </a:ext>
+            </a:extLst>
+          </p:cNvPr>
+          <p:cNvSpPr txBox="1"/>
+          <p:nvPr/>
+        </p:nvSpPr>
+        <p:spPr>
+          <a:xfrm>
+            <a:off x="260350" y="2247901"/>
+            <a:ext cx="5930900" cy="369332"/>
+          </a:xfrm>
+          <a:prstGeom prst="rect">
+            <a:avLst/>
+          </a:prstGeom>
+          <a:noFill/>
+        </p:spPr>
+        <p:txBody>
+          <a:bodyPr wrap="square" rtlCol="0">
+            <a:spAutoFit/>
+          </a:bodyPr>
+          <a:lstStyle/>
+          <a:p>
+            <a:r>
+              <a:rPr lang="fr-FR" dirty="0">
+                <a:latin typeface="Nunito Sans" panose="00000500000000000000" pitchFamily="2" charset="0"/>
+              </a:rPr>
+              <a:t>Notre logo </a:t>
+            </a:r>
+            <a:r>
+              <a:rPr lang="fr-FR">
+                <a:latin typeface="Nunito Sans" panose="00000500000000000000" pitchFamily="2" charset="0"/>
+              </a:rPr>
+              <a:t>reprs</a:t>
+            </a:r>
+            <a:endParaRPr lang="fr-FR" dirty="0">
+              <a:latin typeface="Nunito Sans" panose="00000500000000000000" pitchFamily="2" charset="0"/>
+            </a:endParaRPr>
+          </a:p>
+        </p:txBody>
+      </p:sp>
+    </p:spTree>
+    <p:extLst>
+      <p:ext uri="{BB962C8B-B14F-4D97-AF65-F5344CB8AC3E}">
+        <p14:creationId xmlns:p14="http://schemas.microsoft.com/office/powerpoint/2010/main" val="2094285928"/>
+      </p:ext>
+    </p:extLst>
+  </p:cSld>
+  <p:clrMapOvr>
+    <a:masterClrMapping/>
+  </p:clrMapOvr>
+</p:sld>
+</file>
+
+<file path=ppt/slides/slide3.xml><?xml version="1.0" encoding="utf-8"?>
 <p:sld xmlns:a="http://schemas.openxmlformats.org/drawingml/2006/main" xmlns:r="http://schemas.openxmlformats.org/officeDocument/2006/relationships" xmlns:p="http://schemas.openxmlformats.org/presentationml/2006/main">
   <p:cSld>
     <p:spTree>

</xml_diff>

<commit_message>
ajout du xml rédigé
</commit_message>
<xml_diff>
--- a/dossier de conception.pptx
+++ b/dossier de conception.pptx
@@ -8,6 +8,14 @@
     <p:sldId id="257" r:id="rId2"/>
     <p:sldId id="258" r:id="rId3"/>
     <p:sldId id="256" r:id="rId4"/>
+    <p:sldId id="259" r:id="rId5"/>
+    <p:sldId id="264" r:id="rId6"/>
+    <p:sldId id="260" r:id="rId7"/>
+    <p:sldId id="261" r:id="rId8"/>
+    <p:sldId id="263" r:id="rId9"/>
+    <p:sldId id="267" r:id="rId10"/>
+    <p:sldId id="266" r:id="rId11"/>
+    <p:sldId id="265" r:id="rId12"/>
   </p:sldIdLst>
   <p:sldSz cx="12192000" cy="6858000"/>
   <p:notesSz cx="6858000" cy="9144000"/>
@@ -3378,8 +3386,8 @@
         </p:nvSpPr>
         <p:spPr>
           <a:xfrm>
-            <a:off x="4356100" y="6388101"/>
-            <a:ext cx="4241800" cy="646331"/>
+            <a:off x="4273550" y="5791201"/>
+            <a:ext cx="3644900" cy="646331"/>
           </a:xfrm>
           <a:prstGeom prst="rect">
             <a:avLst/>
@@ -3422,6 +3430,212 @@
     <p:extLst>
       <p:ext uri="{BB962C8B-B14F-4D97-AF65-F5344CB8AC3E}">
         <p14:creationId xmlns:p14="http://schemas.microsoft.com/office/powerpoint/2010/main" val="3035106419"/>
+      </p:ext>
+    </p:extLst>
+  </p:cSld>
+  <p:clrMapOvr>
+    <a:masterClrMapping/>
+  </p:clrMapOvr>
+</p:sld>
+</file>
+
+<file path=ppt/slides/slide10.xml><?xml version="1.0" encoding="utf-8"?>
+<p:sld xmlns:a="http://schemas.openxmlformats.org/drawingml/2006/main" xmlns:r="http://schemas.openxmlformats.org/officeDocument/2006/relationships" xmlns:p="http://schemas.openxmlformats.org/presentationml/2006/main">
+  <p:cSld>
+    <p:spTree>
+      <p:nvGrpSpPr>
+        <p:cNvPr id="1" name=""/>
+        <p:cNvGrpSpPr/>
+        <p:nvPr/>
+      </p:nvGrpSpPr>
+      <p:grpSpPr>
+        <a:xfrm>
+          <a:off x="0" y="0"/>
+          <a:ext cx="0" cy="0"/>
+          <a:chOff x="0" y="0"/>
+          <a:chExt cx="0" cy="0"/>
+        </a:xfrm>
+      </p:grpSpPr>
+      <p:pic>
+        <p:nvPicPr>
+          <p:cNvPr id="49" name="Image 48">
+            <a:extLst>
+              <a:ext uri="{FF2B5EF4-FFF2-40B4-BE49-F238E27FC236}">
+                <a16:creationId xmlns:a16="http://schemas.microsoft.com/office/drawing/2014/main" id="{095AA012-5584-4589-B5BD-6185592E4D3E}"/>
+              </a:ext>
+            </a:extLst>
+          </p:cNvPr>
+          <p:cNvPicPr>
+            <a:picLocks noChangeAspect="1"/>
+          </p:cNvPicPr>
+          <p:nvPr/>
+        </p:nvPicPr>
+        <p:blipFill>
+          <a:blip r:embed="rId2">
+            <a:extLst>
+              <a:ext uri="{28A0092B-C50C-407E-A947-70E740481C1C}">
+                <a14:useLocalDpi xmlns:a14="http://schemas.microsoft.com/office/drawing/2010/main" val="0"/>
+              </a:ext>
+            </a:extLst>
+          </a:blip>
+          <a:stretch>
+            <a:fillRect/>
+          </a:stretch>
+        </p:blipFill>
+        <p:spPr>
+          <a:xfrm>
+            <a:off x="9567333" y="-4120"/>
+            <a:ext cx="2624667" cy="686451"/>
+          </a:xfrm>
+          <a:prstGeom prst="rect">
+            <a:avLst/>
+          </a:prstGeom>
+        </p:spPr>
+      </p:pic>
+      <p:sp>
+        <p:nvSpPr>
+          <p:cNvPr id="9" name="ZoneTexte 8">
+            <a:extLst>
+              <a:ext uri="{FF2B5EF4-FFF2-40B4-BE49-F238E27FC236}">
+                <a16:creationId xmlns:a16="http://schemas.microsoft.com/office/drawing/2014/main" id="{29E704EF-0DC2-4823-97A3-6694FCC299FE}"/>
+              </a:ext>
+            </a:extLst>
+          </p:cNvPr>
+          <p:cNvSpPr txBox="1"/>
+          <p:nvPr/>
+        </p:nvSpPr>
+        <p:spPr>
+          <a:xfrm>
+            <a:off x="77948" y="67542"/>
+            <a:ext cx="3394444" cy="1077218"/>
+          </a:xfrm>
+          <a:prstGeom prst="rect">
+            <a:avLst/>
+          </a:prstGeom>
+          <a:noFill/>
+        </p:spPr>
+        <p:txBody>
+          <a:bodyPr wrap="square" rtlCol="0">
+            <a:spAutoFit/>
+          </a:bodyPr>
+          <a:lstStyle/>
+          <a:p>
+            <a:r>
+              <a:rPr lang="fr-FR" sz="3200" dirty="0">
+                <a:latin typeface="Nunito Sans" panose="00000500000000000000" pitchFamily="2" charset="0"/>
+              </a:rPr>
+              <a:t>Responsive (article)</a:t>
+            </a:r>
+          </a:p>
+        </p:txBody>
+      </p:sp>
+    </p:spTree>
+    <p:extLst>
+      <p:ext uri="{BB962C8B-B14F-4D97-AF65-F5344CB8AC3E}">
+        <p14:creationId xmlns:p14="http://schemas.microsoft.com/office/powerpoint/2010/main" val="3335679860"/>
+      </p:ext>
+    </p:extLst>
+  </p:cSld>
+  <p:clrMapOvr>
+    <a:masterClrMapping/>
+  </p:clrMapOvr>
+</p:sld>
+</file>
+
+<file path=ppt/slides/slide11.xml><?xml version="1.0" encoding="utf-8"?>
+<p:sld xmlns:a="http://schemas.openxmlformats.org/drawingml/2006/main" xmlns:r="http://schemas.openxmlformats.org/officeDocument/2006/relationships" xmlns:p="http://schemas.openxmlformats.org/presentationml/2006/main">
+  <p:cSld>
+    <p:spTree>
+      <p:nvGrpSpPr>
+        <p:cNvPr id="1" name=""/>
+        <p:cNvGrpSpPr/>
+        <p:nvPr/>
+      </p:nvGrpSpPr>
+      <p:grpSpPr>
+        <a:xfrm>
+          <a:off x="0" y="0"/>
+          <a:ext cx="0" cy="0"/>
+          <a:chOff x="0" y="0"/>
+          <a:chExt cx="0" cy="0"/>
+        </a:xfrm>
+      </p:grpSpPr>
+      <p:pic>
+        <p:nvPicPr>
+          <p:cNvPr id="49" name="Image 48">
+            <a:extLst>
+              <a:ext uri="{FF2B5EF4-FFF2-40B4-BE49-F238E27FC236}">
+                <a16:creationId xmlns:a16="http://schemas.microsoft.com/office/drawing/2014/main" id="{095AA012-5584-4589-B5BD-6185592E4D3E}"/>
+              </a:ext>
+            </a:extLst>
+          </p:cNvPr>
+          <p:cNvPicPr>
+            <a:picLocks noChangeAspect="1"/>
+          </p:cNvPicPr>
+          <p:nvPr/>
+        </p:nvPicPr>
+        <p:blipFill>
+          <a:blip r:embed="rId2">
+            <a:extLst>
+              <a:ext uri="{28A0092B-C50C-407E-A947-70E740481C1C}">
+                <a14:useLocalDpi xmlns:a14="http://schemas.microsoft.com/office/drawing/2010/main" val="0"/>
+              </a:ext>
+            </a:extLst>
+          </a:blip>
+          <a:stretch>
+            <a:fillRect/>
+          </a:stretch>
+        </p:blipFill>
+        <p:spPr>
+          <a:xfrm>
+            <a:off x="9567333" y="-4120"/>
+            <a:ext cx="2624667" cy="686451"/>
+          </a:xfrm>
+          <a:prstGeom prst="rect">
+            <a:avLst/>
+          </a:prstGeom>
+        </p:spPr>
+      </p:pic>
+      <p:sp>
+        <p:nvSpPr>
+          <p:cNvPr id="9" name="ZoneTexte 8">
+            <a:extLst>
+              <a:ext uri="{FF2B5EF4-FFF2-40B4-BE49-F238E27FC236}">
+                <a16:creationId xmlns:a16="http://schemas.microsoft.com/office/drawing/2014/main" id="{29E704EF-0DC2-4823-97A3-6694FCC299FE}"/>
+              </a:ext>
+            </a:extLst>
+          </p:cNvPr>
+          <p:cNvSpPr txBox="1"/>
+          <p:nvPr/>
+        </p:nvSpPr>
+        <p:spPr>
+          <a:xfrm>
+            <a:off x="77948" y="67542"/>
+            <a:ext cx="3394444" cy="584775"/>
+          </a:xfrm>
+          <a:prstGeom prst="rect">
+            <a:avLst/>
+          </a:prstGeom>
+          <a:noFill/>
+        </p:spPr>
+        <p:txBody>
+          <a:bodyPr wrap="square" rtlCol="0">
+            <a:spAutoFit/>
+          </a:bodyPr>
+          <a:lstStyle/>
+          <a:p>
+            <a:r>
+              <a:rPr lang="fr-FR" sz="3200" dirty="0">
+                <a:latin typeface="Nunito Sans" panose="00000500000000000000" pitchFamily="2" charset="0"/>
+              </a:rPr>
+              <a:t>UI kit</a:t>
+            </a:r>
+          </a:p>
+        </p:txBody>
+      </p:sp>
+    </p:spTree>
+    <p:extLst>
+      <p:ext uri="{BB962C8B-B14F-4D97-AF65-F5344CB8AC3E}">
+        <p14:creationId xmlns:p14="http://schemas.microsoft.com/office/powerpoint/2010/main" val="2608142783"/>
       </p:ext>
     </p:extLst>
   </p:cSld>
@@ -3476,8 +3690,8 @@
         </p:blipFill>
         <p:spPr>
           <a:xfrm>
-            <a:off x="0" y="0"/>
-            <a:ext cx="6191250" cy="1619250"/>
+            <a:off x="4056528" y="1916668"/>
+            <a:ext cx="4078941" cy="1066800"/>
           </a:xfrm>
           <a:prstGeom prst="rect">
             <a:avLst/>
@@ -3498,8 +3712,8 @@
         </p:nvSpPr>
         <p:spPr>
           <a:xfrm>
-            <a:off x="260350" y="2247901"/>
-            <a:ext cx="5930900" cy="369332"/>
+            <a:off x="1184274" y="3822701"/>
+            <a:ext cx="9823450" cy="369332"/>
           </a:xfrm>
           <a:prstGeom prst="rect">
             <a:avLst/>
@@ -3516,17 +3730,8 @@
               <a:rPr lang="fr-FR" dirty="0">
                 <a:latin typeface="Nunito Sans" panose="00000500000000000000" pitchFamily="2" charset="0"/>
               </a:rPr>
-              <a:t>Notre logo </a:t>
-            </a:r>
-            <a:r>
-              <a:rPr lang="fr-FR">
-                <a:latin typeface="Nunito Sans" panose="00000500000000000000" pitchFamily="2" charset="0"/>
-              </a:rPr>
-              <a:t>reprs</a:t>
-            </a:r>
-            <a:endParaRPr lang="fr-FR" dirty="0">
-              <a:latin typeface="Nunito Sans" panose="00000500000000000000" pitchFamily="2" charset="0"/>
-            </a:endParaRPr>
+              <a:t>Notre logotype représente la discrétion et le nom signifie ‘invisible’ ou ‘inaperçu’ en français.</a:t>
+            </a:r>
           </a:p>
         </p:txBody>
       </p:sp>
@@ -3612,7 +3817,9 @@
           <a:lstStyle/>
           <a:p>
             <a:pPr algn="ctr"/>
-            <a:endParaRPr lang="fr-FR"/>
+            <a:endParaRPr lang="fr-FR">
+              <a:latin typeface="Nunito Sans" panose="00000500000000000000" pitchFamily="2" charset="0"/>
+            </a:endParaRPr>
           </a:p>
         </p:txBody>
       </p:sp>
@@ -3645,7 +3852,9 @@
           <a:lstStyle/>
           <a:p>
             <a:r>
-              <a:rPr lang="fr-FR" dirty="0"/>
+              <a:rPr lang="fr-FR" dirty="0">
+                <a:latin typeface="Nunito Sans" panose="00000500000000000000" pitchFamily="2" charset="0"/>
+              </a:rPr>
               <a:t>LANDING PAGE</a:t>
             </a:r>
           </a:p>
@@ -3703,7 +3912,9 @@
           <a:lstStyle/>
           <a:p>
             <a:pPr algn="ctr"/>
-            <a:endParaRPr lang="fr-FR"/>
+            <a:endParaRPr lang="fr-FR">
+              <a:latin typeface="Nunito Sans" panose="00000500000000000000" pitchFamily="2" charset="0"/>
+            </a:endParaRPr>
           </a:p>
         </p:txBody>
       </p:sp>
@@ -3721,8 +3932,8 @@
         </p:nvSpPr>
         <p:spPr>
           <a:xfrm>
-            <a:off x="1540932" y="1498702"/>
-            <a:ext cx="2082800" cy="369332"/>
+            <a:off x="1318420" y="1506875"/>
+            <a:ext cx="1366309" cy="369332"/>
           </a:xfrm>
           <a:prstGeom prst="rect">
             <a:avLst/>
@@ -3736,7 +3947,9 @@
           <a:lstStyle/>
           <a:p>
             <a:r>
-              <a:rPr lang="fr-FR" dirty="0"/>
+              <a:rPr lang="fr-FR" dirty="0">
+                <a:latin typeface="Nunito Sans" panose="00000500000000000000" pitchFamily="2" charset="0"/>
+              </a:rPr>
               <a:t>ARTICLES</a:t>
             </a:r>
           </a:p>
@@ -3794,7 +4007,9 @@
           <a:lstStyle/>
           <a:p>
             <a:pPr algn="ctr"/>
-            <a:endParaRPr lang="fr-FR"/>
+            <a:endParaRPr lang="fr-FR">
+              <a:latin typeface="Nunito Sans" panose="00000500000000000000" pitchFamily="2" charset="0"/>
+            </a:endParaRPr>
           </a:p>
         </p:txBody>
       </p:sp>
@@ -3812,8 +4027,8 @@
         </p:nvSpPr>
         <p:spPr>
           <a:xfrm>
-            <a:off x="9203268" y="1498702"/>
-            <a:ext cx="2082800" cy="369332"/>
+            <a:off x="9567333" y="1510686"/>
+            <a:ext cx="1446052" cy="369332"/>
           </a:xfrm>
           <a:prstGeom prst="rect">
             <a:avLst/>
@@ -3827,8 +4042,10 @@
           <a:lstStyle/>
           <a:p>
             <a:r>
-              <a:rPr lang="fr-FR" dirty="0"/>
-              <a:t>CONTACTEZ-NOUS</a:t>
+              <a:rPr lang="fr-FR" dirty="0">
+                <a:latin typeface="Nunito Sans" panose="00000500000000000000" pitchFamily="2" charset="0"/>
+              </a:rPr>
+              <a:t>CONTACT</a:t>
             </a:r>
           </a:p>
         </p:txBody>
@@ -3885,7 +4102,9 @@
           <a:lstStyle/>
           <a:p>
             <a:pPr algn="ctr"/>
-            <a:endParaRPr lang="fr-FR"/>
+            <a:endParaRPr lang="fr-FR">
+              <a:latin typeface="Nunito Sans" panose="00000500000000000000" pitchFamily="2" charset="0"/>
+            </a:endParaRPr>
           </a:p>
         </p:txBody>
       </p:sp>
@@ -3903,8 +4122,8 @@
         </p:nvSpPr>
         <p:spPr>
           <a:xfrm>
-            <a:off x="5071532" y="1503588"/>
-            <a:ext cx="2082800" cy="369332"/>
+            <a:off x="5342466" y="1506875"/>
+            <a:ext cx="2617247" cy="369332"/>
           </a:xfrm>
           <a:prstGeom prst="rect">
             <a:avLst/>
@@ -3918,8 +4137,10 @@
           <a:lstStyle/>
           <a:p>
             <a:r>
-              <a:rPr lang="fr-FR" dirty="0"/>
-              <a:t>A PROPOS DE NOUS</a:t>
+              <a:rPr lang="fr-FR" dirty="0">
+                <a:latin typeface="Nunito Sans" panose="00000500000000000000" pitchFamily="2" charset="0"/>
+              </a:rPr>
+              <a:t>A PROPOS</a:t>
             </a:r>
           </a:p>
         </p:txBody>
@@ -3976,7 +4197,9 @@
           <a:lstStyle/>
           <a:p>
             <a:pPr algn="ctr"/>
-            <a:endParaRPr lang="fr-FR"/>
+            <a:endParaRPr lang="fr-FR">
+              <a:latin typeface="Nunito Sans" panose="00000500000000000000" pitchFamily="2" charset="0"/>
+            </a:endParaRPr>
           </a:p>
         </p:txBody>
       </p:sp>
@@ -3994,7 +4217,7 @@
         </p:nvSpPr>
         <p:spPr>
           <a:xfrm>
-            <a:off x="1261533" y="2725702"/>
+            <a:off x="1032930" y="2739615"/>
             <a:ext cx="2082800" cy="369332"/>
           </a:xfrm>
           <a:prstGeom prst="rect">
@@ -4009,7 +4232,9 @@
           <a:lstStyle/>
           <a:p>
             <a:r>
-              <a:rPr lang="fr-FR" dirty="0"/>
+              <a:rPr lang="fr-FR" dirty="0">
+                <a:latin typeface="Nunito Sans" panose="00000500000000000000" pitchFamily="2" charset="0"/>
+              </a:rPr>
               <a:t>ASPECT CREATIF</a:t>
             </a:r>
           </a:p>
@@ -4067,7 +4292,9 @@
           <a:lstStyle/>
           <a:p>
             <a:pPr algn="ctr"/>
-            <a:endParaRPr lang="fr-FR"/>
+            <a:endParaRPr lang="fr-FR">
+              <a:latin typeface="Nunito Sans" panose="00000500000000000000" pitchFamily="2" charset="0"/>
+            </a:endParaRPr>
           </a:p>
         </p:txBody>
       </p:sp>
@@ -4085,7 +4312,7 @@
         </p:nvSpPr>
         <p:spPr>
           <a:xfrm>
-            <a:off x="5342466" y="2682716"/>
+            <a:off x="5072589" y="2733661"/>
             <a:ext cx="2082800" cy="369332"/>
           </a:xfrm>
           <a:prstGeom prst="rect">
@@ -4100,7 +4327,9 @@
           <a:lstStyle/>
           <a:p>
             <a:r>
-              <a:rPr lang="fr-FR" dirty="0"/>
+              <a:rPr lang="fr-FR" dirty="0">
+                <a:latin typeface="Nunito Sans" panose="00000500000000000000" pitchFamily="2" charset="0"/>
+              </a:rPr>
               <a:t>VISION HYBRIDE</a:t>
             </a:r>
           </a:p>
@@ -4158,7 +4387,9 @@
           <a:lstStyle/>
           <a:p>
             <a:pPr algn="ctr"/>
-            <a:endParaRPr lang="fr-FR"/>
+            <a:endParaRPr lang="fr-FR">
+              <a:latin typeface="Nunito Sans" panose="00000500000000000000" pitchFamily="2" charset="0"/>
+            </a:endParaRPr>
           </a:p>
         </p:txBody>
       </p:sp>
@@ -4176,8 +4407,8 @@
         </p:nvSpPr>
         <p:spPr>
           <a:xfrm>
-            <a:off x="9203268" y="2708116"/>
-            <a:ext cx="2082800" cy="369332"/>
+            <a:off x="9129184" y="2725702"/>
+            <a:ext cx="2624667" cy="369332"/>
           </a:xfrm>
           <a:prstGeom prst="rect">
             <a:avLst/>
@@ -4191,7 +4422,9 @@
           <a:lstStyle/>
           <a:p>
             <a:r>
-              <a:rPr lang="fr-FR" dirty="0"/>
+              <a:rPr lang="fr-FR" dirty="0">
+                <a:latin typeface="Nunito Sans" panose="00000500000000000000" pitchFamily="2" charset="0"/>
+              </a:rPr>
               <a:t>ASPECT LOGIQUE</a:t>
             </a:r>
           </a:p>
@@ -4565,7 +4798,9 @@
           <a:lstStyle/>
           <a:p>
             <a:pPr algn="ctr"/>
-            <a:endParaRPr lang="fr-FR"/>
+            <a:endParaRPr lang="fr-FR">
+              <a:latin typeface="Nunito Sans" panose="00000500000000000000" pitchFamily="2" charset="0"/>
+            </a:endParaRPr>
           </a:p>
         </p:txBody>
       </p:sp>
@@ -4598,12 +4833,16 @@
           <a:lstStyle/>
           <a:p>
             <a:r>
-              <a:rPr lang="fr-FR" dirty="0"/>
+              <a:rPr lang="fr-FR" dirty="0">
+                <a:latin typeface="Nunito Sans" panose="00000500000000000000" pitchFamily="2" charset="0"/>
+              </a:rPr>
               <a:t>ARTICLE-7</a:t>
             </a:r>
           </a:p>
           <a:p>
-            <a:endParaRPr lang="fr-FR" dirty="0"/>
+            <a:endParaRPr lang="fr-FR" dirty="0">
+              <a:latin typeface="Nunito Sans" panose="00000500000000000000" pitchFamily="2" charset="0"/>
+            </a:endParaRPr>
           </a:p>
         </p:txBody>
       </p:sp>
@@ -4659,7 +4898,9 @@
           <a:lstStyle/>
           <a:p>
             <a:pPr algn="ctr"/>
-            <a:endParaRPr lang="fr-FR"/>
+            <a:endParaRPr lang="fr-FR">
+              <a:latin typeface="Nunito Sans" panose="00000500000000000000" pitchFamily="2" charset="0"/>
+            </a:endParaRPr>
           </a:p>
         </p:txBody>
       </p:sp>
@@ -4692,12 +4933,16 @@
           <a:lstStyle/>
           <a:p>
             <a:r>
-              <a:rPr lang="fr-FR" dirty="0"/>
+              <a:rPr lang="fr-FR" dirty="0">
+                <a:latin typeface="Nunito Sans" panose="00000500000000000000" pitchFamily="2" charset="0"/>
+              </a:rPr>
               <a:t>ARTICLE-8</a:t>
             </a:r>
           </a:p>
           <a:p>
-            <a:endParaRPr lang="fr-FR" dirty="0"/>
+            <a:endParaRPr lang="fr-FR" dirty="0">
+              <a:latin typeface="Nunito Sans" panose="00000500000000000000" pitchFamily="2" charset="0"/>
+            </a:endParaRPr>
           </a:p>
         </p:txBody>
       </p:sp>
@@ -4753,7 +4998,9 @@
           <a:lstStyle/>
           <a:p>
             <a:pPr algn="ctr"/>
-            <a:endParaRPr lang="fr-FR"/>
+            <a:endParaRPr lang="fr-FR">
+              <a:latin typeface="Nunito Sans" panose="00000500000000000000" pitchFamily="2" charset="0"/>
+            </a:endParaRPr>
           </a:p>
         </p:txBody>
       </p:sp>
@@ -4786,7 +5033,9 @@
           <a:lstStyle/>
           <a:p>
             <a:r>
-              <a:rPr lang="fr-FR" dirty="0"/>
+              <a:rPr lang="fr-FR" dirty="0">
+                <a:latin typeface="Nunito Sans" panose="00000500000000000000" pitchFamily="2" charset="0"/>
+              </a:rPr>
               <a:t>ARTICLE-9</a:t>
             </a:r>
           </a:p>
@@ -4840,7 +5089,9 @@
           <a:lstStyle/>
           <a:p>
             <a:pPr algn="ctr"/>
-            <a:endParaRPr lang="fr-FR"/>
+            <a:endParaRPr lang="fr-FR">
+              <a:latin typeface="Nunito Sans" panose="00000500000000000000" pitchFamily="2" charset="0"/>
+            </a:endParaRPr>
           </a:p>
         </p:txBody>
       </p:sp>
@@ -4896,7 +5147,9 @@
           <a:lstStyle/>
           <a:p>
             <a:pPr algn="ctr"/>
-            <a:endParaRPr lang="fr-FR"/>
+            <a:endParaRPr lang="fr-FR">
+              <a:latin typeface="Nunito Sans" panose="00000500000000000000" pitchFamily="2" charset="0"/>
+            </a:endParaRPr>
           </a:p>
         </p:txBody>
       </p:sp>
@@ -4929,12 +5182,16 @@
           <a:lstStyle/>
           <a:p>
             <a:r>
-              <a:rPr lang="fr-FR" dirty="0"/>
+              <a:rPr lang="fr-FR" dirty="0">
+                <a:latin typeface="Nunito Sans" panose="00000500000000000000" pitchFamily="2" charset="0"/>
+              </a:rPr>
               <a:t>ARTICLE-4</a:t>
             </a:r>
           </a:p>
           <a:p>
-            <a:endParaRPr lang="fr-FR" dirty="0"/>
+            <a:endParaRPr lang="fr-FR" dirty="0">
+              <a:latin typeface="Nunito Sans" panose="00000500000000000000" pitchFamily="2" charset="0"/>
+            </a:endParaRPr>
           </a:p>
         </p:txBody>
       </p:sp>
@@ -4990,7 +5247,9 @@
           <a:lstStyle/>
           <a:p>
             <a:pPr algn="ctr"/>
-            <a:endParaRPr lang="fr-FR"/>
+            <a:endParaRPr lang="fr-FR">
+              <a:latin typeface="Nunito Sans" panose="00000500000000000000" pitchFamily="2" charset="0"/>
+            </a:endParaRPr>
           </a:p>
         </p:txBody>
       </p:sp>
@@ -5023,12 +5282,16 @@
           <a:lstStyle/>
           <a:p>
             <a:r>
-              <a:rPr lang="fr-FR" dirty="0"/>
+              <a:rPr lang="fr-FR" dirty="0">
+                <a:latin typeface="Nunito Sans" panose="00000500000000000000" pitchFamily="2" charset="0"/>
+              </a:rPr>
               <a:t>ARTICLE-5</a:t>
             </a:r>
           </a:p>
           <a:p>
-            <a:endParaRPr lang="fr-FR" dirty="0"/>
+            <a:endParaRPr lang="fr-FR" dirty="0">
+              <a:latin typeface="Nunito Sans" panose="00000500000000000000" pitchFamily="2" charset="0"/>
+            </a:endParaRPr>
           </a:p>
         </p:txBody>
       </p:sp>
@@ -5084,7 +5347,9 @@
           <a:lstStyle/>
           <a:p>
             <a:pPr algn="ctr"/>
-            <a:endParaRPr lang="fr-FR"/>
+            <a:endParaRPr lang="fr-FR">
+              <a:latin typeface="Nunito Sans" panose="00000500000000000000" pitchFamily="2" charset="0"/>
+            </a:endParaRPr>
           </a:p>
         </p:txBody>
       </p:sp>
@@ -5117,7 +5382,9 @@
           <a:lstStyle/>
           <a:p>
             <a:r>
-              <a:rPr lang="fr-FR" dirty="0"/>
+              <a:rPr lang="fr-FR" dirty="0">
+                <a:latin typeface="Nunito Sans" panose="00000500000000000000" pitchFamily="2" charset="0"/>
+              </a:rPr>
               <a:t>ARTICLE-6</a:t>
             </a:r>
           </a:p>
@@ -5171,7 +5438,9 @@
           <a:lstStyle/>
           <a:p>
             <a:pPr algn="ctr"/>
-            <a:endParaRPr lang="fr-FR"/>
+            <a:endParaRPr lang="fr-FR">
+              <a:latin typeface="Nunito Sans" panose="00000500000000000000" pitchFamily="2" charset="0"/>
+            </a:endParaRPr>
           </a:p>
         </p:txBody>
       </p:sp>
@@ -5227,7 +5496,9 @@
           <a:lstStyle/>
           <a:p>
             <a:pPr algn="ctr"/>
-            <a:endParaRPr lang="fr-FR"/>
+            <a:endParaRPr lang="fr-FR">
+              <a:latin typeface="Nunito Sans" panose="00000500000000000000" pitchFamily="2" charset="0"/>
+            </a:endParaRPr>
           </a:p>
         </p:txBody>
       </p:sp>
@@ -5260,12 +5531,16 @@
           <a:lstStyle/>
           <a:p>
             <a:r>
-              <a:rPr lang="fr-FR" dirty="0"/>
+              <a:rPr lang="fr-FR" dirty="0">
+                <a:latin typeface="Nunito Sans" panose="00000500000000000000" pitchFamily="2" charset="0"/>
+              </a:rPr>
               <a:t>ARTICLE-1</a:t>
             </a:r>
           </a:p>
           <a:p>
-            <a:endParaRPr lang="fr-FR" dirty="0"/>
+            <a:endParaRPr lang="fr-FR" dirty="0">
+              <a:latin typeface="Nunito Sans" panose="00000500000000000000" pitchFamily="2" charset="0"/>
+            </a:endParaRPr>
           </a:p>
         </p:txBody>
       </p:sp>
@@ -5321,7 +5596,9 @@
           <a:lstStyle/>
           <a:p>
             <a:pPr algn="ctr"/>
-            <a:endParaRPr lang="fr-FR"/>
+            <a:endParaRPr lang="fr-FR">
+              <a:latin typeface="Nunito Sans" panose="00000500000000000000" pitchFamily="2" charset="0"/>
+            </a:endParaRPr>
           </a:p>
         </p:txBody>
       </p:sp>
@@ -5354,12 +5631,16 @@
           <a:lstStyle/>
           <a:p>
             <a:r>
-              <a:rPr lang="fr-FR" dirty="0"/>
+              <a:rPr lang="fr-FR" dirty="0">
+                <a:latin typeface="Nunito Sans" panose="00000500000000000000" pitchFamily="2" charset="0"/>
+              </a:rPr>
               <a:t>ARTICLE-2</a:t>
             </a:r>
           </a:p>
           <a:p>
-            <a:endParaRPr lang="fr-FR" dirty="0"/>
+            <a:endParaRPr lang="fr-FR" dirty="0">
+              <a:latin typeface="Nunito Sans" panose="00000500000000000000" pitchFamily="2" charset="0"/>
+            </a:endParaRPr>
           </a:p>
         </p:txBody>
       </p:sp>
@@ -5415,7 +5696,9 @@
           <a:lstStyle/>
           <a:p>
             <a:pPr algn="ctr"/>
-            <a:endParaRPr lang="fr-FR"/>
+            <a:endParaRPr lang="fr-FR">
+              <a:latin typeface="Nunito Sans" panose="00000500000000000000" pitchFamily="2" charset="0"/>
+            </a:endParaRPr>
           </a:p>
         </p:txBody>
       </p:sp>
@@ -5448,7 +5731,9 @@
           <a:lstStyle/>
           <a:p>
             <a:r>
-              <a:rPr lang="fr-FR" dirty="0"/>
+              <a:rPr lang="fr-FR" dirty="0">
+                <a:latin typeface="Nunito Sans" panose="00000500000000000000" pitchFamily="2" charset="0"/>
+              </a:rPr>
               <a:t>ARTICLE-3</a:t>
             </a:r>
           </a:p>
@@ -5502,7 +5787,9 @@
           <a:lstStyle/>
           <a:p>
             <a:pPr algn="ctr"/>
-            <a:endParaRPr lang="fr-FR"/>
+            <a:endParaRPr lang="fr-FR">
+              <a:latin typeface="Nunito Sans" panose="00000500000000000000" pitchFamily="2" charset="0"/>
+            </a:endParaRPr>
           </a:p>
         </p:txBody>
       </p:sp>
@@ -5594,10 +5881,1188 @@
           </a:fontRef>
         </p:style>
       </p:cxnSp>
+      <p:sp>
+        <p:nvSpPr>
+          <p:cNvPr id="46" name="ZoneTexte 45">
+            <a:extLst>
+              <a:ext uri="{FF2B5EF4-FFF2-40B4-BE49-F238E27FC236}">
+                <a16:creationId xmlns:a16="http://schemas.microsoft.com/office/drawing/2014/main" id="{DF44B5E2-40DB-43FA-82F8-481B65C171C5}"/>
+              </a:ext>
+            </a:extLst>
+          </p:cNvPr>
+          <p:cNvSpPr txBox="1"/>
+          <p:nvPr/>
+        </p:nvSpPr>
+        <p:spPr>
+          <a:xfrm>
+            <a:off x="77948" y="67542"/>
+            <a:ext cx="3394444" cy="1077218"/>
+          </a:xfrm>
+          <a:prstGeom prst="rect">
+            <a:avLst/>
+          </a:prstGeom>
+          <a:noFill/>
+        </p:spPr>
+        <p:txBody>
+          <a:bodyPr wrap="square" rtlCol="0">
+            <a:spAutoFit/>
+          </a:bodyPr>
+          <a:lstStyle/>
+          <a:p>
+            <a:r>
+              <a:rPr lang="fr-FR" sz="3200" dirty="0">
+                <a:latin typeface="Nunito Sans" panose="00000500000000000000" pitchFamily="2" charset="0"/>
+              </a:rPr>
+              <a:t>Arborescence de notre site web</a:t>
+            </a:r>
+          </a:p>
+        </p:txBody>
+      </p:sp>
+      <p:pic>
+        <p:nvPicPr>
+          <p:cNvPr id="49" name="Image 48">
+            <a:extLst>
+              <a:ext uri="{FF2B5EF4-FFF2-40B4-BE49-F238E27FC236}">
+                <a16:creationId xmlns:a16="http://schemas.microsoft.com/office/drawing/2014/main" id="{095AA012-5584-4589-B5BD-6185592E4D3E}"/>
+              </a:ext>
+            </a:extLst>
+          </p:cNvPr>
+          <p:cNvPicPr>
+            <a:picLocks noChangeAspect="1"/>
+          </p:cNvPicPr>
+          <p:nvPr/>
+        </p:nvPicPr>
+        <p:blipFill>
+          <a:blip r:embed="rId2">
+            <a:extLst>
+              <a:ext uri="{28A0092B-C50C-407E-A947-70E740481C1C}">
+                <a14:useLocalDpi xmlns:a14="http://schemas.microsoft.com/office/drawing/2010/main" val="0"/>
+              </a:ext>
+            </a:extLst>
+          </a:blip>
+          <a:stretch>
+            <a:fillRect/>
+          </a:stretch>
+        </p:blipFill>
+        <p:spPr>
+          <a:xfrm>
+            <a:off x="9567333" y="-4120"/>
+            <a:ext cx="2624667" cy="686451"/>
+          </a:xfrm>
+          <a:prstGeom prst="rect">
+            <a:avLst/>
+          </a:prstGeom>
+        </p:spPr>
+      </p:pic>
+      <p:sp>
+        <p:nvSpPr>
+          <p:cNvPr id="2" name="Rectangle 1">
+            <a:extLst>
+              <a:ext uri="{FF2B5EF4-FFF2-40B4-BE49-F238E27FC236}">
+                <a16:creationId xmlns:a16="http://schemas.microsoft.com/office/drawing/2014/main" id="{0B69691E-F9FB-49D2-8DF2-94C7B5EE591A}"/>
+              </a:ext>
+            </a:extLst>
+          </p:cNvPr>
+          <p:cNvSpPr/>
+          <p:nvPr/>
+        </p:nvSpPr>
+        <p:spPr>
+          <a:xfrm>
+            <a:off x="0" y="-4120"/>
+            <a:ext cx="3472391" cy="1077218"/>
+          </a:xfrm>
+          <a:prstGeom prst="rect">
+            <a:avLst/>
+          </a:prstGeom>
+          <a:noFill/>
+          <a:ln w="12700">
+            <a:solidFill>
+              <a:schemeClr val="tx1"/>
+            </a:solidFill>
+          </a:ln>
+        </p:spPr>
+        <p:style>
+          <a:lnRef idx="2">
+            <a:schemeClr val="accent1">
+              <a:shade val="50000"/>
+            </a:schemeClr>
+          </a:lnRef>
+          <a:fillRef idx="1">
+            <a:schemeClr val="accent1"/>
+          </a:fillRef>
+          <a:effectRef idx="0">
+            <a:schemeClr val="accent1"/>
+          </a:effectRef>
+          <a:fontRef idx="minor">
+            <a:schemeClr val="lt1"/>
+          </a:fontRef>
+        </p:style>
+        <p:txBody>
+          <a:bodyPr rtlCol="0" anchor="ctr"/>
+          <a:lstStyle/>
+          <a:p>
+            <a:pPr algn="ctr"/>
+            <a:endParaRPr lang="fr-FR"/>
+          </a:p>
+        </p:txBody>
+      </p:sp>
     </p:spTree>
     <p:extLst>
       <p:ext uri="{BB962C8B-B14F-4D97-AF65-F5344CB8AC3E}">
         <p14:creationId xmlns:p14="http://schemas.microsoft.com/office/powerpoint/2010/main" val="1204601998"/>
+      </p:ext>
+    </p:extLst>
+  </p:cSld>
+  <p:clrMapOvr>
+    <a:masterClrMapping/>
+  </p:clrMapOvr>
+</p:sld>
+</file>
+
+<file path=ppt/slides/slide4.xml><?xml version="1.0" encoding="utf-8"?>
+<p:sld xmlns:a="http://schemas.openxmlformats.org/drawingml/2006/main" xmlns:r="http://schemas.openxmlformats.org/officeDocument/2006/relationships" xmlns:p="http://schemas.openxmlformats.org/presentationml/2006/main">
+  <p:cSld>
+    <p:spTree>
+      <p:nvGrpSpPr>
+        <p:cNvPr id="1" name=""/>
+        <p:cNvGrpSpPr/>
+        <p:nvPr/>
+      </p:nvGrpSpPr>
+      <p:grpSpPr>
+        <a:xfrm>
+          <a:off x="0" y="0"/>
+          <a:ext cx="0" cy="0"/>
+          <a:chOff x="0" y="0"/>
+          <a:chExt cx="0" cy="0"/>
+        </a:xfrm>
+      </p:grpSpPr>
+      <p:pic>
+        <p:nvPicPr>
+          <p:cNvPr id="49" name="Image 48">
+            <a:extLst>
+              <a:ext uri="{FF2B5EF4-FFF2-40B4-BE49-F238E27FC236}">
+                <a16:creationId xmlns:a16="http://schemas.microsoft.com/office/drawing/2014/main" id="{095AA012-5584-4589-B5BD-6185592E4D3E}"/>
+              </a:ext>
+            </a:extLst>
+          </p:cNvPr>
+          <p:cNvPicPr>
+            <a:picLocks noChangeAspect="1"/>
+          </p:cNvPicPr>
+          <p:nvPr/>
+        </p:nvPicPr>
+        <p:blipFill>
+          <a:blip r:embed="rId2">
+            <a:extLst>
+              <a:ext uri="{28A0092B-C50C-407E-A947-70E740481C1C}">
+                <a14:useLocalDpi xmlns:a14="http://schemas.microsoft.com/office/drawing/2010/main" val="0"/>
+              </a:ext>
+            </a:extLst>
+          </a:blip>
+          <a:stretch>
+            <a:fillRect/>
+          </a:stretch>
+        </p:blipFill>
+        <p:spPr>
+          <a:xfrm>
+            <a:off x="9567333" y="-4120"/>
+            <a:ext cx="2624667" cy="686451"/>
+          </a:xfrm>
+          <a:prstGeom prst="rect">
+            <a:avLst/>
+          </a:prstGeom>
+        </p:spPr>
+      </p:pic>
+      <p:sp>
+        <p:nvSpPr>
+          <p:cNvPr id="3" name="Rectangle 2">
+            <a:extLst>
+              <a:ext uri="{FF2B5EF4-FFF2-40B4-BE49-F238E27FC236}">
+                <a16:creationId xmlns:a16="http://schemas.microsoft.com/office/drawing/2014/main" id="{0176022A-89EC-4566-9AA8-A0BFDC24DEFE}"/>
+              </a:ext>
+            </a:extLst>
+          </p:cNvPr>
+          <p:cNvSpPr/>
+          <p:nvPr/>
+        </p:nvSpPr>
+        <p:spPr>
+          <a:xfrm>
+            <a:off x="424070" y="1338468"/>
+            <a:ext cx="3419061" cy="5300869"/>
+          </a:xfrm>
+          <a:prstGeom prst="rect">
+            <a:avLst/>
+          </a:prstGeom>
+          <a:noFill/>
+          <a:ln>
+            <a:solidFill>
+              <a:schemeClr val="tx1"/>
+            </a:solidFill>
+          </a:ln>
+        </p:spPr>
+        <p:style>
+          <a:lnRef idx="2">
+            <a:schemeClr val="accent1">
+              <a:shade val="50000"/>
+            </a:schemeClr>
+          </a:lnRef>
+          <a:fillRef idx="1">
+            <a:schemeClr val="accent1"/>
+          </a:fillRef>
+          <a:effectRef idx="0">
+            <a:schemeClr val="accent1"/>
+          </a:effectRef>
+          <a:fontRef idx="minor">
+            <a:schemeClr val="lt1"/>
+          </a:fontRef>
+        </p:style>
+        <p:txBody>
+          <a:bodyPr rtlCol="0" anchor="ctr"/>
+          <a:lstStyle/>
+          <a:p>
+            <a:pPr algn="ctr"/>
+            <a:endParaRPr lang="fr-FR"/>
+          </a:p>
+        </p:txBody>
+      </p:sp>
+      <p:sp>
+        <p:nvSpPr>
+          <p:cNvPr id="52" name="Rectangle 51">
+            <a:extLst>
+              <a:ext uri="{FF2B5EF4-FFF2-40B4-BE49-F238E27FC236}">
+                <a16:creationId xmlns:a16="http://schemas.microsoft.com/office/drawing/2014/main" id="{F4219553-3EF8-4F77-906D-D140ECDCA0AC}"/>
+              </a:ext>
+            </a:extLst>
+          </p:cNvPr>
+          <p:cNvSpPr/>
+          <p:nvPr/>
+        </p:nvSpPr>
+        <p:spPr>
+          <a:xfrm>
+            <a:off x="4386469" y="1338468"/>
+            <a:ext cx="3419061" cy="5300869"/>
+          </a:xfrm>
+          <a:prstGeom prst="rect">
+            <a:avLst/>
+          </a:prstGeom>
+          <a:noFill/>
+          <a:ln>
+            <a:solidFill>
+              <a:schemeClr val="tx1"/>
+            </a:solidFill>
+          </a:ln>
+        </p:spPr>
+        <p:style>
+          <a:lnRef idx="2">
+            <a:schemeClr val="accent1">
+              <a:shade val="50000"/>
+            </a:schemeClr>
+          </a:lnRef>
+          <a:fillRef idx="1">
+            <a:schemeClr val="accent1"/>
+          </a:fillRef>
+          <a:effectRef idx="0">
+            <a:schemeClr val="accent1"/>
+          </a:effectRef>
+          <a:fontRef idx="minor">
+            <a:schemeClr val="lt1"/>
+          </a:fontRef>
+        </p:style>
+        <p:txBody>
+          <a:bodyPr rtlCol="0" anchor="ctr"/>
+          <a:lstStyle/>
+          <a:p>
+            <a:pPr algn="ctr"/>
+            <a:endParaRPr lang="fr-FR"/>
+          </a:p>
+        </p:txBody>
+      </p:sp>
+      <p:sp>
+        <p:nvSpPr>
+          <p:cNvPr id="53" name="Rectangle 52">
+            <a:extLst>
+              <a:ext uri="{FF2B5EF4-FFF2-40B4-BE49-F238E27FC236}">
+                <a16:creationId xmlns:a16="http://schemas.microsoft.com/office/drawing/2014/main" id="{E0BC3746-8CA3-44C7-9C76-7E1E5C1A10F2}"/>
+              </a:ext>
+            </a:extLst>
+          </p:cNvPr>
+          <p:cNvSpPr/>
+          <p:nvPr/>
+        </p:nvSpPr>
+        <p:spPr>
+          <a:xfrm>
+            <a:off x="8348869" y="1338468"/>
+            <a:ext cx="3419061" cy="5300869"/>
+          </a:xfrm>
+          <a:prstGeom prst="rect">
+            <a:avLst/>
+          </a:prstGeom>
+          <a:noFill/>
+          <a:ln>
+            <a:solidFill>
+              <a:schemeClr val="tx1"/>
+            </a:solidFill>
+          </a:ln>
+        </p:spPr>
+        <p:style>
+          <a:lnRef idx="2">
+            <a:schemeClr val="accent1">
+              <a:shade val="50000"/>
+            </a:schemeClr>
+          </a:lnRef>
+          <a:fillRef idx="1">
+            <a:schemeClr val="accent1"/>
+          </a:fillRef>
+          <a:effectRef idx="0">
+            <a:schemeClr val="accent1"/>
+          </a:effectRef>
+          <a:fontRef idx="minor">
+            <a:schemeClr val="lt1"/>
+          </a:fontRef>
+        </p:style>
+        <p:txBody>
+          <a:bodyPr rtlCol="0" anchor="ctr"/>
+          <a:lstStyle/>
+          <a:p>
+            <a:pPr algn="ctr"/>
+            <a:endParaRPr lang="fr-FR"/>
+          </a:p>
+        </p:txBody>
+      </p:sp>
+      <p:sp>
+        <p:nvSpPr>
+          <p:cNvPr id="55" name="Rectangle 54">
+            <a:extLst>
+              <a:ext uri="{FF2B5EF4-FFF2-40B4-BE49-F238E27FC236}">
+                <a16:creationId xmlns:a16="http://schemas.microsoft.com/office/drawing/2014/main" id="{E53BC51B-B7F5-40B0-9E8A-1439F5F58E42}"/>
+              </a:ext>
+            </a:extLst>
+          </p:cNvPr>
+          <p:cNvSpPr/>
+          <p:nvPr/>
+        </p:nvSpPr>
+        <p:spPr>
+          <a:xfrm>
+            <a:off x="695738" y="1557132"/>
+            <a:ext cx="2869097" cy="3372678"/>
+          </a:xfrm>
+          <a:prstGeom prst="rect">
+            <a:avLst/>
+          </a:prstGeom>
+          <a:noFill/>
+          <a:ln>
+            <a:solidFill>
+              <a:schemeClr val="tx1"/>
+            </a:solidFill>
+          </a:ln>
+        </p:spPr>
+        <p:style>
+          <a:lnRef idx="2">
+            <a:schemeClr val="accent1">
+              <a:shade val="50000"/>
+            </a:schemeClr>
+          </a:lnRef>
+          <a:fillRef idx="1">
+            <a:schemeClr val="accent1"/>
+          </a:fillRef>
+          <a:effectRef idx="0">
+            <a:schemeClr val="accent1"/>
+          </a:effectRef>
+          <a:fontRef idx="minor">
+            <a:schemeClr val="lt1"/>
+          </a:fontRef>
+        </p:style>
+        <p:txBody>
+          <a:bodyPr rtlCol="0" anchor="ctr"/>
+          <a:lstStyle/>
+          <a:p>
+            <a:pPr algn="ctr"/>
+            <a:endParaRPr lang="fr-FR"/>
+          </a:p>
+        </p:txBody>
+      </p:sp>
+      <p:sp>
+        <p:nvSpPr>
+          <p:cNvPr id="56" name="Rectangle 55">
+            <a:extLst>
+              <a:ext uri="{FF2B5EF4-FFF2-40B4-BE49-F238E27FC236}">
+                <a16:creationId xmlns:a16="http://schemas.microsoft.com/office/drawing/2014/main" id="{36549CD0-44F1-40A8-9476-EE331D0E4475}"/>
+              </a:ext>
+            </a:extLst>
+          </p:cNvPr>
+          <p:cNvSpPr/>
+          <p:nvPr/>
+        </p:nvSpPr>
+        <p:spPr>
+          <a:xfrm>
+            <a:off x="8623850" y="1557132"/>
+            <a:ext cx="2869097" cy="3372678"/>
+          </a:xfrm>
+          <a:prstGeom prst="rect">
+            <a:avLst/>
+          </a:prstGeom>
+          <a:noFill/>
+          <a:ln>
+            <a:solidFill>
+              <a:schemeClr val="tx1"/>
+            </a:solidFill>
+          </a:ln>
+        </p:spPr>
+        <p:style>
+          <a:lnRef idx="2">
+            <a:schemeClr val="accent1">
+              <a:shade val="50000"/>
+            </a:schemeClr>
+          </a:lnRef>
+          <a:fillRef idx="1">
+            <a:schemeClr val="accent1"/>
+          </a:fillRef>
+          <a:effectRef idx="0">
+            <a:schemeClr val="accent1"/>
+          </a:effectRef>
+          <a:fontRef idx="minor">
+            <a:schemeClr val="lt1"/>
+          </a:fontRef>
+        </p:style>
+        <p:txBody>
+          <a:bodyPr rtlCol="0" anchor="ctr"/>
+          <a:lstStyle/>
+          <a:p>
+            <a:pPr algn="ctr"/>
+            <a:endParaRPr lang="fr-FR"/>
+          </a:p>
+        </p:txBody>
+      </p:sp>
+      <p:sp>
+        <p:nvSpPr>
+          <p:cNvPr id="58" name="Rectangle 57">
+            <a:extLst>
+              <a:ext uri="{FF2B5EF4-FFF2-40B4-BE49-F238E27FC236}">
+                <a16:creationId xmlns:a16="http://schemas.microsoft.com/office/drawing/2014/main" id="{18F54FB1-C328-4445-B4B8-AE121AC446C0}"/>
+              </a:ext>
+            </a:extLst>
+          </p:cNvPr>
+          <p:cNvSpPr/>
+          <p:nvPr/>
+        </p:nvSpPr>
+        <p:spPr>
+          <a:xfrm>
+            <a:off x="4661450" y="1557132"/>
+            <a:ext cx="2869097" cy="3372678"/>
+          </a:xfrm>
+          <a:prstGeom prst="rect">
+            <a:avLst/>
+          </a:prstGeom>
+          <a:noFill/>
+          <a:ln>
+            <a:solidFill>
+              <a:schemeClr val="tx1"/>
+            </a:solidFill>
+          </a:ln>
+        </p:spPr>
+        <p:style>
+          <a:lnRef idx="2">
+            <a:schemeClr val="accent1">
+              <a:shade val="50000"/>
+            </a:schemeClr>
+          </a:lnRef>
+          <a:fillRef idx="1">
+            <a:schemeClr val="accent1"/>
+          </a:fillRef>
+          <a:effectRef idx="0">
+            <a:schemeClr val="accent1"/>
+          </a:effectRef>
+          <a:fontRef idx="minor">
+            <a:schemeClr val="lt1"/>
+          </a:fontRef>
+        </p:style>
+        <p:txBody>
+          <a:bodyPr rtlCol="0" anchor="ctr"/>
+          <a:lstStyle/>
+          <a:p>
+            <a:pPr algn="ctr"/>
+            <a:endParaRPr lang="fr-FR"/>
+          </a:p>
+        </p:txBody>
+      </p:sp>
+      <p:sp>
+        <p:nvSpPr>
+          <p:cNvPr id="59" name="ZoneTexte 58">
+            <a:extLst>
+              <a:ext uri="{FF2B5EF4-FFF2-40B4-BE49-F238E27FC236}">
+                <a16:creationId xmlns:a16="http://schemas.microsoft.com/office/drawing/2014/main" id="{B8B4C23B-5AE8-4936-905F-2A0EC5568E70}"/>
+              </a:ext>
+            </a:extLst>
+          </p:cNvPr>
+          <p:cNvSpPr txBox="1"/>
+          <p:nvPr/>
+        </p:nvSpPr>
+        <p:spPr>
+          <a:xfrm>
+            <a:off x="77948" y="67542"/>
+            <a:ext cx="3394444" cy="584775"/>
+          </a:xfrm>
+          <a:prstGeom prst="rect">
+            <a:avLst/>
+          </a:prstGeom>
+          <a:noFill/>
+        </p:spPr>
+        <p:txBody>
+          <a:bodyPr wrap="square" rtlCol="0">
+            <a:spAutoFit/>
+          </a:bodyPr>
+          <a:lstStyle/>
+          <a:p>
+            <a:r>
+              <a:rPr lang="fr-FR" sz="3200" dirty="0">
+                <a:latin typeface="Nunito Sans" panose="00000500000000000000" pitchFamily="2" charset="0"/>
+              </a:rPr>
+              <a:t>Couleurs</a:t>
+            </a:r>
+          </a:p>
+        </p:txBody>
+      </p:sp>
+    </p:spTree>
+    <p:extLst>
+      <p:ext uri="{BB962C8B-B14F-4D97-AF65-F5344CB8AC3E}">
+        <p14:creationId xmlns:p14="http://schemas.microsoft.com/office/powerpoint/2010/main" val="3803163889"/>
+      </p:ext>
+    </p:extLst>
+  </p:cSld>
+  <p:clrMapOvr>
+    <a:masterClrMapping/>
+  </p:clrMapOvr>
+</p:sld>
+</file>
+
+<file path=ppt/slides/slide5.xml><?xml version="1.0" encoding="utf-8"?>
+<p:sld xmlns:a="http://schemas.openxmlformats.org/drawingml/2006/main" xmlns:r="http://schemas.openxmlformats.org/officeDocument/2006/relationships" xmlns:p="http://schemas.openxmlformats.org/presentationml/2006/main">
+  <p:cSld>
+    <p:spTree>
+      <p:nvGrpSpPr>
+        <p:cNvPr id="1" name=""/>
+        <p:cNvGrpSpPr/>
+        <p:nvPr/>
+      </p:nvGrpSpPr>
+      <p:grpSpPr>
+        <a:xfrm>
+          <a:off x="0" y="0"/>
+          <a:ext cx="0" cy="0"/>
+          <a:chOff x="0" y="0"/>
+          <a:chExt cx="0" cy="0"/>
+        </a:xfrm>
+      </p:grpSpPr>
+      <p:pic>
+        <p:nvPicPr>
+          <p:cNvPr id="49" name="Image 48">
+            <a:extLst>
+              <a:ext uri="{FF2B5EF4-FFF2-40B4-BE49-F238E27FC236}">
+                <a16:creationId xmlns:a16="http://schemas.microsoft.com/office/drawing/2014/main" id="{095AA012-5584-4589-B5BD-6185592E4D3E}"/>
+              </a:ext>
+            </a:extLst>
+          </p:cNvPr>
+          <p:cNvPicPr>
+            <a:picLocks noChangeAspect="1"/>
+          </p:cNvPicPr>
+          <p:nvPr/>
+        </p:nvPicPr>
+        <p:blipFill>
+          <a:blip r:embed="rId2">
+            <a:extLst>
+              <a:ext uri="{28A0092B-C50C-407E-A947-70E740481C1C}">
+                <a14:useLocalDpi xmlns:a14="http://schemas.microsoft.com/office/drawing/2010/main" val="0"/>
+              </a:ext>
+            </a:extLst>
+          </a:blip>
+          <a:stretch>
+            <a:fillRect/>
+          </a:stretch>
+        </p:blipFill>
+        <p:spPr>
+          <a:xfrm>
+            <a:off x="9567333" y="-4120"/>
+            <a:ext cx="2624667" cy="686451"/>
+          </a:xfrm>
+          <a:prstGeom prst="rect">
+            <a:avLst/>
+          </a:prstGeom>
+        </p:spPr>
+      </p:pic>
+      <p:sp>
+        <p:nvSpPr>
+          <p:cNvPr id="59" name="ZoneTexte 58">
+            <a:extLst>
+              <a:ext uri="{FF2B5EF4-FFF2-40B4-BE49-F238E27FC236}">
+                <a16:creationId xmlns:a16="http://schemas.microsoft.com/office/drawing/2014/main" id="{B8B4C23B-5AE8-4936-905F-2A0EC5568E70}"/>
+              </a:ext>
+            </a:extLst>
+          </p:cNvPr>
+          <p:cNvSpPr txBox="1"/>
+          <p:nvPr/>
+        </p:nvSpPr>
+        <p:spPr>
+          <a:xfrm>
+            <a:off x="77948" y="67542"/>
+            <a:ext cx="3394444" cy="584775"/>
+          </a:xfrm>
+          <a:prstGeom prst="rect">
+            <a:avLst/>
+          </a:prstGeom>
+          <a:noFill/>
+        </p:spPr>
+        <p:txBody>
+          <a:bodyPr wrap="square" rtlCol="0">
+            <a:spAutoFit/>
+          </a:bodyPr>
+          <a:lstStyle/>
+          <a:p>
+            <a:r>
+              <a:rPr lang="fr-FR" sz="3200" dirty="0">
+                <a:latin typeface="Nunito Sans" panose="00000500000000000000" pitchFamily="2" charset="0"/>
+              </a:rPr>
+              <a:t>Polices</a:t>
+            </a:r>
+          </a:p>
+        </p:txBody>
+      </p:sp>
+      <p:sp>
+        <p:nvSpPr>
+          <p:cNvPr id="2" name="ZoneTexte 1">
+            <a:extLst>
+              <a:ext uri="{FF2B5EF4-FFF2-40B4-BE49-F238E27FC236}">
+                <a16:creationId xmlns:a16="http://schemas.microsoft.com/office/drawing/2014/main" id="{3E649FCF-34D9-4D09-970A-6871F7D18EC1}"/>
+              </a:ext>
+            </a:extLst>
+          </p:cNvPr>
+          <p:cNvSpPr txBox="1"/>
+          <p:nvPr/>
+        </p:nvSpPr>
+        <p:spPr>
+          <a:xfrm>
+            <a:off x="4711700" y="1646245"/>
+            <a:ext cx="2768600" cy="646331"/>
+          </a:xfrm>
+          <a:prstGeom prst="rect">
+            <a:avLst/>
+          </a:prstGeom>
+          <a:noFill/>
+        </p:spPr>
+        <p:txBody>
+          <a:bodyPr wrap="square" rtlCol="0">
+            <a:spAutoFit/>
+          </a:bodyPr>
+          <a:lstStyle/>
+          <a:p>
+            <a:r>
+              <a:rPr lang="fr-FR" sz="3600" b="1" dirty="0" err="1">
+                <a:latin typeface="Nunito Sans" panose="00000500000000000000" pitchFamily="2" charset="0"/>
+              </a:rPr>
+              <a:t>Nunito</a:t>
+            </a:r>
+            <a:r>
+              <a:rPr lang="fr-FR" sz="3600" b="1" dirty="0">
+                <a:latin typeface="Nunito Sans" panose="00000500000000000000" pitchFamily="2" charset="0"/>
+              </a:rPr>
+              <a:t> Sans</a:t>
+            </a:r>
+          </a:p>
+        </p:txBody>
+      </p:sp>
+      <p:sp>
+        <p:nvSpPr>
+          <p:cNvPr id="12" name="ZoneTexte 11">
+            <a:extLst>
+              <a:ext uri="{FF2B5EF4-FFF2-40B4-BE49-F238E27FC236}">
+                <a16:creationId xmlns:a16="http://schemas.microsoft.com/office/drawing/2014/main" id="{8C9D006B-42EF-4731-A26F-79F97E5DB238}"/>
+              </a:ext>
+            </a:extLst>
+          </p:cNvPr>
+          <p:cNvSpPr txBox="1"/>
+          <p:nvPr/>
+        </p:nvSpPr>
+        <p:spPr>
+          <a:xfrm>
+            <a:off x="1742546" y="3286503"/>
+            <a:ext cx="8706908" cy="2308324"/>
+          </a:xfrm>
+          <a:prstGeom prst="rect">
+            <a:avLst/>
+          </a:prstGeom>
+          <a:noFill/>
+        </p:spPr>
+        <p:txBody>
+          <a:bodyPr wrap="square" rtlCol="0">
+            <a:spAutoFit/>
+          </a:bodyPr>
+          <a:lstStyle/>
+          <a:p>
+            <a:pPr algn="ctr"/>
+            <a:r>
+              <a:rPr lang="fr-FR" sz="3600" dirty="0" err="1">
+                <a:latin typeface="Nunito Sans" panose="00000500000000000000" pitchFamily="2" charset="0"/>
+              </a:rPr>
+              <a:t>abcdefghijklmnopqrstuvwxyz</a:t>
+            </a:r>
+            <a:endParaRPr lang="fr-FR" sz="3600" dirty="0">
+              <a:latin typeface="Nunito Sans" panose="00000500000000000000" pitchFamily="2" charset="0"/>
+            </a:endParaRPr>
+          </a:p>
+          <a:p>
+            <a:pPr algn="ctr"/>
+            <a:r>
+              <a:rPr lang="fr-FR" sz="3600" dirty="0">
+                <a:latin typeface="Nunito Sans" panose="00000500000000000000" pitchFamily="2" charset="0"/>
+              </a:rPr>
+              <a:t>ABCDEFGHIJKLMNOPQRSTUVWSYX</a:t>
+            </a:r>
+          </a:p>
+          <a:p>
+            <a:pPr algn="ctr"/>
+            <a:r>
+              <a:rPr lang="fr-FR" sz="3600" dirty="0">
+                <a:latin typeface="Nunito Sans" panose="00000500000000000000" pitchFamily="2" charset="0"/>
+              </a:rPr>
+              <a:t>123456789</a:t>
+            </a:r>
+          </a:p>
+          <a:p>
+            <a:pPr algn="ctr"/>
+            <a:r>
+              <a:rPr lang="fr-FR" sz="3600" dirty="0">
+                <a:latin typeface="Nunito Sans" panose="00000500000000000000" pitchFamily="2" charset="0"/>
+              </a:rPr>
+              <a:t>« !?()</a:t>
+            </a:r>
+            <a:r>
+              <a:rPr lang="fr-FR" sz="3600" dirty="0" err="1">
+                <a:latin typeface="Nunito Sans" panose="00000500000000000000" pitchFamily="2" charset="0"/>
+              </a:rPr>
+              <a:t>àçéù</a:t>
+            </a:r>
+            <a:r>
+              <a:rPr lang="fr-FR" sz="3600" dirty="0">
+                <a:latin typeface="Nunito Sans" panose="00000500000000000000" pitchFamily="2" charset="0"/>
+              </a:rPr>
+              <a:t>#»</a:t>
+            </a:r>
+          </a:p>
+        </p:txBody>
+      </p:sp>
+    </p:spTree>
+    <p:extLst>
+      <p:ext uri="{BB962C8B-B14F-4D97-AF65-F5344CB8AC3E}">
+        <p14:creationId xmlns:p14="http://schemas.microsoft.com/office/powerpoint/2010/main" val="993811677"/>
+      </p:ext>
+    </p:extLst>
+  </p:cSld>
+  <p:clrMapOvr>
+    <a:masterClrMapping/>
+  </p:clrMapOvr>
+</p:sld>
+</file>
+
+<file path=ppt/slides/slide6.xml><?xml version="1.0" encoding="utf-8"?>
+<p:sld xmlns:a="http://schemas.openxmlformats.org/drawingml/2006/main" xmlns:r="http://schemas.openxmlformats.org/officeDocument/2006/relationships" xmlns:p="http://schemas.openxmlformats.org/presentationml/2006/main">
+  <p:cSld>
+    <p:spTree>
+      <p:nvGrpSpPr>
+        <p:cNvPr id="1" name=""/>
+        <p:cNvGrpSpPr/>
+        <p:nvPr/>
+      </p:nvGrpSpPr>
+      <p:grpSpPr>
+        <a:xfrm>
+          <a:off x="0" y="0"/>
+          <a:ext cx="0" cy="0"/>
+          <a:chOff x="0" y="0"/>
+          <a:chExt cx="0" cy="0"/>
+        </a:xfrm>
+      </p:grpSpPr>
+      <p:pic>
+        <p:nvPicPr>
+          <p:cNvPr id="49" name="Image 48">
+            <a:extLst>
+              <a:ext uri="{FF2B5EF4-FFF2-40B4-BE49-F238E27FC236}">
+                <a16:creationId xmlns:a16="http://schemas.microsoft.com/office/drawing/2014/main" id="{095AA012-5584-4589-B5BD-6185592E4D3E}"/>
+              </a:ext>
+            </a:extLst>
+          </p:cNvPr>
+          <p:cNvPicPr>
+            <a:picLocks noChangeAspect="1"/>
+          </p:cNvPicPr>
+          <p:nvPr/>
+        </p:nvPicPr>
+        <p:blipFill>
+          <a:blip r:embed="rId2">
+            <a:extLst>
+              <a:ext uri="{28A0092B-C50C-407E-A947-70E740481C1C}">
+                <a14:useLocalDpi xmlns:a14="http://schemas.microsoft.com/office/drawing/2010/main" val="0"/>
+              </a:ext>
+            </a:extLst>
+          </a:blip>
+          <a:stretch>
+            <a:fillRect/>
+          </a:stretch>
+        </p:blipFill>
+        <p:spPr>
+          <a:xfrm>
+            <a:off x="9567333" y="-4120"/>
+            <a:ext cx="2624667" cy="686451"/>
+          </a:xfrm>
+          <a:prstGeom prst="rect">
+            <a:avLst/>
+          </a:prstGeom>
+        </p:spPr>
+      </p:pic>
+      <p:sp>
+        <p:nvSpPr>
+          <p:cNvPr id="9" name="ZoneTexte 8">
+            <a:extLst>
+              <a:ext uri="{FF2B5EF4-FFF2-40B4-BE49-F238E27FC236}">
+                <a16:creationId xmlns:a16="http://schemas.microsoft.com/office/drawing/2014/main" id="{29E704EF-0DC2-4823-97A3-6694FCC299FE}"/>
+              </a:ext>
+            </a:extLst>
+          </p:cNvPr>
+          <p:cNvSpPr txBox="1"/>
+          <p:nvPr/>
+        </p:nvSpPr>
+        <p:spPr>
+          <a:xfrm>
+            <a:off x="77948" y="67542"/>
+            <a:ext cx="3394444" cy="584775"/>
+          </a:xfrm>
+          <a:prstGeom prst="rect">
+            <a:avLst/>
+          </a:prstGeom>
+          <a:noFill/>
+        </p:spPr>
+        <p:txBody>
+          <a:bodyPr wrap="square" rtlCol="0">
+            <a:spAutoFit/>
+          </a:bodyPr>
+          <a:lstStyle/>
+          <a:p>
+            <a:r>
+              <a:rPr lang="fr-FR" sz="3200" dirty="0">
+                <a:latin typeface="Nunito Sans" panose="00000500000000000000" pitchFamily="2" charset="0"/>
+              </a:rPr>
+              <a:t>Zoning</a:t>
+            </a:r>
+          </a:p>
+        </p:txBody>
+      </p:sp>
+    </p:spTree>
+    <p:extLst>
+      <p:ext uri="{BB962C8B-B14F-4D97-AF65-F5344CB8AC3E}">
+        <p14:creationId xmlns:p14="http://schemas.microsoft.com/office/powerpoint/2010/main" val="2306348081"/>
+      </p:ext>
+    </p:extLst>
+  </p:cSld>
+  <p:clrMapOvr>
+    <a:masterClrMapping/>
+  </p:clrMapOvr>
+</p:sld>
+</file>
+
+<file path=ppt/slides/slide7.xml><?xml version="1.0" encoding="utf-8"?>
+<p:sld xmlns:a="http://schemas.openxmlformats.org/drawingml/2006/main" xmlns:r="http://schemas.openxmlformats.org/officeDocument/2006/relationships" xmlns:p="http://schemas.openxmlformats.org/presentationml/2006/main">
+  <p:cSld>
+    <p:spTree>
+      <p:nvGrpSpPr>
+        <p:cNvPr id="1" name=""/>
+        <p:cNvGrpSpPr/>
+        <p:nvPr/>
+      </p:nvGrpSpPr>
+      <p:grpSpPr>
+        <a:xfrm>
+          <a:off x="0" y="0"/>
+          <a:ext cx="0" cy="0"/>
+          <a:chOff x="0" y="0"/>
+          <a:chExt cx="0" cy="0"/>
+        </a:xfrm>
+      </p:grpSpPr>
+      <p:pic>
+        <p:nvPicPr>
+          <p:cNvPr id="49" name="Image 48">
+            <a:extLst>
+              <a:ext uri="{FF2B5EF4-FFF2-40B4-BE49-F238E27FC236}">
+                <a16:creationId xmlns:a16="http://schemas.microsoft.com/office/drawing/2014/main" id="{095AA012-5584-4589-B5BD-6185592E4D3E}"/>
+              </a:ext>
+            </a:extLst>
+          </p:cNvPr>
+          <p:cNvPicPr>
+            <a:picLocks noChangeAspect="1"/>
+          </p:cNvPicPr>
+          <p:nvPr/>
+        </p:nvPicPr>
+        <p:blipFill>
+          <a:blip r:embed="rId2">
+            <a:extLst>
+              <a:ext uri="{28A0092B-C50C-407E-A947-70E740481C1C}">
+                <a14:useLocalDpi xmlns:a14="http://schemas.microsoft.com/office/drawing/2010/main" val="0"/>
+              </a:ext>
+            </a:extLst>
+          </a:blip>
+          <a:stretch>
+            <a:fillRect/>
+          </a:stretch>
+        </p:blipFill>
+        <p:spPr>
+          <a:xfrm>
+            <a:off x="9567333" y="-4120"/>
+            <a:ext cx="2624667" cy="686451"/>
+          </a:xfrm>
+          <a:prstGeom prst="rect">
+            <a:avLst/>
+          </a:prstGeom>
+        </p:spPr>
+      </p:pic>
+      <p:sp>
+        <p:nvSpPr>
+          <p:cNvPr id="9" name="ZoneTexte 8">
+            <a:extLst>
+              <a:ext uri="{FF2B5EF4-FFF2-40B4-BE49-F238E27FC236}">
+                <a16:creationId xmlns:a16="http://schemas.microsoft.com/office/drawing/2014/main" id="{29E704EF-0DC2-4823-97A3-6694FCC299FE}"/>
+              </a:ext>
+            </a:extLst>
+          </p:cNvPr>
+          <p:cNvSpPr txBox="1"/>
+          <p:nvPr/>
+        </p:nvSpPr>
+        <p:spPr>
+          <a:xfrm>
+            <a:off x="77948" y="67542"/>
+            <a:ext cx="3394444" cy="584775"/>
+          </a:xfrm>
+          <a:prstGeom prst="rect">
+            <a:avLst/>
+          </a:prstGeom>
+          <a:noFill/>
+        </p:spPr>
+        <p:txBody>
+          <a:bodyPr wrap="square" rtlCol="0">
+            <a:spAutoFit/>
+          </a:bodyPr>
+          <a:lstStyle/>
+          <a:p>
+            <a:r>
+              <a:rPr lang="fr-FR" sz="3200" dirty="0">
+                <a:latin typeface="Nunito Sans" panose="00000500000000000000" pitchFamily="2" charset="0"/>
+              </a:rPr>
+              <a:t>Wireframe</a:t>
+            </a:r>
+          </a:p>
+        </p:txBody>
+      </p:sp>
+    </p:spTree>
+    <p:extLst>
+      <p:ext uri="{BB962C8B-B14F-4D97-AF65-F5344CB8AC3E}">
+        <p14:creationId xmlns:p14="http://schemas.microsoft.com/office/powerpoint/2010/main" val="2673464143"/>
+      </p:ext>
+    </p:extLst>
+  </p:cSld>
+  <p:clrMapOvr>
+    <a:masterClrMapping/>
+  </p:clrMapOvr>
+</p:sld>
+</file>
+
+<file path=ppt/slides/slide8.xml><?xml version="1.0" encoding="utf-8"?>
+<p:sld xmlns:a="http://schemas.openxmlformats.org/drawingml/2006/main" xmlns:r="http://schemas.openxmlformats.org/officeDocument/2006/relationships" xmlns:p="http://schemas.openxmlformats.org/presentationml/2006/main">
+  <p:cSld>
+    <p:spTree>
+      <p:nvGrpSpPr>
+        <p:cNvPr id="1" name=""/>
+        <p:cNvGrpSpPr/>
+        <p:nvPr/>
+      </p:nvGrpSpPr>
+      <p:grpSpPr>
+        <a:xfrm>
+          <a:off x="0" y="0"/>
+          <a:ext cx="0" cy="0"/>
+          <a:chOff x="0" y="0"/>
+          <a:chExt cx="0" cy="0"/>
+        </a:xfrm>
+      </p:grpSpPr>
+      <p:pic>
+        <p:nvPicPr>
+          <p:cNvPr id="49" name="Image 48">
+            <a:extLst>
+              <a:ext uri="{FF2B5EF4-FFF2-40B4-BE49-F238E27FC236}">
+                <a16:creationId xmlns:a16="http://schemas.microsoft.com/office/drawing/2014/main" id="{095AA012-5584-4589-B5BD-6185592E4D3E}"/>
+              </a:ext>
+            </a:extLst>
+          </p:cNvPr>
+          <p:cNvPicPr>
+            <a:picLocks noChangeAspect="1"/>
+          </p:cNvPicPr>
+          <p:nvPr/>
+        </p:nvPicPr>
+        <p:blipFill>
+          <a:blip r:embed="rId2">
+            <a:extLst>
+              <a:ext uri="{28A0092B-C50C-407E-A947-70E740481C1C}">
+                <a14:useLocalDpi xmlns:a14="http://schemas.microsoft.com/office/drawing/2010/main" val="0"/>
+              </a:ext>
+            </a:extLst>
+          </a:blip>
+          <a:stretch>
+            <a:fillRect/>
+          </a:stretch>
+        </p:blipFill>
+        <p:spPr>
+          <a:xfrm>
+            <a:off x="9567333" y="-4120"/>
+            <a:ext cx="2624667" cy="686451"/>
+          </a:xfrm>
+          <a:prstGeom prst="rect">
+            <a:avLst/>
+          </a:prstGeom>
+        </p:spPr>
+      </p:pic>
+      <p:sp>
+        <p:nvSpPr>
+          <p:cNvPr id="9" name="ZoneTexte 8">
+            <a:extLst>
+              <a:ext uri="{FF2B5EF4-FFF2-40B4-BE49-F238E27FC236}">
+                <a16:creationId xmlns:a16="http://schemas.microsoft.com/office/drawing/2014/main" id="{29E704EF-0DC2-4823-97A3-6694FCC299FE}"/>
+              </a:ext>
+            </a:extLst>
+          </p:cNvPr>
+          <p:cNvSpPr txBox="1"/>
+          <p:nvPr/>
+        </p:nvSpPr>
+        <p:spPr>
+          <a:xfrm>
+            <a:off x="77948" y="67542"/>
+            <a:ext cx="3394444" cy="1077218"/>
+          </a:xfrm>
+          <a:prstGeom prst="rect">
+            <a:avLst/>
+          </a:prstGeom>
+          <a:noFill/>
+        </p:spPr>
+        <p:txBody>
+          <a:bodyPr wrap="square" rtlCol="0">
+            <a:spAutoFit/>
+          </a:bodyPr>
+          <a:lstStyle/>
+          <a:p>
+            <a:r>
+              <a:rPr lang="fr-FR" sz="3200" dirty="0">
+                <a:latin typeface="Nunito Sans" panose="00000500000000000000" pitchFamily="2" charset="0"/>
+              </a:rPr>
+              <a:t>Responsive (landing page)</a:t>
+            </a:r>
+          </a:p>
+        </p:txBody>
+      </p:sp>
+    </p:spTree>
+    <p:extLst>
+      <p:ext uri="{BB962C8B-B14F-4D97-AF65-F5344CB8AC3E}">
+        <p14:creationId xmlns:p14="http://schemas.microsoft.com/office/powerpoint/2010/main" val="895345432"/>
+      </p:ext>
+    </p:extLst>
+  </p:cSld>
+  <p:clrMapOvr>
+    <a:masterClrMapping/>
+  </p:clrMapOvr>
+</p:sld>
+</file>
+
+<file path=ppt/slides/slide9.xml><?xml version="1.0" encoding="utf-8"?>
+<p:sld xmlns:a="http://schemas.openxmlformats.org/drawingml/2006/main" xmlns:r="http://schemas.openxmlformats.org/officeDocument/2006/relationships" xmlns:p="http://schemas.openxmlformats.org/presentationml/2006/main">
+  <p:cSld>
+    <p:spTree>
+      <p:nvGrpSpPr>
+        <p:cNvPr id="1" name=""/>
+        <p:cNvGrpSpPr/>
+        <p:nvPr/>
+      </p:nvGrpSpPr>
+      <p:grpSpPr>
+        <a:xfrm>
+          <a:off x="0" y="0"/>
+          <a:ext cx="0" cy="0"/>
+          <a:chOff x="0" y="0"/>
+          <a:chExt cx="0" cy="0"/>
+        </a:xfrm>
+      </p:grpSpPr>
+      <p:pic>
+        <p:nvPicPr>
+          <p:cNvPr id="49" name="Image 48">
+            <a:extLst>
+              <a:ext uri="{FF2B5EF4-FFF2-40B4-BE49-F238E27FC236}">
+                <a16:creationId xmlns:a16="http://schemas.microsoft.com/office/drawing/2014/main" id="{095AA012-5584-4589-B5BD-6185592E4D3E}"/>
+              </a:ext>
+            </a:extLst>
+          </p:cNvPr>
+          <p:cNvPicPr>
+            <a:picLocks noChangeAspect="1"/>
+          </p:cNvPicPr>
+          <p:nvPr/>
+        </p:nvPicPr>
+        <p:blipFill>
+          <a:blip r:embed="rId2">
+            <a:extLst>
+              <a:ext uri="{28A0092B-C50C-407E-A947-70E740481C1C}">
+                <a14:useLocalDpi xmlns:a14="http://schemas.microsoft.com/office/drawing/2010/main" val="0"/>
+              </a:ext>
+            </a:extLst>
+          </a:blip>
+          <a:stretch>
+            <a:fillRect/>
+          </a:stretch>
+        </p:blipFill>
+        <p:spPr>
+          <a:xfrm>
+            <a:off x="9567333" y="-4120"/>
+            <a:ext cx="2624667" cy="686451"/>
+          </a:xfrm>
+          <a:prstGeom prst="rect">
+            <a:avLst/>
+          </a:prstGeom>
+        </p:spPr>
+      </p:pic>
+      <p:sp>
+        <p:nvSpPr>
+          <p:cNvPr id="9" name="ZoneTexte 8">
+            <a:extLst>
+              <a:ext uri="{FF2B5EF4-FFF2-40B4-BE49-F238E27FC236}">
+                <a16:creationId xmlns:a16="http://schemas.microsoft.com/office/drawing/2014/main" id="{29E704EF-0DC2-4823-97A3-6694FCC299FE}"/>
+              </a:ext>
+            </a:extLst>
+          </p:cNvPr>
+          <p:cNvSpPr txBox="1"/>
+          <p:nvPr/>
+        </p:nvSpPr>
+        <p:spPr>
+          <a:xfrm>
+            <a:off x="77948" y="67542"/>
+            <a:ext cx="3394444" cy="1077218"/>
+          </a:xfrm>
+          <a:prstGeom prst="rect">
+            <a:avLst/>
+          </a:prstGeom>
+          <a:noFill/>
+        </p:spPr>
+        <p:txBody>
+          <a:bodyPr wrap="square" rtlCol="0">
+            <a:spAutoFit/>
+          </a:bodyPr>
+          <a:lstStyle/>
+          <a:p>
+            <a:r>
+              <a:rPr lang="fr-FR" sz="3200" dirty="0">
+                <a:latin typeface="Nunito Sans" panose="00000500000000000000" pitchFamily="2" charset="0"/>
+              </a:rPr>
+              <a:t>Responsive (rubriques)</a:t>
+            </a:r>
+          </a:p>
+        </p:txBody>
+      </p:sp>
+    </p:spTree>
+    <p:extLst>
+      <p:ext uri="{BB962C8B-B14F-4D97-AF65-F5344CB8AC3E}">
+        <p14:creationId xmlns:p14="http://schemas.microsoft.com/office/powerpoint/2010/main" val="3184296643"/>
       </p:ext>
     </p:extLst>
   </p:cSld>

</xml_diff>

<commit_message>
commit avant le pull du 15/04
</commit_message>
<xml_diff>
--- a/dossier de conception.pptx
+++ b/dossier de conception.pptx
@@ -8,14 +8,16 @@
     <p:sldId id="257" r:id="rId2"/>
     <p:sldId id="258" r:id="rId3"/>
     <p:sldId id="256" r:id="rId4"/>
-    <p:sldId id="259" r:id="rId5"/>
-    <p:sldId id="264" r:id="rId6"/>
-    <p:sldId id="260" r:id="rId7"/>
-    <p:sldId id="261" r:id="rId8"/>
-    <p:sldId id="263" r:id="rId9"/>
-    <p:sldId id="267" r:id="rId10"/>
-    <p:sldId id="266" r:id="rId11"/>
-    <p:sldId id="265" r:id="rId12"/>
+    <p:sldId id="269" r:id="rId5"/>
+    <p:sldId id="259" r:id="rId6"/>
+    <p:sldId id="264" r:id="rId7"/>
+    <p:sldId id="260" r:id="rId8"/>
+    <p:sldId id="261" r:id="rId9"/>
+    <p:sldId id="263" r:id="rId10"/>
+    <p:sldId id="267" r:id="rId11"/>
+    <p:sldId id="266" r:id="rId12"/>
+    <p:sldId id="268" r:id="rId13"/>
+    <p:sldId id="265" r:id="rId14"/>
   </p:sldIdLst>
   <p:sldSz cx="12192000" cy="6858000"/>
   <p:notesSz cx="6858000" cy="9144000"/>
@@ -269,7 +271,7 @@
           <a:p>
             <a:fld id="{AAFC192E-AD9A-4E5F-9BCB-0D6705619E5D}" type="datetimeFigureOut">
               <a:rPr lang="fr-FR" smtClean="0"/>
-              <a:t>13/04/2021</a:t>
+              <a:t>15/04/2021</a:t>
             </a:fld>
             <a:endParaRPr lang="fr-FR"/>
           </a:p>
@@ -467,7 +469,7 @@
           <a:p>
             <a:fld id="{AAFC192E-AD9A-4E5F-9BCB-0D6705619E5D}" type="datetimeFigureOut">
               <a:rPr lang="fr-FR" smtClean="0"/>
-              <a:t>13/04/2021</a:t>
+              <a:t>15/04/2021</a:t>
             </a:fld>
             <a:endParaRPr lang="fr-FR"/>
           </a:p>
@@ -675,7 +677,7 @@
           <a:p>
             <a:fld id="{AAFC192E-AD9A-4E5F-9BCB-0D6705619E5D}" type="datetimeFigureOut">
               <a:rPr lang="fr-FR" smtClean="0"/>
-              <a:t>13/04/2021</a:t>
+              <a:t>15/04/2021</a:t>
             </a:fld>
             <a:endParaRPr lang="fr-FR"/>
           </a:p>
@@ -873,7 +875,7 @@
           <a:p>
             <a:fld id="{AAFC192E-AD9A-4E5F-9BCB-0D6705619E5D}" type="datetimeFigureOut">
               <a:rPr lang="fr-FR" smtClean="0"/>
-              <a:t>13/04/2021</a:t>
+              <a:t>15/04/2021</a:t>
             </a:fld>
             <a:endParaRPr lang="fr-FR"/>
           </a:p>
@@ -1148,7 +1150,7 @@
           <a:p>
             <a:fld id="{AAFC192E-AD9A-4E5F-9BCB-0D6705619E5D}" type="datetimeFigureOut">
               <a:rPr lang="fr-FR" smtClean="0"/>
-              <a:t>13/04/2021</a:t>
+              <a:t>15/04/2021</a:t>
             </a:fld>
             <a:endParaRPr lang="fr-FR"/>
           </a:p>
@@ -1413,7 +1415,7 @@
           <a:p>
             <a:fld id="{AAFC192E-AD9A-4E5F-9BCB-0D6705619E5D}" type="datetimeFigureOut">
               <a:rPr lang="fr-FR" smtClean="0"/>
-              <a:t>13/04/2021</a:t>
+              <a:t>15/04/2021</a:t>
             </a:fld>
             <a:endParaRPr lang="fr-FR"/>
           </a:p>
@@ -1825,7 +1827,7 @@
           <a:p>
             <a:fld id="{AAFC192E-AD9A-4E5F-9BCB-0D6705619E5D}" type="datetimeFigureOut">
               <a:rPr lang="fr-FR" smtClean="0"/>
-              <a:t>13/04/2021</a:t>
+              <a:t>15/04/2021</a:t>
             </a:fld>
             <a:endParaRPr lang="fr-FR"/>
           </a:p>
@@ -1966,7 +1968,7 @@
           <a:p>
             <a:fld id="{AAFC192E-AD9A-4E5F-9BCB-0D6705619E5D}" type="datetimeFigureOut">
               <a:rPr lang="fr-FR" smtClean="0"/>
-              <a:t>13/04/2021</a:t>
+              <a:t>15/04/2021</a:t>
             </a:fld>
             <a:endParaRPr lang="fr-FR"/>
           </a:p>
@@ -2079,7 +2081,7 @@
           <a:p>
             <a:fld id="{AAFC192E-AD9A-4E5F-9BCB-0D6705619E5D}" type="datetimeFigureOut">
               <a:rPr lang="fr-FR" smtClean="0"/>
-              <a:t>13/04/2021</a:t>
+              <a:t>15/04/2021</a:t>
             </a:fld>
             <a:endParaRPr lang="fr-FR"/>
           </a:p>
@@ -2390,7 +2392,7 @@
           <a:p>
             <a:fld id="{AAFC192E-AD9A-4E5F-9BCB-0D6705619E5D}" type="datetimeFigureOut">
               <a:rPr lang="fr-FR" smtClean="0"/>
-              <a:t>13/04/2021</a:t>
+              <a:t>15/04/2021</a:t>
             </a:fld>
             <a:endParaRPr lang="fr-FR"/>
           </a:p>
@@ -2678,7 +2680,7 @@
           <a:p>
             <a:fld id="{AAFC192E-AD9A-4E5F-9BCB-0D6705619E5D}" type="datetimeFigureOut">
               <a:rPr lang="fr-FR" smtClean="0"/>
-              <a:t>13/04/2021</a:t>
+              <a:t>15/04/2021</a:t>
             </a:fld>
             <a:endParaRPr lang="fr-FR"/>
           </a:p>
@@ -2919,7 +2921,7 @@
           <a:p>
             <a:fld id="{AAFC192E-AD9A-4E5F-9BCB-0D6705619E5D}" type="datetimeFigureOut">
               <a:rPr lang="fr-FR" smtClean="0"/>
-              <a:t>13/04/2021</a:t>
+              <a:t>15/04/2021</a:t>
             </a:fld>
             <a:endParaRPr lang="fr-FR"/>
           </a:p>
@@ -3524,6 +3526,109 @@
               <a:rPr lang="fr-FR" sz="3200" dirty="0">
                 <a:latin typeface="Nunito Sans" panose="00000500000000000000" pitchFamily="2" charset="0"/>
               </a:rPr>
+              <a:t>Responsive (rubriques)</a:t>
+            </a:r>
+          </a:p>
+        </p:txBody>
+      </p:sp>
+    </p:spTree>
+    <p:extLst>
+      <p:ext uri="{BB962C8B-B14F-4D97-AF65-F5344CB8AC3E}">
+        <p14:creationId xmlns:p14="http://schemas.microsoft.com/office/powerpoint/2010/main" val="3184296643"/>
+      </p:ext>
+    </p:extLst>
+  </p:cSld>
+  <p:clrMapOvr>
+    <a:masterClrMapping/>
+  </p:clrMapOvr>
+</p:sld>
+</file>
+
+<file path=ppt/slides/slide11.xml><?xml version="1.0" encoding="utf-8"?>
+<p:sld xmlns:a="http://schemas.openxmlformats.org/drawingml/2006/main" xmlns:r="http://schemas.openxmlformats.org/officeDocument/2006/relationships" xmlns:p="http://schemas.openxmlformats.org/presentationml/2006/main">
+  <p:cSld>
+    <p:spTree>
+      <p:nvGrpSpPr>
+        <p:cNvPr id="1" name=""/>
+        <p:cNvGrpSpPr/>
+        <p:nvPr/>
+      </p:nvGrpSpPr>
+      <p:grpSpPr>
+        <a:xfrm>
+          <a:off x="0" y="0"/>
+          <a:ext cx="0" cy="0"/>
+          <a:chOff x="0" y="0"/>
+          <a:chExt cx="0" cy="0"/>
+        </a:xfrm>
+      </p:grpSpPr>
+      <p:pic>
+        <p:nvPicPr>
+          <p:cNvPr id="49" name="Image 48">
+            <a:extLst>
+              <a:ext uri="{FF2B5EF4-FFF2-40B4-BE49-F238E27FC236}">
+                <a16:creationId xmlns:a16="http://schemas.microsoft.com/office/drawing/2014/main" id="{095AA012-5584-4589-B5BD-6185592E4D3E}"/>
+              </a:ext>
+            </a:extLst>
+          </p:cNvPr>
+          <p:cNvPicPr>
+            <a:picLocks noChangeAspect="1"/>
+          </p:cNvPicPr>
+          <p:nvPr/>
+        </p:nvPicPr>
+        <p:blipFill>
+          <a:blip r:embed="rId2">
+            <a:extLst>
+              <a:ext uri="{28A0092B-C50C-407E-A947-70E740481C1C}">
+                <a14:useLocalDpi xmlns:a14="http://schemas.microsoft.com/office/drawing/2010/main" val="0"/>
+              </a:ext>
+            </a:extLst>
+          </a:blip>
+          <a:stretch>
+            <a:fillRect/>
+          </a:stretch>
+        </p:blipFill>
+        <p:spPr>
+          <a:xfrm>
+            <a:off x="9567333" y="-4120"/>
+            <a:ext cx="2624667" cy="686451"/>
+          </a:xfrm>
+          <a:prstGeom prst="rect">
+            <a:avLst/>
+          </a:prstGeom>
+        </p:spPr>
+      </p:pic>
+      <p:sp>
+        <p:nvSpPr>
+          <p:cNvPr id="9" name="ZoneTexte 8">
+            <a:extLst>
+              <a:ext uri="{FF2B5EF4-FFF2-40B4-BE49-F238E27FC236}">
+                <a16:creationId xmlns:a16="http://schemas.microsoft.com/office/drawing/2014/main" id="{29E704EF-0DC2-4823-97A3-6694FCC299FE}"/>
+              </a:ext>
+            </a:extLst>
+          </p:cNvPr>
+          <p:cNvSpPr txBox="1"/>
+          <p:nvPr/>
+        </p:nvSpPr>
+        <p:spPr>
+          <a:xfrm>
+            <a:off x="77948" y="67542"/>
+            <a:ext cx="3394444" cy="1077218"/>
+          </a:xfrm>
+          <a:prstGeom prst="rect">
+            <a:avLst/>
+          </a:prstGeom>
+          <a:noFill/>
+        </p:spPr>
+        <p:txBody>
+          <a:bodyPr wrap="square" rtlCol="0">
+            <a:spAutoFit/>
+          </a:bodyPr>
+          <a:lstStyle/>
+          <a:p>
+            <a:r>
+              <a:rPr lang="fr-FR" sz="3200" dirty="0">
+                <a:latin typeface="Nunito Sans" panose="00000500000000000000" pitchFamily="2" charset="0"/>
+              </a:rPr>
               <a:t>Responsive (article)</a:t>
             </a:r>
           </a:p>
@@ -3542,7 +3647,73 @@
 </p:sld>
 </file>
 
-<file path=ppt/slides/slide11.xml><?xml version="1.0" encoding="utf-8"?>
+<file path=ppt/slides/slide12.xml><?xml version="1.0" encoding="utf-8"?>
+<p:sld xmlns:a="http://schemas.openxmlformats.org/drawingml/2006/main" xmlns:r="http://schemas.openxmlformats.org/officeDocument/2006/relationships" xmlns:p="http://schemas.openxmlformats.org/presentationml/2006/main">
+  <p:cSld>
+    <p:spTree>
+      <p:nvGrpSpPr>
+        <p:cNvPr id="1" name=""/>
+        <p:cNvGrpSpPr/>
+        <p:nvPr/>
+      </p:nvGrpSpPr>
+      <p:grpSpPr>
+        <a:xfrm>
+          <a:off x="0" y="0"/>
+          <a:ext cx="0" cy="0"/>
+          <a:chOff x="0" y="0"/>
+          <a:chExt cx="0" cy="0"/>
+        </a:xfrm>
+      </p:grpSpPr>
+      <p:pic>
+        <p:nvPicPr>
+          <p:cNvPr id="49" name="Image 48">
+            <a:extLst>
+              <a:ext uri="{FF2B5EF4-FFF2-40B4-BE49-F238E27FC236}">
+                <a16:creationId xmlns:a16="http://schemas.microsoft.com/office/drawing/2014/main" id="{095AA012-5584-4589-B5BD-6185592E4D3E}"/>
+              </a:ext>
+            </a:extLst>
+          </p:cNvPr>
+          <p:cNvPicPr>
+            <a:picLocks noChangeAspect="1"/>
+          </p:cNvPicPr>
+          <p:nvPr/>
+        </p:nvPicPr>
+        <p:blipFill>
+          <a:blip r:embed="rId2">
+            <a:extLst>
+              <a:ext uri="{28A0092B-C50C-407E-A947-70E740481C1C}">
+                <a14:useLocalDpi xmlns:a14="http://schemas.microsoft.com/office/drawing/2010/main" val="0"/>
+              </a:ext>
+            </a:extLst>
+          </a:blip>
+          <a:stretch>
+            <a:fillRect/>
+          </a:stretch>
+        </p:blipFill>
+        <p:spPr>
+          <a:xfrm>
+            <a:off x="9567333" y="-4120"/>
+            <a:ext cx="2624667" cy="686451"/>
+          </a:xfrm>
+          <a:prstGeom prst="rect">
+            <a:avLst/>
+          </a:prstGeom>
+        </p:spPr>
+      </p:pic>
+    </p:spTree>
+    <p:extLst>
+      <p:ext uri="{BB962C8B-B14F-4D97-AF65-F5344CB8AC3E}">
+        <p14:creationId xmlns:p14="http://schemas.microsoft.com/office/powerpoint/2010/main" val="3885715184"/>
+      </p:ext>
+    </p:extLst>
+  </p:cSld>
+  <p:clrMapOvr>
+    <a:masterClrMapping/>
+  </p:clrMapOvr>
+</p:sld>
+</file>
+
+<file path=ppt/slides/slide13.xml><?xml version="1.0" encoding="utf-8"?>
 <p:sld xmlns:a="http://schemas.openxmlformats.org/drawingml/2006/main" xmlns:r="http://schemas.openxmlformats.org/officeDocument/2006/relationships" xmlns:p="http://schemas.openxmlformats.org/presentationml/2006/main">
   <p:cSld>
     <p:spTree>
@@ -6038,10 +6209,10 @@
       </p:grpSpPr>
       <p:pic>
         <p:nvPicPr>
-          <p:cNvPr id="49" name="Image 48">
-            <a:extLst>
-              <a:ext uri="{FF2B5EF4-FFF2-40B4-BE49-F238E27FC236}">
-                <a16:creationId xmlns:a16="http://schemas.microsoft.com/office/drawing/2014/main" id="{095AA012-5584-4589-B5BD-6185592E4D3E}"/>
+          <p:cNvPr id="4" name="Image 3">
+            <a:extLst>
+              <a:ext uri="{FF2B5EF4-FFF2-40B4-BE49-F238E27FC236}">
+                <a16:creationId xmlns:a16="http://schemas.microsoft.com/office/drawing/2014/main" id="{B88B342E-9C17-493A-B067-A50AA81093E6}"/>
               </a:ext>
             </a:extLst>
           </p:cNvPr>
@@ -6074,10 +6245,47 @@
       </p:pic>
       <p:sp>
         <p:nvSpPr>
-          <p:cNvPr id="3" name="Rectangle 2">
-            <a:extLst>
-              <a:ext uri="{FF2B5EF4-FFF2-40B4-BE49-F238E27FC236}">
-                <a16:creationId xmlns:a16="http://schemas.microsoft.com/office/drawing/2014/main" id="{0176022A-89EC-4566-9AA8-A0BFDC24DEFE}"/>
+          <p:cNvPr id="6" name="ZoneTexte 5">
+            <a:extLst>
+              <a:ext uri="{FF2B5EF4-FFF2-40B4-BE49-F238E27FC236}">
+                <a16:creationId xmlns:a16="http://schemas.microsoft.com/office/drawing/2014/main" id="{7E1717FF-C8E7-4334-89FD-699EAE0E18D2}"/>
+              </a:ext>
+            </a:extLst>
+          </p:cNvPr>
+          <p:cNvSpPr txBox="1"/>
+          <p:nvPr/>
+        </p:nvSpPr>
+        <p:spPr>
+          <a:xfrm>
+            <a:off x="77948" y="67542"/>
+            <a:ext cx="3394444" cy="584775"/>
+          </a:xfrm>
+          <a:prstGeom prst="rect">
+            <a:avLst/>
+          </a:prstGeom>
+          <a:noFill/>
+        </p:spPr>
+        <p:txBody>
+          <a:bodyPr wrap="square" rtlCol="0">
+            <a:spAutoFit/>
+          </a:bodyPr>
+          <a:lstStyle/>
+          <a:p>
+            <a:r>
+              <a:rPr lang="fr-FR" sz="3200" dirty="0">
+                <a:latin typeface="Nunito Sans" panose="00000500000000000000" pitchFamily="2" charset="0"/>
+              </a:rPr>
+              <a:t>L’équipe</a:t>
+            </a:r>
+          </a:p>
+        </p:txBody>
+      </p:sp>
+      <p:sp>
+        <p:nvSpPr>
+          <p:cNvPr id="10" name="Ellipse 9">
+            <a:extLst>
+              <a:ext uri="{FF2B5EF4-FFF2-40B4-BE49-F238E27FC236}">
+                <a16:creationId xmlns:a16="http://schemas.microsoft.com/office/drawing/2014/main" id="{3EAC4868-0EE5-44ED-92CB-65673674ABEC}"/>
               </a:ext>
             </a:extLst>
           </p:cNvPr>
@@ -6086,10 +6294,10 @@
         </p:nvSpPr>
         <p:spPr>
           <a:xfrm>
-            <a:off x="424070" y="1338468"/>
-            <a:ext cx="3419061" cy="5300869"/>
-          </a:xfrm>
-          <a:prstGeom prst="rect">
+            <a:off x="4154875" y="652317"/>
+            <a:ext cx="7164695" cy="6108127"/>
+          </a:xfrm>
+          <a:prstGeom prst="ellipse">
             <a:avLst/>
           </a:prstGeom>
           <a:noFill/>
@@ -6120,16 +6328,212 @@
           <a:lstStyle/>
           <a:p>
             <a:pPr algn="ctr"/>
-            <a:endParaRPr lang="fr-FR"/>
-          </a:p>
-        </p:txBody>
-      </p:sp>
-      <p:sp>
-        <p:nvSpPr>
-          <p:cNvPr id="52" name="Rectangle 51">
-            <a:extLst>
-              <a:ext uri="{FF2B5EF4-FFF2-40B4-BE49-F238E27FC236}">
-                <a16:creationId xmlns:a16="http://schemas.microsoft.com/office/drawing/2014/main" id="{F4219553-3EF8-4F77-906D-D140ECDCA0AC}"/>
+            <a:endParaRPr lang="fr-FR" dirty="0"/>
+          </a:p>
+        </p:txBody>
+      </p:sp>
+      <p:sp>
+        <p:nvSpPr>
+          <p:cNvPr id="11" name="ZoneTexte 10">
+            <a:extLst>
+              <a:ext uri="{FF2B5EF4-FFF2-40B4-BE49-F238E27FC236}">
+                <a16:creationId xmlns:a16="http://schemas.microsoft.com/office/drawing/2014/main" id="{29549137-4BCB-4BE4-9DDA-267CD579C587}"/>
+              </a:ext>
+            </a:extLst>
+          </p:cNvPr>
+          <p:cNvSpPr txBox="1"/>
+          <p:nvPr/>
+        </p:nvSpPr>
+        <p:spPr>
+          <a:xfrm>
+            <a:off x="4782541" y="3013669"/>
+            <a:ext cx="2626918" cy="1200329"/>
+          </a:xfrm>
+          <a:prstGeom prst="rect">
+            <a:avLst/>
+          </a:prstGeom>
+          <a:noFill/>
+        </p:spPr>
+        <p:txBody>
+          <a:bodyPr wrap="square" rtlCol="0">
+            <a:spAutoFit/>
+          </a:bodyPr>
+          <a:lstStyle/>
+          <a:p>
+            <a:r>
+              <a:rPr lang="fr-FR" dirty="0">
+                <a:latin typeface="Nunito Sans" panose="00000500000000000000" pitchFamily="2" charset="0"/>
+              </a:rPr>
+              <a:t>Intégration des articles</a:t>
+            </a:r>
+          </a:p>
+          <a:p>
+            <a:r>
+              <a:rPr lang="fr-FR" dirty="0">
+                <a:latin typeface="Nunito Sans" panose="00000500000000000000" pitchFamily="2" charset="0"/>
+              </a:rPr>
+              <a:t>Réflexions autour des zoning et wireframe</a:t>
+            </a:r>
+          </a:p>
+          <a:p>
+            <a:endParaRPr lang="fr-FR" dirty="0">
+              <a:latin typeface="Nunito Sans" panose="00000500000000000000" pitchFamily="2" charset="0"/>
+            </a:endParaRPr>
+          </a:p>
+        </p:txBody>
+      </p:sp>
+      <p:sp>
+        <p:nvSpPr>
+          <p:cNvPr id="12" name="ZoneTexte 11">
+            <a:extLst>
+              <a:ext uri="{FF2B5EF4-FFF2-40B4-BE49-F238E27FC236}">
+                <a16:creationId xmlns:a16="http://schemas.microsoft.com/office/drawing/2014/main" id="{E9CB8387-16D2-4096-A1D3-0A12F01C1C2D}"/>
+              </a:ext>
+            </a:extLst>
+          </p:cNvPr>
+          <p:cNvSpPr txBox="1"/>
+          <p:nvPr/>
+        </p:nvSpPr>
+        <p:spPr>
+          <a:xfrm>
+            <a:off x="760432" y="2413337"/>
+            <a:ext cx="3394443" cy="2031325"/>
+          </a:xfrm>
+          <a:prstGeom prst="rect">
+            <a:avLst/>
+          </a:prstGeom>
+          <a:noFill/>
+        </p:spPr>
+        <p:txBody>
+          <a:bodyPr wrap="square" rtlCol="0">
+            <a:spAutoFit/>
+          </a:bodyPr>
+          <a:lstStyle/>
+          <a:p>
+            <a:r>
+              <a:rPr lang="fr-FR" dirty="0">
+                <a:latin typeface="Nunito Sans" panose="00000500000000000000" pitchFamily="2" charset="0"/>
+              </a:rPr>
+              <a:t>Mise en place du style.css</a:t>
+            </a:r>
+          </a:p>
+          <a:p>
+            <a:r>
+              <a:rPr lang="fr-FR" dirty="0">
+                <a:latin typeface="Nunito Sans" panose="00000500000000000000" pitchFamily="2" charset="0"/>
+              </a:rPr>
+              <a:t>Relecture des articles</a:t>
+            </a:r>
+          </a:p>
+          <a:p>
+            <a:r>
+              <a:rPr lang="fr-FR" dirty="0">
+                <a:latin typeface="Nunito Sans" panose="00000500000000000000" pitchFamily="2" charset="0"/>
+              </a:rPr>
+              <a:t>Conception du logo</a:t>
+            </a:r>
+          </a:p>
+          <a:p>
+            <a:r>
+              <a:rPr lang="fr-FR" dirty="0">
+                <a:latin typeface="Nunito Sans" panose="00000500000000000000" pitchFamily="2" charset="0"/>
+              </a:rPr>
+              <a:t>Réalisations des zoning Réalisations des wireframe Réalisations des maquettes</a:t>
+            </a:r>
+          </a:p>
+          <a:p>
+            <a:r>
+              <a:rPr lang="fr-FR" dirty="0">
+                <a:latin typeface="Nunito Sans" panose="00000500000000000000" pitchFamily="2" charset="0"/>
+              </a:rPr>
+              <a:t>Conception du responsive</a:t>
+            </a:r>
+          </a:p>
+        </p:txBody>
+      </p:sp>
+      <p:sp>
+        <p:nvSpPr>
+          <p:cNvPr id="13" name="ZoneTexte 12">
+            <a:extLst>
+              <a:ext uri="{FF2B5EF4-FFF2-40B4-BE49-F238E27FC236}">
+                <a16:creationId xmlns:a16="http://schemas.microsoft.com/office/drawing/2014/main" id="{E3546C05-8A73-4C44-881B-E1273B516E56}"/>
+              </a:ext>
+            </a:extLst>
+          </p:cNvPr>
+          <p:cNvSpPr txBox="1"/>
+          <p:nvPr/>
+        </p:nvSpPr>
+        <p:spPr>
+          <a:xfrm>
+            <a:off x="7549318" y="2413337"/>
+            <a:ext cx="4024963" cy="2308324"/>
+          </a:xfrm>
+          <a:prstGeom prst="rect">
+            <a:avLst/>
+          </a:prstGeom>
+          <a:noFill/>
+        </p:spPr>
+        <p:txBody>
+          <a:bodyPr wrap="square" rtlCol="0">
+            <a:spAutoFit/>
+          </a:bodyPr>
+          <a:lstStyle/>
+          <a:p>
+            <a:r>
+              <a:rPr lang="fr-FR" dirty="0">
+                <a:latin typeface="Nunito Sans" panose="00000500000000000000" pitchFamily="2" charset="0"/>
+              </a:rPr>
+              <a:t>Rédaction des pages ‘’à propos’’, ‘’contact’’ et ‘’mentions légales’’</a:t>
+            </a:r>
+          </a:p>
+          <a:p>
+            <a:r>
+              <a:rPr lang="fr-FR" dirty="0">
+                <a:latin typeface="Nunito Sans" panose="00000500000000000000" pitchFamily="2" charset="0"/>
+              </a:rPr>
+              <a:t>Rédaction du sitemap.xml</a:t>
+            </a:r>
+          </a:p>
+          <a:p>
+            <a:r>
+              <a:rPr lang="fr-FR" dirty="0">
+                <a:latin typeface="Nunito Sans" panose="00000500000000000000" pitchFamily="2" charset="0"/>
+              </a:rPr>
+              <a:t>Rédaction du robot.txt</a:t>
+            </a:r>
+          </a:p>
+          <a:p>
+            <a:r>
+              <a:rPr lang="fr-FR" dirty="0">
+                <a:latin typeface="Nunito Sans" panose="00000500000000000000" pitchFamily="2" charset="0"/>
+              </a:rPr>
+              <a:t>Dessin des visuels des rubriques</a:t>
+            </a:r>
+          </a:p>
+          <a:p>
+            <a:r>
+              <a:rPr lang="fr-FR" dirty="0">
+                <a:latin typeface="Nunito Sans" panose="00000500000000000000" pitchFamily="2" charset="0"/>
+              </a:rPr>
+              <a:t>Rédaction du dossier de conception</a:t>
+            </a:r>
+          </a:p>
+          <a:p>
+            <a:r>
+              <a:rPr lang="fr-FR" dirty="0">
+                <a:latin typeface="Nunito Sans" panose="00000500000000000000" pitchFamily="2" charset="0"/>
+              </a:rPr>
+              <a:t>Organisation du repository sur GitHub</a:t>
+            </a:r>
+          </a:p>
+        </p:txBody>
+      </p:sp>
+      <p:sp>
+        <p:nvSpPr>
+          <p:cNvPr id="14" name="Ellipse 13">
+            <a:extLst>
+              <a:ext uri="{FF2B5EF4-FFF2-40B4-BE49-F238E27FC236}">
+                <a16:creationId xmlns:a16="http://schemas.microsoft.com/office/drawing/2014/main" id="{DFF6BC69-14B0-485B-8BB6-FF5A38CF0E95}"/>
               </a:ext>
             </a:extLst>
           </p:cNvPr>
@@ -6138,10 +6542,10 @@
         </p:nvSpPr>
         <p:spPr>
           <a:xfrm>
-            <a:off x="4386469" y="1338468"/>
-            <a:ext cx="3419061" cy="5300869"/>
-          </a:xfrm>
-          <a:prstGeom prst="rect">
+            <a:off x="297897" y="682331"/>
+            <a:ext cx="7164695" cy="6078113"/>
+          </a:xfrm>
+          <a:prstGeom prst="ellipse">
             <a:avLst/>
           </a:prstGeom>
           <a:noFill/>
@@ -6172,224 +6576,16 @@
           <a:lstStyle/>
           <a:p>
             <a:pPr algn="ctr"/>
-            <a:endParaRPr lang="fr-FR"/>
-          </a:p>
-        </p:txBody>
-      </p:sp>
-      <p:sp>
-        <p:nvSpPr>
-          <p:cNvPr id="53" name="Rectangle 52">
-            <a:extLst>
-              <a:ext uri="{FF2B5EF4-FFF2-40B4-BE49-F238E27FC236}">
-                <a16:creationId xmlns:a16="http://schemas.microsoft.com/office/drawing/2014/main" id="{E0BC3746-8CA3-44C7-9C76-7E1E5C1A10F2}"/>
-              </a:ext>
-            </a:extLst>
-          </p:cNvPr>
-          <p:cNvSpPr/>
-          <p:nvPr/>
-        </p:nvSpPr>
-        <p:spPr>
-          <a:xfrm>
-            <a:off x="8348869" y="1338468"/>
-            <a:ext cx="3419061" cy="5300869"/>
-          </a:xfrm>
-          <a:prstGeom prst="rect">
-            <a:avLst/>
-          </a:prstGeom>
-          <a:noFill/>
-          <a:ln>
-            <a:solidFill>
-              <a:schemeClr val="tx1"/>
-            </a:solidFill>
-          </a:ln>
-        </p:spPr>
-        <p:style>
-          <a:lnRef idx="2">
-            <a:schemeClr val="accent1">
-              <a:shade val="50000"/>
-            </a:schemeClr>
-          </a:lnRef>
-          <a:fillRef idx="1">
-            <a:schemeClr val="accent1"/>
-          </a:fillRef>
-          <a:effectRef idx="0">
-            <a:schemeClr val="accent1"/>
-          </a:effectRef>
-          <a:fontRef idx="minor">
-            <a:schemeClr val="lt1"/>
-          </a:fontRef>
-        </p:style>
-        <p:txBody>
-          <a:bodyPr rtlCol="0" anchor="ctr"/>
-          <a:lstStyle/>
-          <a:p>
-            <a:pPr algn="ctr"/>
-            <a:endParaRPr lang="fr-FR"/>
-          </a:p>
-        </p:txBody>
-      </p:sp>
-      <p:sp>
-        <p:nvSpPr>
-          <p:cNvPr id="55" name="Rectangle 54">
-            <a:extLst>
-              <a:ext uri="{FF2B5EF4-FFF2-40B4-BE49-F238E27FC236}">
-                <a16:creationId xmlns:a16="http://schemas.microsoft.com/office/drawing/2014/main" id="{E53BC51B-B7F5-40B0-9E8A-1439F5F58E42}"/>
-              </a:ext>
-            </a:extLst>
-          </p:cNvPr>
-          <p:cNvSpPr/>
-          <p:nvPr/>
-        </p:nvSpPr>
-        <p:spPr>
-          <a:xfrm>
-            <a:off x="695738" y="1557132"/>
-            <a:ext cx="2869097" cy="3372678"/>
-          </a:xfrm>
-          <a:prstGeom prst="rect">
-            <a:avLst/>
-          </a:prstGeom>
-          <a:noFill/>
-          <a:ln>
-            <a:solidFill>
-              <a:schemeClr val="tx1"/>
-            </a:solidFill>
-          </a:ln>
-        </p:spPr>
-        <p:style>
-          <a:lnRef idx="2">
-            <a:schemeClr val="accent1">
-              <a:shade val="50000"/>
-            </a:schemeClr>
-          </a:lnRef>
-          <a:fillRef idx="1">
-            <a:schemeClr val="accent1"/>
-          </a:fillRef>
-          <a:effectRef idx="0">
-            <a:schemeClr val="accent1"/>
-          </a:effectRef>
-          <a:fontRef idx="minor">
-            <a:schemeClr val="lt1"/>
-          </a:fontRef>
-        </p:style>
-        <p:txBody>
-          <a:bodyPr rtlCol="0" anchor="ctr"/>
-          <a:lstStyle/>
-          <a:p>
-            <a:pPr algn="ctr"/>
-            <a:endParaRPr lang="fr-FR"/>
-          </a:p>
-        </p:txBody>
-      </p:sp>
-      <p:sp>
-        <p:nvSpPr>
-          <p:cNvPr id="56" name="Rectangle 55">
-            <a:extLst>
-              <a:ext uri="{FF2B5EF4-FFF2-40B4-BE49-F238E27FC236}">
-                <a16:creationId xmlns:a16="http://schemas.microsoft.com/office/drawing/2014/main" id="{36549CD0-44F1-40A8-9476-EE331D0E4475}"/>
-              </a:ext>
-            </a:extLst>
-          </p:cNvPr>
-          <p:cNvSpPr/>
-          <p:nvPr/>
-        </p:nvSpPr>
-        <p:spPr>
-          <a:xfrm>
-            <a:off x="8623850" y="1557132"/>
-            <a:ext cx="2869097" cy="3372678"/>
-          </a:xfrm>
-          <a:prstGeom prst="rect">
-            <a:avLst/>
-          </a:prstGeom>
-          <a:noFill/>
-          <a:ln>
-            <a:solidFill>
-              <a:schemeClr val="tx1"/>
-            </a:solidFill>
-          </a:ln>
-        </p:spPr>
-        <p:style>
-          <a:lnRef idx="2">
-            <a:schemeClr val="accent1">
-              <a:shade val="50000"/>
-            </a:schemeClr>
-          </a:lnRef>
-          <a:fillRef idx="1">
-            <a:schemeClr val="accent1"/>
-          </a:fillRef>
-          <a:effectRef idx="0">
-            <a:schemeClr val="accent1"/>
-          </a:effectRef>
-          <a:fontRef idx="minor">
-            <a:schemeClr val="lt1"/>
-          </a:fontRef>
-        </p:style>
-        <p:txBody>
-          <a:bodyPr rtlCol="0" anchor="ctr"/>
-          <a:lstStyle/>
-          <a:p>
-            <a:pPr algn="ctr"/>
-            <a:endParaRPr lang="fr-FR"/>
-          </a:p>
-        </p:txBody>
-      </p:sp>
-      <p:sp>
-        <p:nvSpPr>
-          <p:cNvPr id="58" name="Rectangle 57">
-            <a:extLst>
-              <a:ext uri="{FF2B5EF4-FFF2-40B4-BE49-F238E27FC236}">
-                <a16:creationId xmlns:a16="http://schemas.microsoft.com/office/drawing/2014/main" id="{18F54FB1-C328-4445-B4B8-AE121AC446C0}"/>
-              </a:ext>
-            </a:extLst>
-          </p:cNvPr>
-          <p:cNvSpPr/>
-          <p:nvPr/>
-        </p:nvSpPr>
-        <p:spPr>
-          <a:xfrm>
-            <a:off x="4661450" y="1557132"/>
-            <a:ext cx="2869097" cy="3372678"/>
-          </a:xfrm>
-          <a:prstGeom prst="rect">
-            <a:avLst/>
-          </a:prstGeom>
-          <a:noFill/>
-          <a:ln>
-            <a:solidFill>
-              <a:schemeClr val="tx1"/>
-            </a:solidFill>
-          </a:ln>
-        </p:spPr>
-        <p:style>
-          <a:lnRef idx="2">
-            <a:schemeClr val="accent1">
-              <a:shade val="50000"/>
-            </a:schemeClr>
-          </a:lnRef>
-          <a:fillRef idx="1">
-            <a:schemeClr val="accent1"/>
-          </a:fillRef>
-          <a:effectRef idx="0">
-            <a:schemeClr val="accent1"/>
-          </a:effectRef>
-          <a:fontRef idx="minor">
-            <a:schemeClr val="lt1"/>
-          </a:fontRef>
-        </p:style>
-        <p:txBody>
-          <a:bodyPr rtlCol="0" anchor="ctr"/>
-          <a:lstStyle/>
-          <a:p>
-            <a:pPr algn="ctr"/>
-            <a:endParaRPr lang="fr-FR"/>
-          </a:p>
-        </p:txBody>
-      </p:sp>
-      <p:sp>
-        <p:nvSpPr>
-          <p:cNvPr id="59" name="ZoneTexte 58">
-            <a:extLst>
-              <a:ext uri="{FF2B5EF4-FFF2-40B4-BE49-F238E27FC236}">
-                <a16:creationId xmlns:a16="http://schemas.microsoft.com/office/drawing/2014/main" id="{B8B4C23B-5AE8-4936-905F-2A0EC5568E70}"/>
+            <a:endParaRPr lang="fr-FR" dirty="0"/>
+          </a:p>
+        </p:txBody>
+      </p:sp>
+      <p:sp>
+        <p:nvSpPr>
+          <p:cNvPr id="15" name="ZoneTexte 14">
+            <a:extLst>
+              <a:ext uri="{FF2B5EF4-FFF2-40B4-BE49-F238E27FC236}">
+                <a16:creationId xmlns:a16="http://schemas.microsoft.com/office/drawing/2014/main" id="{0BE129DD-D479-42ED-B633-881C37F8BA1F}"/>
               </a:ext>
             </a:extLst>
           </p:cNvPr>
@@ -6398,8 +6594,8 @@
         </p:nvSpPr>
         <p:spPr>
           <a:xfrm>
-            <a:off x="77948" y="67542"/>
-            <a:ext cx="3394444" cy="584775"/>
+            <a:off x="2183022" y="1327773"/>
+            <a:ext cx="3394443" cy="369332"/>
           </a:xfrm>
           <a:prstGeom prst="rect">
             <a:avLst/>
@@ -6413,18 +6609,73 @@
           <a:lstStyle/>
           <a:p>
             <a:r>
-              <a:rPr lang="fr-FR" sz="3200" dirty="0">
+              <a:rPr lang="fr-FR" dirty="0">
                 <a:latin typeface="Nunito Sans" panose="00000500000000000000" pitchFamily="2" charset="0"/>
               </a:rPr>
-              <a:t>Couleurs</a:t>
-            </a:r>
+              <a:t>Luc </a:t>
+            </a:r>
+            <a:r>
+              <a:rPr lang="fr-FR" dirty="0" err="1">
+                <a:latin typeface="Nunito Sans" panose="00000500000000000000" pitchFamily="2" charset="0"/>
+              </a:rPr>
+              <a:t>Leneuf</a:t>
+            </a:r>
+            <a:endParaRPr lang="fr-FR" dirty="0">
+              <a:latin typeface="Nunito Sans" panose="00000500000000000000" pitchFamily="2" charset="0"/>
+            </a:endParaRPr>
+          </a:p>
+        </p:txBody>
+      </p:sp>
+      <p:sp>
+        <p:nvSpPr>
+          <p:cNvPr id="17" name="ZoneTexte 16">
+            <a:extLst>
+              <a:ext uri="{FF2B5EF4-FFF2-40B4-BE49-F238E27FC236}">
+                <a16:creationId xmlns:a16="http://schemas.microsoft.com/office/drawing/2014/main" id="{FF96A14E-8A09-4A6D-99BD-EAC270AADC49}"/>
+              </a:ext>
+            </a:extLst>
+          </p:cNvPr>
+          <p:cNvSpPr txBox="1"/>
+          <p:nvPr/>
+        </p:nvSpPr>
+        <p:spPr>
+          <a:xfrm>
+            <a:off x="7026377" y="1327773"/>
+            <a:ext cx="3394443" cy="369332"/>
+          </a:xfrm>
+          <a:prstGeom prst="rect">
+            <a:avLst/>
+          </a:prstGeom>
+          <a:noFill/>
+        </p:spPr>
+        <p:txBody>
+          <a:bodyPr wrap="square" rtlCol="0">
+            <a:spAutoFit/>
+          </a:bodyPr>
+          <a:lstStyle/>
+          <a:p>
+            <a:r>
+              <a:rPr lang="fr-FR" dirty="0">
+                <a:latin typeface="Nunito Sans" panose="00000500000000000000" pitchFamily="2" charset="0"/>
+              </a:rPr>
+              <a:t>Nicolas </a:t>
+            </a:r>
+            <a:r>
+              <a:rPr lang="fr-FR" dirty="0" err="1">
+                <a:latin typeface="Nunito Sans" panose="00000500000000000000" pitchFamily="2" charset="0"/>
+              </a:rPr>
+              <a:t>Maës</a:t>
+            </a:r>
+            <a:endParaRPr lang="fr-FR" dirty="0">
+              <a:latin typeface="Nunito Sans" panose="00000500000000000000" pitchFamily="2" charset="0"/>
+            </a:endParaRPr>
           </a:p>
         </p:txBody>
       </p:sp>
     </p:spTree>
     <p:extLst>
       <p:ext uri="{BB962C8B-B14F-4D97-AF65-F5344CB8AC3E}">
-        <p14:creationId xmlns:p14="http://schemas.microsoft.com/office/powerpoint/2010/main" val="3803163889"/>
+        <p14:creationId xmlns:p14="http://schemas.microsoft.com/office/powerpoint/2010/main" val="3628958432"/>
       </p:ext>
     </p:extLst>
   </p:cSld>
@@ -6489,6 +6740,318 @@
       </p:pic>
       <p:sp>
         <p:nvSpPr>
+          <p:cNvPr id="3" name="Rectangle 2">
+            <a:extLst>
+              <a:ext uri="{FF2B5EF4-FFF2-40B4-BE49-F238E27FC236}">
+                <a16:creationId xmlns:a16="http://schemas.microsoft.com/office/drawing/2014/main" id="{0176022A-89EC-4566-9AA8-A0BFDC24DEFE}"/>
+              </a:ext>
+            </a:extLst>
+          </p:cNvPr>
+          <p:cNvSpPr/>
+          <p:nvPr/>
+        </p:nvSpPr>
+        <p:spPr>
+          <a:xfrm>
+            <a:off x="424070" y="1338468"/>
+            <a:ext cx="3419061" cy="5300869"/>
+          </a:xfrm>
+          <a:prstGeom prst="rect">
+            <a:avLst/>
+          </a:prstGeom>
+          <a:noFill/>
+          <a:ln>
+            <a:solidFill>
+              <a:schemeClr val="tx1"/>
+            </a:solidFill>
+          </a:ln>
+        </p:spPr>
+        <p:style>
+          <a:lnRef idx="2">
+            <a:schemeClr val="accent1">
+              <a:shade val="50000"/>
+            </a:schemeClr>
+          </a:lnRef>
+          <a:fillRef idx="1">
+            <a:schemeClr val="accent1"/>
+          </a:fillRef>
+          <a:effectRef idx="0">
+            <a:schemeClr val="accent1"/>
+          </a:effectRef>
+          <a:fontRef idx="minor">
+            <a:schemeClr val="lt1"/>
+          </a:fontRef>
+        </p:style>
+        <p:txBody>
+          <a:bodyPr rtlCol="0" anchor="ctr"/>
+          <a:lstStyle/>
+          <a:p>
+            <a:pPr algn="ctr"/>
+            <a:endParaRPr lang="fr-FR"/>
+          </a:p>
+        </p:txBody>
+      </p:sp>
+      <p:sp>
+        <p:nvSpPr>
+          <p:cNvPr id="52" name="Rectangle 51">
+            <a:extLst>
+              <a:ext uri="{FF2B5EF4-FFF2-40B4-BE49-F238E27FC236}">
+                <a16:creationId xmlns:a16="http://schemas.microsoft.com/office/drawing/2014/main" id="{F4219553-3EF8-4F77-906D-D140ECDCA0AC}"/>
+              </a:ext>
+            </a:extLst>
+          </p:cNvPr>
+          <p:cNvSpPr/>
+          <p:nvPr/>
+        </p:nvSpPr>
+        <p:spPr>
+          <a:xfrm>
+            <a:off x="4386469" y="1338468"/>
+            <a:ext cx="3419061" cy="5300869"/>
+          </a:xfrm>
+          <a:prstGeom prst="rect">
+            <a:avLst/>
+          </a:prstGeom>
+          <a:noFill/>
+          <a:ln>
+            <a:solidFill>
+              <a:schemeClr val="tx1"/>
+            </a:solidFill>
+          </a:ln>
+        </p:spPr>
+        <p:style>
+          <a:lnRef idx="2">
+            <a:schemeClr val="accent1">
+              <a:shade val="50000"/>
+            </a:schemeClr>
+          </a:lnRef>
+          <a:fillRef idx="1">
+            <a:schemeClr val="accent1"/>
+          </a:fillRef>
+          <a:effectRef idx="0">
+            <a:schemeClr val="accent1"/>
+          </a:effectRef>
+          <a:fontRef idx="minor">
+            <a:schemeClr val="lt1"/>
+          </a:fontRef>
+        </p:style>
+        <p:txBody>
+          <a:bodyPr rtlCol="0" anchor="ctr"/>
+          <a:lstStyle/>
+          <a:p>
+            <a:pPr algn="ctr"/>
+            <a:endParaRPr lang="fr-FR"/>
+          </a:p>
+        </p:txBody>
+      </p:sp>
+      <p:sp>
+        <p:nvSpPr>
+          <p:cNvPr id="53" name="Rectangle 52">
+            <a:extLst>
+              <a:ext uri="{FF2B5EF4-FFF2-40B4-BE49-F238E27FC236}">
+                <a16:creationId xmlns:a16="http://schemas.microsoft.com/office/drawing/2014/main" id="{E0BC3746-8CA3-44C7-9C76-7E1E5C1A10F2}"/>
+              </a:ext>
+            </a:extLst>
+          </p:cNvPr>
+          <p:cNvSpPr/>
+          <p:nvPr/>
+        </p:nvSpPr>
+        <p:spPr>
+          <a:xfrm>
+            <a:off x="8348869" y="1338468"/>
+            <a:ext cx="3419061" cy="5300869"/>
+          </a:xfrm>
+          <a:prstGeom prst="rect">
+            <a:avLst/>
+          </a:prstGeom>
+          <a:noFill/>
+          <a:ln>
+            <a:solidFill>
+              <a:schemeClr val="tx1"/>
+            </a:solidFill>
+          </a:ln>
+        </p:spPr>
+        <p:style>
+          <a:lnRef idx="2">
+            <a:schemeClr val="accent1">
+              <a:shade val="50000"/>
+            </a:schemeClr>
+          </a:lnRef>
+          <a:fillRef idx="1">
+            <a:schemeClr val="accent1"/>
+          </a:fillRef>
+          <a:effectRef idx="0">
+            <a:schemeClr val="accent1"/>
+          </a:effectRef>
+          <a:fontRef idx="minor">
+            <a:schemeClr val="lt1"/>
+          </a:fontRef>
+        </p:style>
+        <p:txBody>
+          <a:bodyPr rtlCol="0" anchor="ctr"/>
+          <a:lstStyle/>
+          <a:p>
+            <a:pPr algn="ctr"/>
+            <a:endParaRPr lang="fr-FR"/>
+          </a:p>
+        </p:txBody>
+      </p:sp>
+      <p:sp>
+        <p:nvSpPr>
+          <p:cNvPr id="55" name="Rectangle 54">
+            <a:extLst>
+              <a:ext uri="{FF2B5EF4-FFF2-40B4-BE49-F238E27FC236}">
+                <a16:creationId xmlns:a16="http://schemas.microsoft.com/office/drawing/2014/main" id="{E53BC51B-B7F5-40B0-9E8A-1439F5F58E42}"/>
+              </a:ext>
+            </a:extLst>
+          </p:cNvPr>
+          <p:cNvSpPr/>
+          <p:nvPr/>
+        </p:nvSpPr>
+        <p:spPr>
+          <a:xfrm>
+            <a:off x="695738" y="1557132"/>
+            <a:ext cx="2869097" cy="3372678"/>
+          </a:xfrm>
+          <a:prstGeom prst="rect">
+            <a:avLst/>
+          </a:prstGeom>
+          <a:noFill/>
+          <a:ln>
+            <a:solidFill>
+              <a:schemeClr val="tx1"/>
+            </a:solidFill>
+          </a:ln>
+        </p:spPr>
+        <p:style>
+          <a:lnRef idx="2">
+            <a:schemeClr val="accent1">
+              <a:shade val="50000"/>
+            </a:schemeClr>
+          </a:lnRef>
+          <a:fillRef idx="1">
+            <a:schemeClr val="accent1"/>
+          </a:fillRef>
+          <a:effectRef idx="0">
+            <a:schemeClr val="accent1"/>
+          </a:effectRef>
+          <a:fontRef idx="minor">
+            <a:schemeClr val="lt1"/>
+          </a:fontRef>
+        </p:style>
+        <p:txBody>
+          <a:bodyPr rtlCol="0" anchor="ctr"/>
+          <a:lstStyle/>
+          <a:p>
+            <a:pPr algn="ctr"/>
+            <a:endParaRPr lang="fr-FR"/>
+          </a:p>
+        </p:txBody>
+      </p:sp>
+      <p:sp>
+        <p:nvSpPr>
+          <p:cNvPr id="56" name="Rectangle 55">
+            <a:extLst>
+              <a:ext uri="{FF2B5EF4-FFF2-40B4-BE49-F238E27FC236}">
+                <a16:creationId xmlns:a16="http://schemas.microsoft.com/office/drawing/2014/main" id="{36549CD0-44F1-40A8-9476-EE331D0E4475}"/>
+              </a:ext>
+            </a:extLst>
+          </p:cNvPr>
+          <p:cNvSpPr/>
+          <p:nvPr/>
+        </p:nvSpPr>
+        <p:spPr>
+          <a:xfrm>
+            <a:off x="8623850" y="1557132"/>
+            <a:ext cx="2869097" cy="3372678"/>
+          </a:xfrm>
+          <a:prstGeom prst="rect">
+            <a:avLst/>
+          </a:prstGeom>
+          <a:noFill/>
+          <a:ln>
+            <a:solidFill>
+              <a:schemeClr val="tx1"/>
+            </a:solidFill>
+          </a:ln>
+        </p:spPr>
+        <p:style>
+          <a:lnRef idx="2">
+            <a:schemeClr val="accent1">
+              <a:shade val="50000"/>
+            </a:schemeClr>
+          </a:lnRef>
+          <a:fillRef idx="1">
+            <a:schemeClr val="accent1"/>
+          </a:fillRef>
+          <a:effectRef idx="0">
+            <a:schemeClr val="accent1"/>
+          </a:effectRef>
+          <a:fontRef idx="minor">
+            <a:schemeClr val="lt1"/>
+          </a:fontRef>
+        </p:style>
+        <p:txBody>
+          <a:bodyPr rtlCol="0" anchor="ctr"/>
+          <a:lstStyle/>
+          <a:p>
+            <a:pPr algn="ctr"/>
+            <a:endParaRPr lang="fr-FR"/>
+          </a:p>
+        </p:txBody>
+      </p:sp>
+      <p:sp>
+        <p:nvSpPr>
+          <p:cNvPr id="58" name="Rectangle 57">
+            <a:extLst>
+              <a:ext uri="{FF2B5EF4-FFF2-40B4-BE49-F238E27FC236}">
+                <a16:creationId xmlns:a16="http://schemas.microsoft.com/office/drawing/2014/main" id="{18F54FB1-C328-4445-B4B8-AE121AC446C0}"/>
+              </a:ext>
+            </a:extLst>
+          </p:cNvPr>
+          <p:cNvSpPr/>
+          <p:nvPr/>
+        </p:nvSpPr>
+        <p:spPr>
+          <a:xfrm>
+            <a:off x="4661450" y="1557132"/>
+            <a:ext cx="2869097" cy="3372678"/>
+          </a:xfrm>
+          <a:prstGeom prst="rect">
+            <a:avLst/>
+          </a:prstGeom>
+          <a:noFill/>
+          <a:ln>
+            <a:solidFill>
+              <a:schemeClr val="tx1"/>
+            </a:solidFill>
+          </a:ln>
+        </p:spPr>
+        <p:style>
+          <a:lnRef idx="2">
+            <a:schemeClr val="accent1">
+              <a:shade val="50000"/>
+            </a:schemeClr>
+          </a:lnRef>
+          <a:fillRef idx="1">
+            <a:schemeClr val="accent1"/>
+          </a:fillRef>
+          <a:effectRef idx="0">
+            <a:schemeClr val="accent1"/>
+          </a:effectRef>
+          <a:fontRef idx="minor">
+            <a:schemeClr val="lt1"/>
+          </a:fontRef>
+        </p:style>
+        <p:txBody>
+          <a:bodyPr rtlCol="0" anchor="ctr"/>
+          <a:lstStyle/>
+          <a:p>
+            <a:pPr algn="ctr"/>
+            <a:endParaRPr lang="fr-FR"/>
+          </a:p>
+        </p:txBody>
+      </p:sp>
+      <p:sp>
+        <p:nvSpPr>
           <p:cNvPr id="59" name="ZoneTexte 58">
             <a:extLst>
               <a:ext uri="{FF2B5EF4-FFF2-40B4-BE49-F238E27FC236}">
@@ -6519,130 +7082,7 @@
               <a:rPr lang="fr-FR" sz="3200" dirty="0">
                 <a:latin typeface="Nunito Sans" panose="00000500000000000000" pitchFamily="2" charset="0"/>
               </a:rPr>
-              <a:t>Polices</a:t>
-            </a:r>
-          </a:p>
-        </p:txBody>
-      </p:sp>
-      <p:sp>
-        <p:nvSpPr>
-          <p:cNvPr id="2" name="ZoneTexte 1">
-            <a:extLst>
-              <a:ext uri="{FF2B5EF4-FFF2-40B4-BE49-F238E27FC236}">
-                <a16:creationId xmlns:a16="http://schemas.microsoft.com/office/drawing/2014/main" id="{3E649FCF-34D9-4D09-970A-6871F7D18EC1}"/>
-              </a:ext>
-            </a:extLst>
-          </p:cNvPr>
-          <p:cNvSpPr txBox="1"/>
-          <p:nvPr/>
-        </p:nvSpPr>
-        <p:spPr>
-          <a:xfrm>
-            <a:off x="4711700" y="1646245"/>
-            <a:ext cx="2768600" cy="646331"/>
-          </a:xfrm>
-          <a:prstGeom prst="rect">
-            <a:avLst/>
-          </a:prstGeom>
-          <a:noFill/>
-        </p:spPr>
-        <p:txBody>
-          <a:bodyPr wrap="square" rtlCol="0">
-            <a:spAutoFit/>
-          </a:bodyPr>
-          <a:lstStyle/>
-          <a:p>
-            <a:r>
-              <a:rPr lang="fr-FR" sz="3600" b="1" dirty="0" err="1">
-                <a:latin typeface="Nunito Sans" panose="00000500000000000000" pitchFamily="2" charset="0"/>
-              </a:rPr>
-              <a:t>Nunito</a:t>
-            </a:r>
-            <a:r>
-              <a:rPr lang="fr-FR" sz="3600" b="1" dirty="0">
-                <a:latin typeface="Nunito Sans" panose="00000500000000000000" pitchFamily="2" charset="0"/>
-              </a:rPr>
-              <a:t> Sans</a:t>
-            </a:r>
-          </a:p>
-        </p:txBody>
-      </p:sp>
-      <p:sp>
-        <p:nvSpPr>
-          <p:cNvPr id="12" name="ZoneTexte 11">
-            <a:extLst>
-              <a:ext uri="{FF2B5EF4-FFF2-40B4-BE49-F238E27FC236}">
-                <a16:creationId xmlns:a16="http://schemas.microsoft.com/office/drawing/2014/main" id="{8C9D006B-42EF-4731-A26F-79F97E5DB238}"/>
-              </a:ext>
-            </a:extLst>
-          </p:cNvPr>
-          <p:cNvSpPr txBox="1"/>
-          <p:nvPr/>
-        </p:nvSpPr>
-        <p:spPr>
-          <a:xfrm>
-            <a:off x="1742546" y="3286503"/>
-            <a:ext cx="8706908" cy="2308324"/>
-          </a:xfrm>
-          <a:prstGeom prst="rect">
-            <a:avLst/>
-          </a:prstGeom>
-          <a:noFill/>
-        </p:spPr>
-        <p:txBody>
-          <a:bodyPr wrap="square" rtlCol="0">
-            <a:spAutoFit/>
-          </a:bodyPr>
-          <a:lstStyle/>
-          <a:p>
-            <a:pPr algn="ctr"/>
-            <a:r>
-              <a:rPr lang="fr-FR" sz="3600" dirty="0" err="1">
-                <a:latin typeface="Nunito Sans" panose="00000500000000000000" pitchFamily="2" charset="0"/>
-              </a:rPr>
-              <a:t>abcdefghijklmnopqrstuvwxyz</a:t>
-            </a:r>
-            <a:endParaRPr lang="fr-FR" sz="3600" dirty="0">
-              <a:latin typeface="Nunito Sans" panose="00000500000000000000" pitchFamily="2" charset="0"/>
-            </a:endParaRPr>
-          </a:p>
-          <a:p>
-            <a:pPr algn="ctr"/>
-            <a:r>
-              <a:rPr lang="fr-FR" sz="3600" dirty="0">
-                <a:latin typeface="Nunito Sans" panose="00000500000000000000" pitchFamily="2" charset="0"/>
-              </a:rPr>
-              <a:t>ABCDEFGHIJKLMNOPQRSTUVWSYX</a:t>
-            </a:r>
-          </a:p>
-          <a:p>
-            <a:pPr algn="ctr"/>
-            <a:r>
-              <a:rPr lang="fr-FR" sz="3600" dirty="0">
-                <a:latin typeface="Nunito Sans" panose="00000500000000000000" pitchFamily="2" charset="0"/>
-              </a:rPr>
-              <a:t>123456789</a:t>
-            </a:r>
-          </a:p>
-          <a:p>
-            <a:pPr algn="ctr"/>
-            <a:r>
-              <a:rPr lang="fr-FR" sz="3600" dirty="0">
-                <a:latin typeface="Nunito Sans" panose="00000500000000000000" pitchFamily="2" charset="0"/>
-              </a:rPr>
-              <a:t>« !?()</a:t>
-            </a:r>
-            <a:r>
-              <a:rPr lang="fr-FR" sz="3600" dirty="0" err="1">
-                <a:latin typeface="Nunito Sans" panose="00000500000000000000" pitchFamily="2" charset="0"/>
-              </a:rPr>
-              <a:t>àçéù</a:t>
-            </a:r>
-            <a:r>
-              <a:rPr lang="fr-FR" sz="3600" dirty="0">
-                <a:latin typeface="Nunito Sans" panose="00000500000000000000" pitchFamily="2" charset="0"/>
-              </a:rPr>
-              <a:t>#»</a:t>
+              <a:t>Couleurs</a:t>
             </a:r>
           </a:p>
         </p:txBody>
@@ -6650,7 +7090,7 @@
     </p:spTree>
     <p:extLst>
       <p:ext uri="{BB962C8B-B14F-4D97-AF65-F5344CB8AC3E}">
-        <p14:creationId xmlns:p14="http://schemas.microsoft.com/office/powerpoint/2010/main" val="993811677"/>
+        <p14:creationId xmlns:p14="http://schemas.microsoft.com/office/powerpoint/2010/main" val="3803163889"/>
       </p:ext>
     </p:extLst>
   </p:cSld>
@@ -6715,10 +7155,10 @@
       </p:pic>
       <p:sp>
         <p:nvSpPr>
-          <p:cNvPr id="9" name="ZoneTexte 8">
-            <a:extLst>
-              <a:ext uri="{FF2B5EF4-FFF2-40B4-BE49-F238E27FC236}">
-                <a16:creationId xmlns:a16="http://schemas.microsoft.com/office/drawing/2014/main" id="{29E704EF-0DC2-4823-97A3-6694FCC299FE}"/>
+          <p:cNvPr id="59" name="ZoneTexte 58">
+            <a:extLst>
+              <a:ext uri="{FF2B5EF4-FFF2-40B4-BE49-F238E27FC236}">
+                <a16:creationId xmlns:a16="http://schemas.microsoft.com/office/drawing/2014/main" id="{B8B4C23B-5AE8-4936-905F-2A0EC5568E70}"/>
               </a:ext>
             </a:extLst>
           </p:cNvPr>
@@ -6745,7 +7185,130 @@
               <a:rPr lang="fr-FR" sz="3200" dirty="0">
                 <a:latin typeface="Nunito Sans" panose="00000500000000000000" pitchFamily="2" charset="0"/>
               </a:rPr>
-              <a:t>Zoning</a:t>
+              <a:t>Polices</a:t>
+            </a:r>
+          </a:p>
+        </p:txBody>
+      </p:sp>
+      <p:sp>
+        <p:nvSpPr>
+          <p:cNvPr id="2" name="ZoneTexte 1">
+            <a:extLst>
+              <a:ext uri="{FF2B5EF4-FFF2-40B4-BE49-F238E27FC236}">
+                <a16:creationId xmlns:a16="http://schemas.microsoft.com/office/drawing/2014/main" id="{3E649FCF-34D9-4D09-970A-6871F7D18EC1}"/>
+              </a:ext>
+            </a:extLst>
+          </p:cNvPr>
+          <p:cNvSpPr txBox="1"/>
+          <p:nvPr/>
+        </p:nvSpPr>
+        <p:spPr>
+          <a:xfrm>
+            <a:off x="4711700" y="1646245"/>
+            <a:ext cx="2768600" cy="646331"/>
+          </a:xfrm>
+          <a:prstGeom prst="rect">
+            <a:avLst/>
+          </a:prstGeom>
+          <a:noFill/>
+        </p:spPr>
+        <p:txBody>
+          <a:bodyPr wrap="square" rtlCol="0">
+            <a:spAutoFit/>
+          </a:bodyPr>
+          <a:lstStyle/>
+          <a:p>
+            <a:r>
+              <a:rPr lang="fr-FR" sz="3600" b="1" dirty="0" err="1">
+                <a:latin typeface="Nunito Sans" panose="00000500000000000000" pitchFamily="2" charset="0"/>
+              </a:rPr>
+              <a:t>Nunito</a:t>
+            </a:r>
+            <a:r>
+              <a:rPr lang="fr-FR" sz="3600" b="1" dirty="0">
+                <a:latin typeface="Nunito Sans" panose="00000500000000000000" pitchFamily="2" charset="0"/>
+              </a:rPr>
+              <a:t> Sans</a:t>
+            </a:r>
+          </a:p>
+        </p:txBody>
+      </p:sp>
+      <p:sp>
+        <p:nvSpPr>
+          <p:cNvPr id="12" name="ZoneTexte 11">
+            <a:extLst>
+              <a:ext uri="{FF2B5EF4-FFF2-40B4-BE49-F238E27FC236}">
+                <a16:creationId xmlns:a16="http://schemas.microsoft.com/office/drawing/2014/main" id="{8C9D006B-42EF-4731-A26F-79F97E5DB238}"/>
+              </a:ext>
+            </a:extLst>
+          </p:cNvPr>
+          <p:cNvSpPr txBox="1"/>
+          <p:nvPr/>
+        </p:nvSpPr>
+        <p:spPr>
+          <a:xfrm>
+            <a:off x="1742546" y="3286503"/>
+            <a:ext cx="8706908" cy="2308324"/>
+          </a:xfrm>
+          <a:prstGeom prst="rect">
+            <a:avLst/>
+          </a:prstGeom>
+          <a:noFill/>
+        </p:spPr>
+        <p:txBody>
+          <a:bodyPr wrap="square" rtlCol="0">
+            <a:spAutoFit/>
+          </a:bodyPr>
+          <a:lstStyle/>
+          <a:p>
+            <a:pPr algn="ctr"/>
+            <a:r>
+              <a:rPr lang="fr-FR" sz="3600" dirty="0" err="1">
+                <a:latin typeface="Nunito Sans" panose="00000500000000000000" pitchFamily="2" charset="0"/>
+              </a:rPr>
+              <a:t>abcdefghijklmnopqrstuvwxyz</a:t>
+            </a:r>
+            <a:endParaRPr lang="fr-FR" sz="3600" dirty="0">
+              <a:latin typeface="Nunito Sans" panose="00000500000000000000" pitchFamily="2" charset="0"/>
+            </a:endParaRPr>
+          </a:p>
+          <a:p>
+            <a:pPr algn="ctr"/>
+            <a:r>
+              <a:rPr lang="fr-FR" sz="3600" dirty="0">
+                <a:latin typeface="Nunito Sans" panose="00000500000000000000" pitchFamily="2" charset="0"/>
+              </a:rPr>
+              <a:t>ABCDEFGHIJKLMNOPQRSTUVWSYX</a:t>
+            </a:r>
+          </a:p>
+          <a:p>
+            <a:pPr algn="ctr"/>
+            <a:r>
+              <a:rPr lang="fr-FR" sz="3600" dirty="0">
+                <a:latin typeface="Nunito Sans" panose="00000500000000000000" pitchFamily="2" charset="0"/>
+              </a:rPr>
+              <a:t>123456789</a:t>
+            </a:r>
+          </a:p>
+          <a:p>
+            <a:pPr algn="ctr"/>
+            <a:r>
+              <a:rPr lang="fr-FR" sz="3600" dirty="0">
+                <a:latin typeface="Nunito Sans" panose="00000500000000000000" pitchFamily="2" charset="0"/>
+              </a:rPr>
+              <a:t>« !?()</a:t>
+            </a:r>
+            <a:r>
+              <a:rPr lang="fr-FR" sz="3600" dirty="0" err="1">
+                <a:latin typeface="Nunito Sans" panose="00000500000000000000" pitchFamily="2" charset="0"/>
+              </a:rPr>
+              <a:t>àçéù</a:t>
+            </a:r>
+            <a:r>
+              <a:rPr lang="fr-FR" sz="3600" dirty="0">
+                <a:latin typeface="Nunito Sans" panose="00000500000000000000" pitchFamily="2" charset="0"/>
+              </a:rPr>
+              <a:t>#»</a:t>
             </a:r>
           </a:p>
         </p:txBody>
@@ -6753,7 +7316,7 @@
     </p:spTree>
     <p:extLst>
       <p:ext uri="{BB962C8B-B14F-4D97-AF65-F5344CB8AC3E}">
-        <p14:creationId xmlns:p14="http://schemas.microsoft.com/office/powerpoint/2010/main" val="2306348081"/>
+        <p14:creationId xmlns:p14="http://schemas.microsoft.com/office/powerpoint/2010/main" val="993811677"/>
       </p:ext>
     </p:extLst>
   </p:cSld>
@@ -6848,7 +7411,7 @@
               <a:rPr lang="fr-FR" sz="3200" dirty="0">
                 <a:latin typeface="Nunito Sans" panose="00000500000000000000" pitchFamily="2" charset="0"/>
               </a:rPr>
-              <a:t>Wireframe</a:t>
+              <a:t>Zoning</a:t>
             </a:r>
           </a:p>
         </p:txBody>
@@ -6856,7 +7419,7 @@
     </p:spTree>
     <p:extLst>
       <p:ext uri="{BB962C8B-B14F-4D97-AF65-F5344CB8AC3E}">
-        <p14:creationId xmlns:p14="http://schemas.microsoft.com/office/powerpoint/2010/main" val="2673464143"/>
+        <p14:creationId xmlns:p14="http://schemas.microsoft.com/office/powerpoint/2010/main" val="2306348081"/>
       </p:ext>
     </p:extLst>
   </p:cSld>
@@ -6934,7 +7497,7 @@
         <p:spPr>
           <a:xfrm>
             <a:off x="77948" y="67542"/>
-            <a:ext cx="3394444" cy="1077218"/>
+            <a:ext cx="3394444" cy="584775"/>
           </a:xfrm>
           <a:prstGeom prst="rect">
             <a:avLst/>
@@ -6951,7 +7514,7 @@
               <a:rPr lang="fr-FR" sz="3200" dirty="0">
                 <a:latin typeface="Nunito Sans" panose="00000500000000000000" pitchFamily="2" charset="0"/>
               </a:rPr>
-              <a:t>Responsive (landing page)</a:t>
+              <a:t>Wireframe</a:t>
             </a:r>
           </a:p>
         </p:txBody>
@@ -6959,7 +7522,7 @@
     </p:spTree>
     <p:extLst>
       <p:ext uri="{BB962C8B-B14F-4D97-AF65-F5344CB8AC3E}">
-        <p14:creationId xmlns:p14="http://schemas.microsoft.com/office/powerpoint/2010/main" val="895345432"/>
+        <p14:creationId xmlns:p14="http://schemas.microsoft.com/office/powerpoint/2010/main" val="2673464143"/>
       </p:ext>
     </p:extLst>
   </p:cSld>
@@ -7054,7 +7617,7 @@
               <a:rPr lang="fr-FR" sz="3200" dirty="0">
                 <a:latin typeface="Nunito Sans" panose="00000500000000000000" pitchFamily="2" charset="0"/>
               </a:rPr>
-              <a:t>Responsive (rubriques)</a:t>
+              <a:t>Responsive (landing page)</a:t>
             </a:r>
           </a:p>
         </p:txBody>
@@ -7062,7 +7625,7 @@
     </p:spTree>
     <p:extLst>
       <p:ext uri="{BB962C8B-B14F-4D97-AF65-F5344CB8AC3E}">
-        <p14:creationId xmlns:p14="http://schemas.microsoft.com/office/powerpoint/2010/main" val="3184296643"/>
+        <p14:creationId xmlns:p14="http://schemas.microsoft.com/office/powerpoint/2010/main" val="895345432"/>
       </p:ext>
     </p:extLst>
   </p:cSld>

</xml_diff>

<commit_message>
ajout des cartes de rubriques terminées
</commit_message>
<xml_diff>
--- a/dossier de conception.pptx
+++ b/dossier de conception.pptx
@@ -12,13 +12,14 @@
     <p:sldId id="269" r:id="rId6"/>
     <p:sldId id="259" r:id="rId7"/>
     <p:sldId id="264" r:id="rId8"/>
-    <p:sldId id="260" r:id="rId9"/>
-    <p:sldId id="261" r:id="rId10"/>
-    <p:sldId id="263" r:id="rId11"/>
-    <p:sldId id="267" r:id="rId12"/>
-    <p:sldId id="266" r:id="rId13"/>
-    <p:sldId id="265" r:id="rId14"/>
-    <p:sldId id="271" r:id="rId15"/>
+    <p:sldId id="272" r:id="rId9"/>
+    <p:sldId id="273" r:id="rId10"/>
+    <p:sldId id="260" r:id="rId11"/>
+    <p:sldId id="263" r:id="rId12"/>
+    <p:sldId id="267" r:id="rId13"/>
+    <p:sldId id="266" r:id="rId14"/>
+    <p:sldId id="265" r:id="rId15"/>
+    <p:sldId id="271" r:id="rId16"/>
   </p:sldIdLst>
   <p:sldSz cx="12192000" cy="6858000"/>
   <p:notesSz cx="6858000" cy="9144000"/>
@@ -272,7 +273,7 @@
           <a:p>
             <a:fld id="{AAFC192E-AD9A-4E5F-9BCB-0D6705619E5D}" type="datetimeFigureOut">
               <a:rPr lang="fr-FR" smtClean="0"/>
-              <a:t>15/04/2021</a:t>
+              <a:t>16/04/2021</a:t>
             </a:fld>
             <a:endParaRPr lang="fr-FR"/>
           </a:p>
@@ -470,7 +471,7 @@
           <a:p>
             <a:fld id="{AAFC192E-AD9A-4E5F-9BCB-0D6705619E5D}" type="datetimeFigureOut">
               <a:rPr lang="fr-FR" smtClean="0"/>
-              <a:t>15/04/2021</a:t>
+              <a:t>16/04/2021</a:t>
             </a:fld>
             <a:endParaRPr lang="fr-FR"/>
           </a:p>
@@ -678,7 +679,7 @@
           <a:p>
             <a:fld id="{AAFC192E-AD9A-4E5F-9BCB-0D6705619E5D}" type="datetimeFigureOut">
               <a:rPr lang="fr-FR" smtClean="0"/>
-              <a:t>15/04/2021</a:t>
+              <a:t>16/04/2021</a:t>
             </a:fld>
             <a:endParaRPr lang="fr-FR"/>
           </a:p>
@@ -876,7 +877,7 @@
           <a:p>
             <a:fld id="{AAFC192E-AD9A-4E5F-9BCB-0D6705619E5D}" type="datetimeFigureOut">
               <a:rPr lang="fr-FR" smtClean="0"/>
-              <a:t>15/04/2021</a:t>
+              <a:t>16/04/2021</a:t>
             </a:fld>
             <a:endParaRPr lang="fr-FR"/>
           </a:p>
@@ -1151,7 +1152,7 @@
           <a:p>
             <a:fld id="{AAFC192E-AD9A-4E5F-9BCB-0D6705619E5D}" type="datetimeFigureOut">
               <a:rPr lang="fr-FR" smtClean="0"/>
-              <a:t>15/04/2021</a:t>
+              <a:t>16/04/2021</a:t>
             </a:fld>
             <a:endParaRPr lang="fr-FR"/>
           </a:p>
@@ -1416,7 +1417,7 @@
           <a:p>
             <a:fld id="{AAFC192E-AD9A-4E5F-9BCB-0D6705619E5D}" type="datetimeFigureOut">
               <a:rPr lang="fr-FR" smtClean="0"/>
-              <a:t>15/04/2021</a:t>
+              <a:t>16/04/2021</a:t>
             </a:fld>
             <a:endParaRPr lang="fr-FR"/>
           </a:p>
@@ -1828,7 +1829,7 @@
           <a:p>
             <a:fld id="{AAFC192E-AD9A-4E5F-9BCB-0D6705619E5D}" type="datetimeFigureOut">
               <a:rPr lang="fr-FR" smtClean="0"/>
-              <a:t>15/04/2021</a:t>
+              <a:t>16/04/2021</a:t>
             </a:fld>
             <a:endParaRPr lang="fr-FR"/>
           </a:p>
@@ -1969,7 +1970,7 @@
           <a:p>
             <a:fld id="{AAFC192E-AD9A-4E5F-9BCB-0D6705619E5D}" type="datetimeFigureOut">
               <a:rPr lang="fr-FR" smtClean="0"/>
-              <a:t>15/04/2021</a:t>
+              <a:t>16/04/2021</a:t>
             </a:fld>
             <a:endParaRPr lang="fr-FR"/>
           </a:p>
@@ -2082,7 +2083,7 @@
           <a:p>
             <a:fld id="{AAFC192E-AD9A-4E5F-9BCB-0D6705619E5D}" type="datetimeFigureOut">
               <a:rPr lang="fr-FR" smtClean="0"/>
-              <a:t>15/04/2021</a:t>
+              <a:t>16/04/2021</a:t>
             </a:fld>
             <a:endParaRPr lang="fr-FR"/>
           </a:p>
@@ -2393,7 +2394,7 @@
           <a:p>
             <a:fld id="{AAFC192E-AD9A-4E5F-9BCB-0D6705619E5D}" type="datetimeFigureOut">
               <a:rPr lang="fr-FR" smtClean="0"/>
-              <a:t>15/04/2021</a:t>
+              <a:t>16/04/2021</a:t>
             </a:fld>
             <a:endParaRPr lang="fr-FR"/>
           </a:p>
@@ -2681,7 +2682,7 @@
           <a:p>
             <a:fld id="{AAFC192E-AD9A-4E5F-9BCB-0D6705619E5D}" type="datetimeFigureOut">
               <a:rPr lang="fr-FR" smtClean="0"/>
-              <a:t>15/04/2021</a:t>
+              <a:t>16/04/2021</a:t>
             </a:fld>
             <a:endParaRPr lang="fr-FR"/>
           </a:p>
@@ -2922,7 +2923,7 @@
           <a:p>
             <a:fld id="{AAFC192E-AD9A-4E5F-9BCB-0D6705619E5D}" type="datetimeFigureOut">
               <a:rPr lang="fr-FR" smtClean="0"/>
-              <a:t>15/04/2021</a:t>
+              <a:t>16/04/2021</a:t>
             </a:fld>
             <a:endParaRPr lang="fr-FR"/>
           </a:p>
@@ -3341,10 +3342,10 @@
       </p:grpSpPr>
       <p:pic>
         <p:nvPicPr>
-          <p:cNvPr id="5" name="Image 4">
-            <a:extLst>
-              <a:ext uri="{FF2B5EF4-FFF2-40B4-BE49-F238E27FC236}">
-                <a16:creationId xmlns:a16="http://schemas.microsoft.com/office/drawing/2014/main" id="{0DFBC4A4-D796-434C-9970-C9DB8233D1FD}"/>
+          <p:cNvPr id="4" name="Image 3">
+            <a:extLst>
+              <a:ext uri="{FF2B5EF4-FFF2-40B4-BE49-F238E27FC236}">
+                <a16:creationId xmlns:a16="http://schemas.microsoft.com/office/drawing/2014/main" id="{F438CBC1-FA38-465F-9ED6-75D513D0F11F}"/>
               </a:ext>
             </a:extLst>
           </p:cNvPr>
@@ -3367,68 +3368,14 @@
         </p:blipFill>
         <p:spPr>
           <a:xfrm>
-            <a:off x="3000375" y="2619375"/>
-            <a:ext cx="6191250" cy="1619250"/>
+            <a:off x="0" y="0"/>
+            <a:ext cx="12192000" cy="6858000"/>
           </a:xfrm>
           <a:prstGeom prst="rect">
             <a:avLst/>
           </a:prstGeom>
         </p:spPr>
       </p:pic>
-      <p:sp>
-        <p:nvSpPr>
-          <p:cNvPr id="6" name="ZoneTexte 5">
-            <a:extLst>
-              <a:ext uri="{FF2B5EF4-FFF2-40B4-BE49-F238E27FC236}">
-                <a16:creationId xmlns:a16="http://schemas.microsoft.com/office/drawing/2014/main" id="{8835F426-F821-4EC1-A559-FF9A7B27E0D3}"/>
-              </a:ext>
-            </a:extLst>
-          </p:cNvPr>
-          <p:cNvSpPr txBox="1"/>
-          <p:nvPr/>
-        </p:nvSpPr>
-        <p:spPr>
-          <a:xfrm>
-            <a:off x="4273550" y="5791201"/>
-            <a:ext cx="3644900" cy="646331"/>
-          </a:xfrm>
-          <a:prstGeom prst="rect">
-            <a:avLst/>
-          </a:prstGeom>
-          <a:noFill/>
-        </p:spPr>
-        <p:txBody>
-          <a:bodyPr wrap="square" rtlCol="0">
-            <a:spAutoFit/>
-          </a:bodyPr>
-          <a:lstStyle/>
-          <a:p>
-            <a:r>
-              <a:rPr lang="fr-FR" dirty="0">
-                <a:latin typeface="Nunito Sans" panose="00000500000000000000" pitchFamily="2" charset="0"/>
-              </a:rPr>
-              <a:t>Luc </a:t>
-            </a:r>
-            <a:r>
-              <a:rPr lang="fr-FR" dirty="0" err="1">
-                <a:latin typeface="Nunito Sans" panose="00000500000000000000" pitchFamily="2" charset="0"/>
-              </a:rPr>
-              <a:t>Leneuf</a:t>
-            </a:r>
-            <a:r>
-              <a:rPr lang="fr-FR" dirty="0">
-                <a:latin typeface="Nunito Sans" panose="00000500000000000000" pitchFamily="2" charset="0"/>
-              </a:rPr>
-              <a:t> -2021- Nicolas Maes</a:t>
-            </a:r>
-          </a:p>
-          <a:p>
-            <a:endParaRPr lang="fr-FR" dirty="0">
-              <a:latin typeface="Nunito Sans" panose="00000500000000000000" pitchFamily="2" charset="0"/>
-            </a:endParaRPr>
-          </a:p>
-        </p:txBody>
-      </p:sp>
     </p:spTree>
     <p:extLst>
       <p:ext uri="{BB962C8B-B14F-4D97-AF65-F5344CB8AC3E}">
@@ -3461,10 +3408,10 @@
       </p:grpSpPr>
       <p:pic>
         <p:nvPicPr>
-          <p:cNvPr id="49" name="Image 48">
-            <a:extLst>
-              <a:ext uri="{FF2B5EF4-FFF2-40B4-BE49-F238E27FC236}">
-                <a16:creationId xmlns:a16="http://schemas.microsoft.com/office/drawing/2014/main" id="{095AA012-5584-4589-B5BD-6185592E4D3E}"/>
+          <p:cNvPr id="3" name="Image 2">
+            <a:extLst>
+              <a:ext uri="{FF2B5EF4-FFF2-40B4-BE49-F238E27FC236}">
+                <a16:creationId xmlns:a16="http://schemas.microsoft.com/office/drawing/2014/main" id="{F5D3EDE2-C6F6-4B12-9952-BC225A79D01E}"/>
               </a:ext>
             </a:extLst>
           </p:cNvPr>
@@ -3487,20 +3434,56 @@
         </p:blipFill>
         <p:spPr>
           <a:xfrm>
-            <a:off x="9567333" y="-4120"/>
-            <a:ext cx="2624667" cy="686451"/>
+            <a:off x="303726" y="1174045"/>
+            <a:ext cx="8770212" cy="4933244"/>
           </a:xfrm>
           <a:prstGeom prst="rect">
             <a:avLst/>
           </a:prstGeom>
         </p:spPr>
       </p:pic>
-      <p:sp>
-        <p:nvSpPr>
-          <p:cNvPr id="9" name="ZoneTexte 8">
-            <a:extLst>
-              <a:ext uri="{FF2B5EF4-FFF2-40B4-BE49-F238E27FC236}">
-                <a16:creationId xmlns:a16="http://schemas.microsoft.com/office/drawing/2014/main" id="{29E704EF-0DC2-4823-97A3-6694FCC299FE}"/>
+      <p:pic>
+        <p:nvPicPr>
+          <p:cNvPr id="5" name="Image 4">
+            <a:extLst>
+              <a:ext uri="{FF2B5EF4-FFF2-40B4-BE49-F238E27FC236}">
+                <a16:creationId xmlns:a16="http://schemas.microsoft.com/office/drawing/2014/main" id="{6769FE15-39F1-496C-BA8F-0EB4E01F7352}"/>
+              </a:ext>
+            </a:extLst>
+          </p:cNvPr>
+          <p:cNvPicPr>
+            <a:picLocks noChangeAspect="1"/>
+          </p:cNvPicPr>
+          <p:nvPr/>
+        </p:nvPicPr>
+        <p:blipFill>
+          <a:blip r:embed="rId3">
+            <a:extLst>
+              <a:ext uri="{28A0092B-C50C-407E-A947-70E740481C1C}">
+                <a14:useLocalDpi xmlns:a14="http://schemas.microsoft.com/office/drawing/2010/main" val="0"/>
+              </a:ext>
+            </a:extLst>
+          </a:blip>
+          <a:stretch>
+            <a:fillRect/>
+          </a:stretch>
+        </p:blipFill>
+        <p:spPr>
+          <a:xfrm>
+            <a:off x="9840892" y="1174045"/>
+            <a:ext cx="1712932" cy="4933244"/>
+          </a:xfrm>
+          <a:prstGeom prst="rect">
+            <a:avLst/>
+          </a:prstGeom>
+        </p:spPr>
+      </p:pic>
+      <p:sp>
+        <p:nvSpPr>
+          <p:cNvPr id="8" name="ZoneTexte 7">
+            <a:extLst>
+              <a:ext uri="{FF2B5EF4-FFF2-40B4-BE49-F238E27FC236}">
+                <a16:creationId xmlns:a16="http://schemas.microsoft.com/office/drawing/2014/main" id="{47D34A74-ED00-450A-96D2-A1BA5E93492F}"/>
               </a:ext>
             </a:extLst>
           </p:cNvPr>
@@ -3510,7 +3493,7 @@
         <p:spPr>
           <a:xfrm>
             <a:off x="77948" y="67542"/>
-            <a:ext cx="3394444" cy="1077218"/>
+            <a:ext cx="3394444" cy="584775"/>
           </a:xfrm>
           <a:prstGeom prst="rect">
             <a:avLst/>
@@ -3527,15 +3510,51 @@
               <a:rPr lang="fr-FR" sz="3200" dirty="0">
                 <a:latin typeface="Nunito Sans" panose="00000500000000000000" pitchFamily="2" charset="0"/>
               </a:rPr>
-              <a:t>Responsive (landing page)</a:t>
-            </a:r>
-          </a:p>
-        </p:txBody>
-      </p:sp>
+              <a:t>Wireframe</a:t>
+            </a:r>
+          </a:p>
+        </p:txBody>
+      </p:sp>
+      <p:pic>
+        <p:nvPicPr>
+          <p:cNvPr id="7" name="Image 6">
+            <a:extLst>
+              <a:ext uri="{FF2B5EF4-FFF2-40B4-BE49-F238E27FC236}">
+                <a16:creationId xmlns:a16="http://schemas.microsoft.com/office/drawing/2014/main" id="{45F95E94-2EDE-4912-A102-D28E1B0EBFFE}"/>
+              </a:ext>
+            </a:extLst>
+          </p:cNvPr>
+          <p:cNvPicPr>
+            <a:picLocks noChangeAspect="1"/>
+          </p:cNvPicPr>
+          <p:nvPr/>
+        </p:nvPicPr>
+        <p:blipFill>
+          <a:blip r:embed="rId4">
+            <a:extLst>
+              <a:ext uri="{28A0092B-C50C-407E-A947-70E740481C1C}">
+                <a14:useLocalDpi xmlns:a14="http://schemas.microsoft.com/office/drawing/2010/main" val="0"/>
+              </a:ext>
+            </a:extLst>
+          </a:blip>
+          <a:stretch>
+            <a:fillRect/>
+          </a:stretch>
+        </p:blipFill>
+        <p:spPr>
+          <a:xfrm>
+            <a:off x="8786258" y="446568"/>
+            <a:ext cx="2640198" cy="686451"/>
+          </a:xfrm>
+          <a:prstGeom prst="rect">
+            <a:avLst/>
+          </a:prstGeom>
+        </p:spPr>
+      </p:pic>
     </p:spTree>
     <p:extLst>
       <p:ext uri="{BB962C8B-B14F-4D97-AF65-F5344CB8AC3E}">
-        <p14:creationId xmlns:p14="http://schemas.microsoft.com/office/powerpoint/2010/main" val="895345432"/>
+        <p14:creationId xmlns:p14="http://schemas.microsoft.com/office/powerpoint/2010/main" val="2306348081"/>
       </p:ext>
     </p:extLst>
   </p:cSld>
@@ -3562,12 +3581,49 @@
           <a:chExt cx="0" cy="0"/>
         </a:xfrm>
       </p:grpSpPr>
+      <p:sp>
+        <p:nvSpPr>
+          <p:cNvPr id="9" name="ZoneTexte 8">
+            <a:extLst>
+              <a:ext uri="{FF2B5EF4-FFF2-40B4-BE49-F238E27FC236}">
+                <a16:creationId xmlns:a16="http://schemas.microsoft.com/office/drawing/2014/main" id="{29E704EF-0DC2-4823-97A3-6694FCC299FE}"/>
+              </a:ext>
+            </a:extLst>
+          </p:cNvPr>
+          <p:cNvSpPr txBox="1"/>
+          <p:nvPr/>
+        </p:nvSpPr>
+        <p:spPr>
+          <a:xfrm>
+            <a:off x="77948" y="67542"/>
+            <a:ext cx="3394444" cy="1077218"/>
+          </a:xfrm>
+          <a:prstGeom prst="rect">
+            <a:avLst/>
+          </a:prstGeom>
+          <a:noFill/>
+        </p:spPr>
+        <p:txBody>
+          <a:bodyPr wrap="square" rtlCol="0">
+            <a:spAutoFit/>
+          </a:bodyPr>
+          <a:lstStyle/>
+          <a:p>
+            <a:r>
+              <a:rPr lang="fr-FR" sz="3200" dirty="0">
+                <a:latin typeface="Nunito Sans" panose="00000500000000000000" pitchFamily="2" charset="0"/>
+              </a:rPr>
+              <a:t>Responsive (landing page)</a:t>
+            </a:r>
+          </a:p>
+        </p:txBody>
+      </p:sp>
       <p:pic>
         <p:nvPicPr>
-          <p:cNvPr id="49" name="Image 48">
-            <a:extLst>
-              <a:ext uri="{FF2B5EF4-FFF2-40B4-BE49-F238E27FC236}">
-                <a16:creationId xmlns:a16="http://schemas.microsoft.com/office/drawing/2014/main" id="{095AA012-5584-4589-B5BD-6185592E4D3E}"/>
+          <p:cNvPr id="3" name="Image 2">
+            <a:extLst>
+              <a:ext uri="{FF2B5EF4-FFF2-40B4-BE49-F238E27FC236}">
+                <a16:creationId xmlns:a16="http://schemas.microsoft.com/office/drawing/2014/main" id="{95006C56-2662-48B3-8BD6-D6C61CEFFDA4}"/>
               </a:ext>
             </a:extLst>
           </p:cNvPr>
@@ -3577,7 +3633,197 @@
           <p:nvPr/>
         </p:nvPicPr>
         <p:blipFill>
-          <a:blip r:embed="rId2">
+          <a:blip r:embed="rId2"/>
+          <a:stretch>
+            <a:fillRect/>
+          </a:stretch>
+        </p:blipFill>
+        <p:spPr>
+          <a:xfrm>
+            <a:off x="428978" y="1398702"/>
+            <a:ext cx="8116709" cy="4565649"/>
+          </a:xfrm>
+          <a:prstGeom prst="rect">
+            <a:avLst/>
+          </a:prstGeom>
+        </p:spPr>
+      </p:pic>
+      <p:sp>
+        <p:nvSpPr>
+          <p:cNvPr id="4" name="Rectangle 3">
+            <a:extLst>
+              <a:ext uri="{FF2B5EF4-FFF2-40B4-BE49-F238E27FC236}">
+                <a16:creationId xmlns:a16="http://schemas.microsoft.com/office/drawing/2014/main" id="{9B17726E-D6EC-404C-9B6A-9CCB9158303D}"/>
+              </a:ext>
+            </a:extLst>
+          </p:cNvPr>
+          <p:cNvSpPr/>
+          <p:nvPr/>
+        </p:nvSpPr>
+        <p:spPr>
+          <a:xfrm>
+            <a:off x="203200" y="1354667"/>
+            <a:ext cx="8692444" cy="666044"/>
+          </a:xfrm>
+          <a:prstGeom prst="rect">
+            <a:avLst/>
+          </a:prstGeom>
+          <a:solidFill>
+            <a:schemeClr val="bg1"/>
+          </a:solidFill>
+          <a:ln>
+            <a:solidFill>
+              <a:schemeClr val="bg1"/>
+            </a:solidFill>
+          </a:ln>
+        </p:spPr>
+        <p:style>
+          <a:lnRef idx="2">
+            <a:schemeClr val="accent1">
+              <a:shade val="50000"/>
+            </a:schemeClr>
+          </a:lnRef>
+          <a:fillRef idx="1">
+            <a:schemeClr val="accent1"/>
+          </a:fillRef>
+          <a:effectRef idx="0">
+            <a:schemeClr val="accent1"/>
+          </a:effectRef>
+          <a:fontRef idx="minor">
+            <a:schemeClr val="lt1"/>
+          </a:fontRef>
+        </p:style>
+        <p:txBody>
+          <a:bodyPr rtlCol="0" anchor="ctr"/>
+          <a:lstStyle/>
+          <a:p>
+            <a:pPr algn="ctr"/>
+            <a:endParaRPr lang="fr-FR"/>
+          </a:p>
+        </p:txBody>
+      </p:sp>
+      <p:sp>
+        <p:nvSpPr>
+          <p:cNvPr id="7" name="Rectangle 6">
+            <a:extLst>
+              <a:ext uri="{FF2B5EF4-FFF2-40B4-BE49-F238E27FC236}">
+                <a16:creationId xmlns:a16="http://schemas.microsoft.com/office/drawing/2014/main" id="{55C265B4-6871-48FB-993A-D3AF247F1951}"/>
+              </a:ext>
+            </a:extLst>
+          </p:cNvPr>
+          <p:cNvSpPr/>
+          <p:nvPr/>
+        </p:nvSpPr>
+        <p:spPr>
+          <a:xfrm>
+            <a:off x="203200" y="5739694"/>
+            <a:ext cx="8692444" cy="666044"/>
+          </a:xfrm>
+          <a:prstGeom prst="rect">
+            <a:avLst/>
+          </a:prstGeom>
+          <a:solidFill>
+            <a:schemeClr val="bg1"/>
+          </a:solidFill>
+          <a:ln>
+            <a:solidFill>
+              <a:schemeClr val="bg1"/>
+            </a:solidFill>
+          </a:ln>
+        </p:spPr>
+        <p:style>
+          <a:lnRef idx="2">
+            <a:schemeClr val="accent1">
+              <a:shade val="50000"/>
+            </a:schemeClr>
+          </a:lnRef>
+          <a:fillRef idx="1">
+            <a:schemeClr val="accent1"/>
+          </a:fillRef>
+          <a:effectRef idx="0">
+            <a:schemeClr val="accent1"/>
+          </a:effectRef>
+          <a:fontRef idx="minor">
+            <a:schemeClr val="lt1"/>
+          </a:fontRef>
+        </p:style>
+        <p:txBody>
+          <a:bodyPr rtlCol="0" anchor="ctr"/>
+          <a:lstStyle/>
+          <a:p>
+            <a:pPr algn="ctr"/>
+            <a:endParaRPr lang="fr-FR"/>
+          </a:p>
+        </p:txBody>
+      </p:sp>
+      <p:sp>
+        <p:nvSpPr>
+          <p:cNvPr id="5" name="Rectangle 4">
+            <a:extLst>
+              <a:ext uri="{FF2B5EF4-FFF2-40B4-BE49-F238E27FC236}">
+                <a16:creationId xmlns:a16="http://schemas.microsoft.com/office/drawing/2014/main" id="{744D26BA-7B32-4922-ABE9-478A40934C54}"/>
+              </a:ext>
+            </a:extLst>
+          </p:cNvPr>
+          <p:cNvSpPr/>
+          <p:nvPr/>
+        </p:nvSpPr>
+        <p:spPr>
+          <a:xfrm>
+            <a:off x="316091" y="1687689"/>
+            <a:ext cx="8692444" cy="4052005"/>
+          </a:xfrm>
+          <a:prstGeom prst="rect">
+            <a:avLst/>
+          </a:prstGeom>
+          <a:noFill/>
+          <a:ln>
+            <a:solidFill>
+              <a:schemeClr val="tx1"/>
+            </a:solidFill>
+          </a:ln>
+        </p:spPr>
+        <p:style>
+          <a:lnRef idx="2">
+            <a:schemeClr val="accent1">
+              <a:shade val="50000"/>
+            </a:schemeClr>
+          </a:lnRef>
+          <a:fillRef idx="1">
+            <a:schemeClr val="accent1"/>
+          </a:fillRef>
+          <a:effectRef idx="0">
+            <a:schemeClr val="accent1"/>
+          </a:effectRef>
+          <a:fontRef idx="minor">
+            <a:schemeClr val="lt1"/>
+          </a:fontRef>
+        </p:style>
+        <p:txBody>
+          <a:bodyPr rtlCol="0" anchor="ctr"/>
+          <a:lstStyle/>
+          <a:p>
+            <a:pPr algn="ctr"/>
+            <a:endParaRPr lang="fr-FR"/>
+          </a:p>
+        </p:txBody>
+      </p:sp>
+      <p:pic>
+        <p:nvPicPr>
+          <p:cNvPr id="11" name="Image 10">
+            <a:extLst>
+              <a:ext uri="{FF2B5EF4-FFF2-40B4-BE49-F238E27FC236}">
+                <a16:creationId xmlns:a16="http://schemas.microsoft.com/office/drawing/2014/main" id="{1E399BFD-8B06-476D-AF17-0E4365152F47}"/>
+              </a:ext>
+            </a:extLst>
+          </p:cNvPr>
+          <p:cNvPicPr>
+            <a:picLocks noChangeAspect="1"/>
+          </p:cNvPicPr>
+          <p:nvPr/>
+        </p:nvPicPr>
+        <p:blipFill>
+          <a:blip r:embed="rId3">
             <a:extLst>
               <a:ext uri="{28A0092B-C50C-407E-A947-70E740481C1C}">
                 <a14:useLocalDpi xmlns:a14="http://schemas.microsoft.com/office/drawing/2010/main" val="0"/>
@@ -3590,8 +3836,8 @@
         </p:blipFill>
         <p:spPr>
           <a:xfrm>
-            <a:off x="9567333" y="-4120"/>
-            <a:ext cx="2624667" cy="686451"/>
+            <a:off x="9250180" y="1350374"/>
+            <a:ext cx="2738619" cy="4613977"/>
           </a:xfrm>
           <a:prstGeom prst="rect">
             <a:avLst/>
@@ -3600,45 +3846,96 @@
       </p:pic>
       <p:sp>
         <p:nvSpPr>
-          <p:cNvPr id="9" name="ZoneTexte 8">
-            <a:extLst>
-              <a:ext uri="{FF2B5EF4-FFF2-40B4-BE49-F238E27FC236}">
-                <a16:creationId xmlns:a16="http://schemas.microsoft.com/office/drawing/2014/main" id="{29E704EF-0DC2-4823-97A3-6694FCC299FE}"/>
-              </a:ext>
-            </a:extLst>
-          </p:cNvPr>
-          <p:cNvSpPr txBox="1"/>
-          <p:nvPr/>
-        </p:nvSpPr>
-        <p:spPr>
-          <a:xfrm>
-            <a:off x="77948" y="67542"/>
-            <a:ext cx="3394444" cy="1077218"/>
+          <p:cNvPr id="13" name="Rectangle 12">
+            <a:extLst>
+              <a:ext uri="{FF2B5EF4-FFF2-40B4-BE49-F238E27FC236}">
+                <a16:creationId xmlns:a16="http://schemas.microsoft.com/office/drawing/2014/main" id="{1E6A99B4-862F-4F18-8E67-3BA104BCA9D7}"/>
+              </a:ext>
+            </a:extLst>
+          </p:cNvPr>
+          <p:cNvSpPr/>
+          <p:nvPr/>
+        </p:nvSpPr>
+        <p:spPr>
+          <a:xfrm>
+            <a:off x="9234312" y="1275759"/>
+            <a:ext cx="2754487" cy="4763205"/>
           </a:xfrm>
           <a:prstGeom prst="rect">
             <a:avLst/>
           </a:prstGeom>
           <a:noFill/>
-        </p:spPr>
-        <p:txBody>
-          <a:bodyPr wrap="square" rtlCol="0">
-            <a:spAutoFit/>
-          </a:bodyPr>
-          <a:lstStyle/>
-          <a:p>
-            <a:r>
-              <a:rPr lang="fr-FR" sz="3200" dirty="0">
-                <a:latin typeface="Nunito Sans" panose="00000500000000000000" pitchFamily="2" charset="0"/>
-              </a:rPr>
-              <a:t>Responsive (rubriques)</a:t>
-            </a:r>
-          </a:p>
-        </p:txBody>
-      </p:sp>
+          <a:ln>
+            <a:solidFill>
+              <a:schemeClr val="tx1"/>
+            </a:solidFill>
+          </a:ln>
+        </p:spPr>
+        <p:style>
+          <a:lnRef idx="2">
+            <a:schemeClr val="accent1">
+              <a:shade val="50000"/>
+            </a:schemeClr>
+          </a:lnRef>
+          <a:fillRef idx="1">
+            <a:schemeClr val="accent1"/>
+          </a:fillRef>
+          <a:effectRef idx="0">
+            <a:schemeClr val="accent1"/>
+          </a:effectRef>
+          <a:fontRef idx="minor">
+            <a:schemeClr val="lt1"/>
+          </a:fontRef>
+        </p:style>
+        <p:txBody>
+          <a:bodyPr rtlCol="0" anchor="ctr"/>
+          <a:lstStyle/>
+          <a:p>
+            <a:pPr algn="ctr"/>
+            <a:endParaRPr lang="fr-FR"/>
+          </a:p>
+        </p:txBody>
+      </p:sp>
+      <p:pic>
+        <p:nvPicPr>
+          <p:cNvPr id="12" name="Image 11">
+            <a:extLst>
+              <a:ext uri="{FF2B5EF4-FFF2-40B4-BE49-F238E27FC236}">
+                <a16:creationId xmlns:a16="http://schemas.microsoft.com/office/drawing/2014/main" id="{4187495C-C593-4859-B0D5-09E450637880}"/>
+              </a:ext>
+            </a:extLst>
+          </p:cNvPr>
+          <p:cNvPicPr>
+            <a:picLocks noChangeAspect="1"/>
+          </p:cNvPicPr>
+          <p:nvPr/>
+        </p:nvPicPr>
+        <p:blipFill>
+          <a:blip r:embed="rId4">
+            <a:extLst>
+              <a:ext uri="{28A0092B-C50C-407E-A947-70E740481C1C}">
+                <a14:useLocalDpi xmlns:a14="http://schemas.microsoft.com/office/drawing/2010/main" val="0"/>
+              </a:ext>
+            </a:extLst>
+          </a:blip>
+          <a:stretch>
+            <a:fillRect/>
+          </a:stretch>
+        </p:blipFill>
+        <p:spPr>
+          <a:xfrm>
+            <a:off x="8786258" y="446568"/>
+            <a:ext cx="2640198" cy="686451"/>
+          </a:xfrm>
+          <a:prstGeom prst="rect">
+            <a:avLst/>
+          </a:prstGeom>
+        </p:spPr>
+      </p:pic>
     </p:spTree>
     <p:extLst>
       <p:ext uri="{BB962C8B-B14F-4D97-AF65-F5344CB8AC3E}">
-        <p14:creationId xmlns:p14="http://schemas.microsoft.com/office/powerpoint/2010/main" val="3184296643"/>
+        <p14:creationId xmlns:p14="http://schemas.microsoft.com/office/powerpoint/2010/main" val="895345432"/>
       </p:ext>
     </p:extLst>
   </p:cSld>
@@ -3665,12 +3962,49 @@
           <a:chExt cx="0" cy="0"/>
         </a:xfrm>
       </p:grpSpPr>
+      <p:sp>
+        <p:nvSpPr>
+          <p:cNvPr id="9" name="ZoneTexte 8">
+            <a:extLst>
+              <a:ext uri="{FF2B5EF4-FFF2-40B4-BE49-F238E27FC236}">
+                <a16:creationId xmlns:a16="http://schemas.microsoft.com/office/drawing/2014/main" id="{29E704EF-0DC2-4823-97A3-6694FCC299FE}"/>
+              </a:ext>
+            </a:extLst>
+          </p:cNvPr>
+          <p:cNvSpPr txBox="1"/>
+          <p:nvPr/>
+        </p:nvSpPr>
+        <p:spPr>
+          <a:xfrm>
+            <a:off x="77948" y="67542"/>
+            <a:ext cx="3394444" cy="1077218"/>
+          </a:xfrm>
+          <a:prstGeom prst="rect">
+            <a:avLst/>
+          </a:prstGeom>
+          <a:noFill/>
+        </p:spPr>
+        <p:txBody>
+          <a:bodyPr wrap="square" rtlCol="0">
+            <a:spAutoFit/>
+          </a:bodyPr>
+          <a:lstStyle/>
+          <a:p>
+            <a:r>
+              <a:rPr lang="fr-FR" sz="3200" dirty="0">
+                <a:latin typeface="Nunito Sans" panose="00000500000000000000" pitchFamily="2" charset="0"/>
+              </a:rPr>
+              <a:t>Responsive (rubriques)</a:t>
+            </a:r>
+          </a:p>
+        </p:txBody>
+      </p:sp>
       <p:pic>
         <p:nvPicPr>
-          <p:cNvPr id="49" name="Image 48">
-            <a:extLst>
-              <a:ext uri="{FF2B5EF4-FFF2-40B4-BE49-F238E27FC236}">
-                <a16:creationId xmlns:a16="http://schemas.microsoft.com/office/drawing/2014/main" id="{095AA012-5584-4589-B5BD-6185592E4D3E}"/>
+          <p:cNvPr id="5" name="Image 4">
+            <a:extLst>
+              <a:ext uri="{FF2B5EF4-FFF2-40B4-BE49-F238E27FC236}">
+                <a16:creationId xmlns:a16="http://schemas.microsoft.com/office/drawing/2014/main" id="{F4FC9BCB-EF3A-45F5-A990-D9680A7B22BA}"/>
               </a:ext>
             </a:extLst>
           </p:cNvPr>
@@ -3693,55 +4027,18 @@
         </p:blipFill>
         <p:spPr>
           <a:xfrm>
-            <a:off x="9567333" y="-4120"/>
-            <a:ext cx="2624667" cy="686451"/>
+            <a:off x="8786258" y="446568"/>
+            <a:ext cx="2640198" cy="686451"/>
           </a:xfrm>
           <a:prstGeom prst="rect">
             <a:avLst/>
           </a:prstGeom>
         </p:spPr>
       </p:pic>
-      <p:sp>
-        <p:nvSpPr>
-          <p:cNvPr id="9" name="ZoneTexte 8">
-            <a:extLst>
-              <a:ext uri="{FF2B5EF4-FFF2-40B4-BE49-F238E27FC236}">
-                <a16:creationId xmlns:a16="http://schemas.microsoft.com/office/drawing/2014/main" id="{29E704EF-0DC2-4823-97A3-6694FCC299FE}"/>
-              </a:ext>
-            </a:extLst>
-          </p:cNvPr>
-          <p:cNvSpPr txBox="1"/>
-          <p:nvPr/>
-        </p:nvSpPr>
-        <p:spPr>
-          <a:xfrm>
-            <a:off x="77948" y="67542"/>
-            <a:ext cx="3394444" cy="1077218"/>
-          </a:xfrm>
-          <a:prstGeom prst="rect">
-            <a:avLst/>
-          </a:prstGeom>
-          <a:noFill/>
-        </p:spPr>
-        <p:txBody>
-          <a:bodyPr wrap="square" rtlCol="0">
-            <a:spAutoFit/>
-          </a:bodyPr>
-          <a:lstStyle/>
-          <a:p>
-            <a:r>
-              <a:rPr lang="fr-FR" sz="3200" dirty="0">
-                <a:latin typeface="Nunito Sans" panose="00000500000000000000" pitchFamily="2" charset="0"/>
-              </a:rPr>
-              <a:t>Responsive (article)</a:t>
-            </a:r>
-          </a:p>
-        </p:txBody>
-      </p:sp>
     </p:spTree>
     <p:extLst>
       <p:ext uri="{BB962C8B-B14F-4D97-AF65-F5344CB8AC3E}">
-        <p14:creationId xmlns:p14="http://schemas.microsoft.com/office/powerpoint/2010/main" val="3335679860"/>
+        <p14:creationId xmlns:p14="http://schemas.microsoft.com/office/powerpoint/2010/main" val="3184296643"/>
       </p:ext>
     </p:extLst>
   </p:cSld>
@@ -3768,12 +4065,49 @@
           <a:chExt cx="0" cy="0"/>
         </a:xfrm>
       </p:grpSpPr>
+      <p:sp>
+        <p:nvSpPr>
+          <p:cNvPr id="9" name="ZoneTexte 8">
+            <a:extLst>
+              <a:ext uri="{FF2B5EF4-FFF2-40B4-BE49-F238E27FC236}">
+                <a16:creationId xmlns:a16="http://schemas.microsoft.com/office/drawing/2014/main" id="{29E704EF-0DC2-4823-97A3-6694FCC299FE}"/>
+              </a:ext>
+            </a:extLst>
+          </p:cNvPr>
+          <p:cNvSpPr txBox="1"/>
+          <p:nvPr/>
+        </p:nvSpPr>
+        <p:spPr>
+          <a:xfrm>
+            <a:off x="77948" y="67542"/>
+            <a:ext cx="3394444" cy="1077218"/>
+          </a:xfrm>
+          <a:prstGeom prst="rect">
+            <a:avLst/>
+          </a:prstGeom>
+          <a:noFill/>
+        </p:spPr>
+        <p:txBody>
+          <a:bodyPr wrap="square" rtlCol="0">
+            <a:spAutoFit/>
+          </a:bodyPr>
+          <a:lstStyle/>
+          <a:p>
+            <a:r>
+              <a:rPr lang="fr-FR" sz="3200" dirty="0">
+                <a:latin typeface="Nunito Sans" panose="00000500000000000000" pitchFamily="2" charset="0"/>
+              </a:rPr>
+              <a:t>Responsive (article)</a:t>
+            </a:r>
+          </a:p>
+        </p:txBody>
+      </p:sp>
       <p:pic>
         <p:nvPicPr>
-          <p:cNvPr id="49" name="Image 48">
-            <a:extLst>
-              <a:ext uri="{FF2B5EF4-FFF2-40B4-BE49-F238E27FC236}">
-                <a16:creationId xmlns:a16="http://schemas.microsoft.com/office/drawing/2014/main" id="{095AA012-5584-4589-B5BD-6185592E4D3E}"/>
+          <p:cNvPr id="3" name="Image 2">
+            <a:extLst>
+              <a:ext uri="{FF2B5EF4-FFF2-40B4-BE49-F238E27FC236}">
+                <a16:creationId xmlns:a16="http://schemas.microsoft.com/office/drawing/2014/main" id="{06817A62-903D-417F-889E-1A05AA750BDA}"/>
               </a:ext>
             </a:extLst>
           </p:cNvPr>
@@ -3796,8 +4130,8 @@
         </p:blipFill>
         <p:spPr>
           <a:xfrm>
-            <a:off x="9567333" y="-4120"/>
-            <a:ext cx="2624667" cy="686451"/>
+            <a:off x="318976" y="1590833"/>
+            <a:ext cx="8665535" cy="4334471"/>
           </a:xfrm>
           <a:prstGeom prst="rect">
             <a:avLst/>
@@ -3806,50 +4140,148 @@
       </p:pic>
       <p:sp>
         <p:nvSpPr>
-          <p:cNvPr id="9" name="ZoneTexte 8">
-            <a:extLst>
-              <a:ext uri="{FF2B5EF4-FFF2-40B4-BE49-F238E27FC236}">
-                <a16:creationId xmlns:a16="http://schemas.microsoft.com/office/drawing/2014/main" id="{29E704EF-0DC2-4823-97A3-6694FCC299FE}"/>
-              </a:ext>
-            </a:extLst>
-          </p:cNvPr>
-          <p:cNvSpPr txBox="1"/>
-          <p:nvPr/>
-        </p:nvSpPr>
-        <p:spPr>
-          <a:xfrm>
-            <a:off x="77947" y="67542"/>
-            <a:ext cx="4911741" cy="1077218"/>
+          <p:cNvPr id="7" name="Rectangle 6">
+            <a:extLst>
+              <a:ext uri="{FF2B5EF4-FFF2-40B4-BE49-F238E27FC236}">
+                <a16:creationId xmlns:a16="http://schemas.microsoft.com/office/drawing/2014/main" id="{06EF66A3-02AB-4B81-A4F6-57A2F5A558AF}"/>
+              </a:ext>
+            </a:extLst>
+          </p:cNvPr>
+          <p:cNvSpPr/>
+          <p:nvPr/>
+        </p:nvSpPr>
+        <p:spPr>
+          <a:xfrm>
+            <a:off x="316091" y="1477927"/>
+            <a:ext cx="8692444" cy="4763386"/>
           </a:xfrm>
           <a:prstGeom prst="rect">
             <a:avLst/>
           </a:prstGeom>
           <a:noFill/>
-        </p:spPr>
-        <p:txBody>
-          <a:bodyPr wrap="square" rtlCol="0">
-            <a:spAutoFit/>
-          </a:bodyPr>
-          <a:lstStyle/>
-          <a:p>
-            <a:r>
-              <a:rPr lang="fr-FR" sz="3200" dirty="0">
-                <a:latin typeface="Nunito Sans" panose="00000500000000000000" pitchFamily="2" charset="0"/>
-              </a:rPr>
-              <a:t>Planche de tendances</a:t>
-            </a:r>
-          </a:p>
-          <a:p>
-            <a:endParaRPr lang="fr-FR" sz="3200" dirty="0">
-              <a:latin typeface="Nunito Sans" panose="00000500000000000000" pitchFamily="2" charset="0"/>
-            </a:endParaRPr>
-          </a:p>
-        </p:txBody>
-      </p:sp>
+          <a:ln>
+            <a:solidFill>
+              <a:schemeClr val="tx1"/>
+            </a:solidFill>
+          </a:ln>
+        </p:spPr>
+        <p:style>
+          <a:lnRef idx="2">
+            <a:schemeClr val="accent1">
+              <a:shade val="50000"/>
+            </a:schemeClr>
+          </a:lnRef>
+          <a:fillRef idx="1">
+            <a:schemeClr val="accent1"/>
+          </a:fillRef>
+          <a:effectRef idx="0">
+            <a:schemeClr val="accent1"/>
+          </a:effectRef>
+          <a:fontRef idx="minor">
+            <a:schemeClr val="lt1"/>
+          </a:fontRef>
+        </p:style>
+        <p:txBody>
+          <a:bodyPr rtlCol="0" anchor="ctr"/>
+          <a:lstStyle/>
+          <a:p>
+            <a:pPr algn="ctr"/>
+            <a:endParaRPr lang="fr-FR"/>
+          </a:p>
+        </p:txBody>
+      </p:sp>
+      <p:sp>
+        <p:nvSpPr>
+          <p:cNvPr id="8" name="Rectangle 7">
+            <a:extLst>
+              <a:ext uri="{FF2B5EF4-FFF2-40B4-BE49-F238E27FC236}">
+                <a16:creationId xmlns:a16="http://schemas.microsoft.com/office/drawing/2014/main" id="{AA26371A-72C2-466A-8A8B-FE03005B40E6}"/>
+              </a:ext>
+            </a:extLst>
+          </p:cNvPr>
+          <p:cNvSpPr/>
+          <p:nvPr/>
+        </p:nvSpPr>
+        <p:spPr>
+          <a:xfrm>
+            <a:off x="9255577" y="1164917"/>
+            <a:ext cx="2754487" cy="5231039"/>
+          </a:xfrm>
+          <a:prstGeom prst="rect">
+            <a:avLst/>
+          </a:prstGeom>
+          <a:noFill/>
+          <a:ln>
+            <a:solidFill>
+              <a:schemeClr val="tx1"/>
+            </a:solidFill>
+          </a:ln>
+        </p:spPr>
+        <p:style>
+          <a:lnRef idx="2">
+            <a:schemeClr val="accent1">
+              <a:shade val="50000"/>
+            </a:schemeClr>
+          </a:lnRef>
+          <a:fillRef idx="1">
+            <a:schemeClr val="accent1"/>
+          </a:fillRef>
+          <a:effectRef idx="0">
+            <a:schemeClr val="accent1"/>
+          </a:effectRef>
+          <a:fontRef idx="minor">
+            <a:schemeClr val="lt1"/>
+          </a:fontRef>
+        </p:style>
+        <p:txBody>
+          <a:bodyPr rtlCol="0" anchor="ctr"/>
+          <a:lstStyle/>
+          <a:p>
+            <a:pPr algn="ctr"/>
+            <a:endParaRPr lang="fr-FR"/>
+          </a:p>
+        </p:txBody>
+      </p:sp>
+      <p:pic>
+        <p:nvPicPr>
+          <p:cNvPr id="10" name="Image 9">
+            <a:extLst>
+              <a:ext uri="{FF2B5EF4-FFF2-40B4-BE49-F238E27FC236}">
+                <a16:creationId xmlns:a16="http://schemas.microsoft.com/office/drawing/2014/main" id="{F5EE43EC-D2E9-4A69-AE20-748299D08090}"/>
+              </a:ext>
+            </a:extLst>
+          </p:cNvPr>
+          <p:cNvPicPr>
+            <a:picLocks noChangeAspect="1"/>
+          </p:cNvPicPr>
+          <p:nvPr/>
+        </p:nvPicPr>
+        <p:blipFill>
+          <a:blip r:embed="rId3">
+            <a:extLst>
+              <a:ext uri="{28A0092B-C50C-407E-A947-70E740481C1C}">
+                <a14:useLocalDpi xmlns:a14="http://schemas.microsoft.com/office/drawing/2010/main" val="0"/>
+              </a:ext>
+            </a:extLst>
+          </a:blip>
+          <a:stretch>
+            <a:fillRect/>
+          </a:stretch>
+        </p:blipFill>
+        <p:spPr>
+          <a:xfrm>
+            <a:off x="8786258" y="446568"/>
+            <a:ext cx="2640198" cy="686451"/>
+          </a:xfrm>
+          <a:prstGeom prst="rect">
+            <a:avLst/>
+          </a:prstGeom>
+        </p:spPr>
+      </p:pic>
     </p:spTree>
     <p:extLst>
       <p:ext uri="{BB962C8B-B14F-4D97-AF65-F5344CB8AC3E}">
-        <p14:creationId xmlns:p14="http://schemas.microsoft.com/office/powerpoint/2010/main" val="2608142783"/>
+        <p14:creationId xmlns:p14="http://schemas.microsoft.com/office/powerpoint/2010/main" val="3335679860"/>
       </p:ext>
     </p:extLst>
   </p:cSld>
@@ -3876,12 +4308,158 @@
           <a:chExt cx="0" cy="0"/>
         </a:xfrm>
       </p:grpSpPr>
+      <p:sp>
+        <p:nvSpPr>
+          <p:cNvPr id="11" name="Ellipse 10">
+            <a:extLst>
+              <a:ext uri="{FF2B5EF4-FFF2-40B4-BE49-F238E27FC236}">
+                <a16:creationId xmlns:a16="http://schemas.microsoft.com/office/drawing/2014/main" id="{F289E88C-3CB7-498B-9C2A-6C04ADB69B72}"/>
+              </a:ext>
+            </a:extLst>
+          </p:cNvPr>
+          <p:cNvSpPr/>
+          <p:nvPr/>
+        </p:nvSpPr>
+        <p:spPr>
+          <a:xfrm>
+            <a:off x="4771456" y="2664928"/>
+            <a:ext cx="4043399" cy="3770284"/>
+          </a:xfrm>
+          <a:prstGeom prst="ellipse">
+            <a:avLst/>
+          </a:prstGeom>
+          <a:solidFill>
+            <a:srgbClr val="88B9BE"/>
+          </a:solidFill>
+          <a:ln>
+            <a:noFill/>
+          </a:ln>
+        </p:spPr>
+        <p:style>
+          <a:lnRef idx="2">
+            <a:schemeClr val="accent1">
+              <a:shade val="50000"/>
+            </a:schemeClr>
+          </a:lnRef>
+          <a:fillRef idx="1">
+            <a:schemeClr val="accent1"/>
+          </a:fillRef>
+          <a:effectRef idx="0">
+            <a:schemeClr val="accent1"/>
+          </a:effectRef>
+          <a:fontRef idx="minor">
+            <a:schemeClr val="lt1"/>
+          </a:fontRef>
+        </p:style>
+        <p:txBody>
+          <a:bodyPr rtlCol="0" anchor="ctr"/>
+          <a:lstStyle/>
+          <a:p>
+            <a:pPr algn="ctr"/>
+            <a:endParaRPr lang="fr-FR"/>
+          </a:p>
+        </p:txBody>
+      </p:sp>
+      <p:sp>
+        <p:nvSpPr>
+          <p:cNvPr id="2" name="Ellipse 1">
+            <a:extLst>
+              <a:ext uri="{FF2B5EF4-FFF2-40B4-BE49-F238E27FC236}">
+                <a16:creationId xmlns:a16="http://schemas.microsoft.com/office/drawing/2014/main" id="{EFA34EEB-52B2-4C4E-94BD-09D527D7D777}"/>
+              </a:ext>
+            </a:extLst>
+          </p:cNvPr>
+          <p:cNvSpPr/>
+          <p:nvPr/>
+        </p:nvSpPr>
+        <p:spPr>
+          <a:xfrm>
+            <a:off x="2352607" y="796025"/>
+            <a:ext cx="4043399" cy="3770284"/>
+          </a:xfrm>
+          <a:prstGeom prst="ellipse">
+            <a:avLst/>
+          </a:prstGeom>
+          <a:solidFill>
+            <a:srgbClr val="60D8E5"/>
+          </a:solidFill>
+          <a:ln>
+            <a:noFill/>
+          </a:ln>
+        </p:spPr>
+        <p:style>
+          <a:lnRef idx="2">
+            <a:schemeClr val="accent1">
+              <a:shade val="50000"/>
+            </a:schemeClr>
+          </a:lnRef>
+          <a:fillRef idx="1">
+            <a:schemeClr val="accent1"/>
+          </a:fillRef>
+          <a:effectRef idx="0">
+            <a:schemeClr val="accent1"/>
+          </a:effectRef>
+          <a:fontRef idx="minor">
+            <a:schemeClr val="lt1"/>
+          </a:fontRef>
+        </p:style>
+        <p:txBody>
+          <a:bodyPr rtlCol="0" anchor="ctr"/>
+          <a:lstStyle/>
+          <a:p>
+            <a:pPr algn="ctr"/>
+            <a:endParaRPr lang="fr-FR"/>
+          </a:p>
+        </p:txBody>
+      </p:sp>
+      <p:sp>
+        <p:nvSpPr>
+          <p:cNvPr id="9" name="ZoneTexte 8">
+            <a:extLst>
+              <a:ext uri="{FF2B5EF4-FFF2-40B4-BE49-F238E27FC236}">
+                <a16:creationId xmlns:a16="http://schemas.microsoft.com/office/drawing/2014/main" id="{29E704EF-0DC2-4823-97A3-6694FCC299FE}"/>
+              </a:ext>
+            </a:extLst>
+          </p:cNvPr>
+          <p:cNvSpPr txBox="1"/>
+          <p:nvPr/>
+        </p:nvSpPr>
+        <p:spPr>
+          <a:xfrm>
+            <a:off x="77947" y="67542"/>
+            <a:ext cx="4911741" cy="1077218"/>
+          </a:xfrm>
+          <a:prstGeom prst="rect">
+            <a:avLst/>
+          </a:prstGeom>
+          <a:noFill/>
+        </p:spPr>
+        <p:txBody>
+          <a:bodyPr wrap="square" rtlCol="0">
+            <a:spAutoFit/>
+          </a:bodyPr>
+          <a:lstStyle/>
+          <a:p>
+            <a:r>
+              <a:rPr lang="fr-FR" sz="3200" dirty="0">
+                <a:latin typeface="Nunito Sans" panose="00000500000000000000" pitchFamily="2" charset="0"/>
+              </a:rPr>
+              <a:t>Planche de tendances</a:t>
+            </a:r>
+          </a:p>
+          <a:p>
+            <a:endParaRPr lang="fr-FR" sz="3200" dirty="0">
+              <a:latin typeface="Nunito Sans" panose="00000500000000000000" pitchFamily="2" charset="0"/>
+            </a:endParaRPr>
+          </a:p>
+        </p:txBody>
+      </p:sp>
       <p:pic>
         <p:nvPicPr>
-          <p:cNvPr id="49" name="Image 48">
-            <a:extLst>
-              <a:ext uri="{FF2B5EF4-FFF2-40B4-BE49-F238E27FC236}">
-                <a16:creationId xmlns:a16="http://schemas.microsoft.com/office/drawing/2014/main" id="{095AA012-5584-4589-B5BD-6185592E4D3E}"/>
+          <p:cNvPr id="5" name="Image 4">
+            <a:extLst>
+              <a:ext uri="{FF2B5EF4-FFF2-40B4-BE49-F238E27FC236}">
+                <a16:creationId xmlns:a16="http://schemas.microsoft.com/office/drawing/2014/main" id="{1CF56772-1BA3-4517-BB88-4FDBA9DA1A91}"/>
               </a:ext>
             </a:extLst>
           </p:cNvPr>
@@ -3903,15 +4481,275 @@
           </a:stretch>
         </p:blipFill>
         <p:spPr>
-          <a:xfrm>
-            <a:off x="9567333" y="-4120"/>
-            <a:ext cx="2624667" cy="686451"/>
+          <a:xfrm rot="20814366">
+            <a:off x="1713662" y="3453333"/>
+            <a:ext cx="3338928" cy="2225952"/>
           </a:xfrm>
           <a:prstGeom prst="rect">
             <a:avLst/>
           </a:prstGeom>
+          <a:ln>
+            <a:noFill/>
+          </a:ln>
+          <a:effectLst>
+            <a:outerShdw blurRad="292100" dist="139700" dir="2700000" algn="tl" rotWithShape="0">
+              <a:srgbClr val="333333">
+                <a:alpha val="65000"/>
+              </a:srgbClr>
+            </a:outerShdw>
+          </a:effectLst>
         </p:spPr>
       </p:pic>
+      <p:pic>
+        <p:nvPicPr>
+          <p:cNvPr id="6" name="Image 5">
+            <a:extLst>
+              <a:ext uri="{FF2B5EF4-FFF2-40B4-BE49-F238E27FC236}">
+                <a16:creationId xmlns:a16="http://schemas.microsoft.com/office/drawing/2014/main" id="{2A0780C7-5A35-40AB-A924-9B3568366F2F}"/>
+              </a:ext>
+            </a:extLst>
+          </p:cNvPr>
+          <p:cNvPicPr>
+            <a:picLocks noChangeAspect="1"/>
+          </p:cNvPicPr>
+          <p:nvPr/>
+        </p:nvPicPr>
+        <p:blipFill>
+          <a:blip r:embed="rId3">
+            <a:extLst>
+              <a:ext uri="{28A0092B-C50C-407E-A947-70E740481C1C}">
+                <a14:useLocalDpi xmlns:a14="http://schemas.microsoft.com/office/drawing/2010/main" val="0"/>
+              </a:ext>
+            </a:extLst>
+          </a:blip>
+          <a:stretch>
+            <a:fillRect/>
+          </a:stretch>
+        </p:blipFill>
+        <p:spPr>
+          <a:xfrm rot="964786">
+            <a:off x="1031881" y="1149259"/>
+            <a:ext cx="3621194" cy="2035839"/>
+          </a:xfrm>
+          <a:prstGeom prst="rect">
+            <a:avLst/>
+          </a:prstGeom>
+          <a:ln>
+            <a:noFill/>
+          </a:ln>
+          <a:effectLst>
+            <a:outerShdw blurRad="292100" dist="139700" dir="2700000" algn="tl" rotWithShape="0">
+              <a:srgbClr val="333333">
+                <a:alpha val="65000"/>
+              </a:srgbClr>
+            </a:outerShdw>
+          </a:effectLst>
+        </p:spPr>
+      </p:pic>
+      <p:pic>
+        <p:nvPicPr>
+          <p:cNvPr id="7" name="Image 6">
+            <a:extLst>
+              <a:ext uri="{FF2B5EF4-FFF2-40B4-BE49-F238E27FC236}">
+                <a16:creationId xmlns:a16="http://schemas.microsoft.com/office/drawing/2014/main" id="{5B63ED8E-1A0B-43BD-A347-AA7B73A7B29E}"/>
+              </a:ext>
+            </a:extLst>
+          </p:cNvPr>
+          <p:cNvPicPr>
+            <a:picLocks noChangeAspect="1"/>
+          </p:cNvPicPr>
+          <p:nvPr/>
+        </p:nvPicPr>
+        <p:blipFill>
+          <a:blip r:embed="rId4">
+            <a:extLst>
+              <a:ext uri="{28A0092B-C50C-407E-A947-70E740481C1C}">
+                <a14:useLocalDpi xmlns:a14="http://schemas.microsoft.com/office/drawing/2010/main" val="0"/>
+              </a:ext>
+            </a:extLst>
+          </a:blip>
+          <a:stretch>
+            <a:fillRect/>
+          </a:stretch>
+        </p:blipFill>
+        <p:spPr>
+          <a:xfrm>
+            <a:off x="5337449" y="422186"/>
+            <a:ext cx="3101048" cy="2072346"/>
+          </a:xfrm>
+          <a:prstGeom prst="rect">
+            <a:avLst/>
+          </a:prstGeom>
+          <a:ln>
+            <a:noFill/>
+          </a:ln>
+          <a:effectLst>
+            <a:outerShdw blurRad="292100" dist="139700" dir="2700000" algn="tl" rotWithShape="0">
+              <a:srgbClr val="333333">
+                <a:alpha val="65000"/>
+              </a:srgbClr>
+            </a:outerShdw>
+          </a:effectLst>
+        </p:spPr>
+      </p:pic>
+      <p:pic>
+        <p:nvPicPr>
+          <p:cNvPr id="8" name="Image 7">
+            <a:extLst>
+              <a:ext uri="{FF2B5EF4-FFF2-40B4-BE49-F238E27FC236}">
+                <a16:creationId xmlns:a16="http://schemas.microsoft.com/office/drawing/2014/main" id="{6C1A53F9-18A5-47C6-8C6C-61FAFABE9A0D}"/>
+              </a:ext>
+            </a:extLst>
+          </p:cNvPr>
+          <p:cNvPicPr>
+            <a:picLocks noChangeAspect="1"/>
+          </p:cNvPicPr>
+          <p:nvPr/>
+        </p:nvPicPr>
+        <p:blipFill>
+          <a:blip r:embed="rId5">
+            <a:extLst>
+              <a:ext uri="{28A0092B-C50C-407E-A947-70E740481C1C}">
+                <a14:useLocalDpi xmlns:a14="http://schemas.microsoft.com/office/drawing/2010/main" val="0"/>
+              </a:ext>
+            </a:extLst>
+          </a:blip>
+          <a:stretch>
+            <a:fillRect/>
+          </a:stretch>
+        </p:blipFill>
+        <p:spPr>
+          <a:xfrm>
+            <a:off x="8130709" y="1508267"/>
+            <a:ext cx="2962381" cy="1972530"/>
+          </a:xfrm>
+          <a:prstGeom prst="rect">
+            <a:avLst/>
+          </a:prstGeom>
+          <a:ln>
+            <a:noFill/>
+          </a:ln>
+          <a:effectLst>
+            <a:outerShdw blurRad="292100" dist="139700" dir="2700000" algn="tl" rotWithShape="0">
+              <a:srgbClr val="333333">
+                <a:alpha val="65000"/>
+              </a:srgbClr>
+            </a:outerShdw>
+          </a:effectLst>
+        </p:spPr>
+      </p:pic>
+      <p:pic>
+        <p:nvPicPr>
+          <p:cNvPr id="10" name="Image 9">
+            <a:extLst>
+              <a:ext uri="{FF2B5EF4-FFF2-40B4-BE49-F238E27FC236}">
+                <a16:creationId xmlns:a16="http://schemas.microsoft.com/office/drawing/2014/main" id="{1AAC9C7C-DD50-48F8-89E7-717D351B9585}"/>
+              </a:ext>
+            </a:extLst>
+          </p:cNvPr>
+          <p:cNvPicPr>
+            <a:picLocks noChangeAspect="1"/>
+          </p:cNvPicPr>
+          <p:nvPr/>
+        </p:nvPicPr>
+        <p:blipFill>
+          <a:blip r:embed="rId6">
+            <a:extLst>
+              <a:ext uri="{28A0092B-C50C-407E-A947-70E740481C1C}">
+                <a14:useLocalDpi xmlns:a14="http://schemas.microsoft.com/office/drawing/2010/main" val="0"/>
+              </a:ext>
+            </a:extLst>
+          </a:blip>
+          <a:stretch>
+            <a:fillRect/>
+          </a:stretch>
+        </p:blipFill>
+        <p:spPr>
+          <a:xfrm rot="686313">
+            <a:off x="7262561" y="3300744"/>
+            <a:ext cx="3747977" cy="2498651"/>
+          </a:xfrm>
+          <a:prstGeom prst="rect">
+            <a:avLst/>
+          </a:prstGeom>
+          <a:ln>
+            <a:noFill/>
+          </a:ln>
+          <a:effectLst>
+            <a:outerShdw blurRad="292100" dist="139700" dir="2700000" algn="tl" rotWithShape="0">
+              <a:srgbClr val="333333">
+                <a:alpha val="65000"/>
+              </a:srgbClr>
+            </a:outerShdw>
+          </a:effectLst>
+        </p:spPr>
+      </p:pic>
+      <p:pic>
+        <p:nvPicPr>
+          <p:cNvPr id="12" name="Image 11">
+            <a:extLst>
+              <a:ext uri="{FF2B5EF4-FFF2-40B4-BE49-F238E27FC236}">
+                <a16:creationId xmlns:a16="http://schemas.microsoft.com/office/drawing/2014/main" id="{9FBE401D-0D01-4C31-8A1F-C689CB139776}"/>
+              </a:ext>
+            </a:extLst>
+          </p:cNvPr>
+          <p:cNvPicPr>
+            <a:picLocks noChangeAspect="1"/>
+          </p:cNvPicPr>
+          <p:nvPr/>
+        </p:nvPicPr>
+        <p:blipFill>
+          <a:blip r:embed="rId7">
+            <a:extLst>
+              <a:ext uri="{28A0092B-C50C-407E-A947-70E740481C1C}">
+                <a14:useLocalDpi xmlns:a14="http://schemas.microsoft.com/office/drawing/2010/main" val="0"/>
+              </a:ext>
+            </a:extLst>
+          </a:blip>
+          <a:stretch>
+            <a:fillRect/>
+          </a:stretch>
+        </p:blipFill>
+        <p:spPr>
+          <a:xfrm>
+            <a:off x="8786258" y="446568"/>
+            <a:ext cx="2640198" cy="686451"/>
+          </a:xfrm>
+          <a:prstGeom prst="rect">
+            <a:avLst/>
+          </a:prstGeom>
+        </p:spPr>
+      </p:pic>
+    </p:spTree>
+    <p:extLst>
+      <p:ext uri="{BB962C8B-B14F-4D97-AF65-F5344CB8AC3E}">
+        <p14:creationId xmlns:p14="http://schemas.microsoft.com/office/powerpoint/2010/main" val="2608142783"/>
+      </p:ext>
+    </p:extLst>
+  </p:cSld>
+  <p:clrMapOvr>
+    <a:masterClrMapping/>
+  </p:clrMapOvr>
+</p:sld>
+</file>
+
+<file path=ppt/slides/slide15.xml><?xml version="1.0" encoding="utf-8"?>
+<p:sld xmlns:a="http://schemas.openxmlformats.org/drawingml/2006/main" xmlns:r="http://schemas.openxmlformats.org/officeDocument/2006/relationships" xmlns:p="http://schemas.openxmlformats.org/presentationml/2006/main">
+  <p:cSld>
+    <p:spTree>
+      <p:nvGrpSpPr>
+        <p:cNvPr id="1" name=""/>
+        <p:cNvGrpSpPr/>
+        <p:nvPr/>
+      </p:nvGrpSpPr>
+      <p:grpSpPr>
+        <a:xfrm>
+          <a:off x="0" y="0"/>
+          <a:ext cx="0" cy="0"/>
+          <a:chOff x="0" y="0"/>
+          <a:chExt cx="0" cy="0"/>
+        </a:xfrm>
+      </p:grpSpPr>
       <p:sp>
         <p:nvSpPr>
           <p:cNvPr id="9" name="ZoneTexte 8">
@@ -3949,6 +4787,258 @@
           </a:p>
         </p:txBody>
       </p:sp>
+      <p:pic>
+        <p:nvPicPr>
+          <p:cNvPr id="6" name="Image 5">
+            <a:extLst>
+              <a:ext uri="{FF2B5EF4-FFF2-40B4-BE49-F238E27FC236}">
+                <a16:creationId xmlns:a16="http://schemas.microsoft.com/office/drawing/2014/main" id="{9A8E9B70-5EF0-4EA0-BFFD-CB38C6378CA3}"/>
+              </a:ext>
+            </a:extLst>
+          </p:cNvPr>
+          <p:cNvPicPr>
+            <a:picLocks noChangeAspect="1"/>
+          </p:cNvPicPr>
+          <p:nvPr/>
+        </p:nvPicPr>
+        <p:blipFill>
+          <a:blip r:embed="rId2">
+            <a:extLst>
+              <a:ext uri="{28A0092B-C50C-407E-A947-70E740481C1C}">
+                <a14:useLocalDpi xmlns:a14="http://schemas.microsoft.com/office/drawing/2010/main" val="0"/>
+              </a:ext>
+            </a:extLst>
+          </a:blip>
+          <a:stretch>
+            <a:fillRect/>
+          </a:stretch>
+        </p:blipFill>
+        <p:spPr>
+          <a:xfrm>
+            <a:off x="439635" y="1218080"/>
+            <a:ext cx="557323" cy="557323"/>
+          </a:xfrm>
+          <a:prstGeom prst="rect">
+            <a:avLst/>
+          </a:prstGeom>
+        </p:spPr>
+      </p:pic>
+      <p:pic>
+        <p:nvPicPr>
+          <p:cNvPr id="8" name="Image 7">
+            <a:extLst>
+              <a:ext uri="{FF2B5EF4-FFF2-40B4-BE49-F238E27FC236}">
+                <a16:creationId xmlns:a16="http://schemas.microsoft.com/office/drawing/2014/main" id="{DACE1F34-968A-4C67-AE0B-5C2E7D870BCF}"/>
+              </a:ext>
+            </a:extLst>
+          </p:cNvPr>
+          <p:cNvPicPr>
+            <a:picLocks noChangeAspect="1"/>
+          </p:cNvPicPr>
+          <p:nvPr/>
+        </p:nvPicPr>
+        <p:blipFill>
+          <a:blip r:embed="rId3">
+            <a:extLst>
+              <a:ext uri="{28A0092B-C50C-407E-A947-70E740481C1C}">
+                <a14:useLocalDpi xmlns:a14="http://schemas.microsoft.com/office/drawing/2010/main" val="0"/>
+              </a:ext>
+            </a:extLst>
+          </a:blip>
+          <a:stretch>
+            <a:fillRect/>
+          </a:stretch>
+        </p:blipFill>
+        <p:spPr>
+          <a:xfrm>
+            <a:off x="439635" y="1775403"/>
+            <a:ext cx="431948" cy="431948"/>
+          </a:xfrm>
+          <a:prstGeom prst="rect">
+            <a:avLst/>
+          </a:prstGeom>
+        </p:spPr>
+      </p:pic>
+      <p:pic>
+        <p:nvPicPr>
+          <p:cNvPr id="11" name="Image 10">
+            <a:extLst>
+              <a:ext uri="{FF2B5EF4-FFF2-40B4-BE49-F238E27FC236}">
+                <a16:creationId xmlns:a16="http://schemas.microsoft.com/office/drawing/2014/main" id="{AD7766E2-F709-411D-9FCE-CF73240EE250}"/>
+              </a:ext>
+            </a:extLst>
+          </p:cNvPr>
+          <p:cNvPicPr>
+            <a:picLocks noChangeAspect="1"/>
+          </p:cNvPicPr>
+          <p:nvPr/>
+        </p:nvPicPr>
+        <p:blipFill>
+          <a:blip r:embed="rId4">
+            <a:extLst>
+              <a:ext uri="{28A0092B-C50C-407E-A947-70E740481C1C}">
+                <a14:useLocalDpi xmlns:a14="http://schemas.microsoft.com/office/drawing/2010/main" val="0"/>
+              </a:ext>
+            </a:extLst>
+          </a:blip>
+          <a:stretch>
+            <a:fillRect/>
+          </a:stretch>
+        </p:blipFill>
+        <p:spPr>
+          <a:xfrm>
+            <a:off x="996958" y="1300484"/>
+            <a:ext cx="484474" cy="484474"/>
+          </a:xfrm>
+          <a:prstGeom prst="rect">
+            <a:avLst/>
+          </a:prstGeom>
+        </p:spPr>
+      </p:pic>
+      <p:pic>
+        <p:nvPicPr>
+          <p:cNvPr id="13" name="Image 12">
+            <a:extLst>
+              <a:ext uri="{FF2B5EF4-FFF2-40B4-BE49-F238E27FC236}">
+                <a16:creationId xmlns:a16="http://schemas.microsoft.com/office/drawing/2014/main" id="{C47376CB-3FDE-487F-AFA8-AD2412696266}"/>
+              </a:ext>
+            </a:extLst>
+          </p:cNvPr>
+          <p:cNvPicPr>
+            <a:picLocks noChangeAspect="1"/>
+          </p:cNvPicPr>
+          <p:nvPr/>
+        </p:nvPicPr>
+        <p:blipFill>
+          <a:blip r:embed="rId5">
+            <a:extLst>
+              <a:ext uri="{28A0092B-C50C-407E-A947-70E740481C1C}">
+                <a14:useLocalDpi xmlns:a14="http://schemas.microsoft.com/office/drawing/2010/main" val="0"/>
+              </a:ext>
+            </a:extLst>
+          </a:blip>
+          <a:stretch>
+            <a:fillRect/>
+          </a:stretch>
+        </p:blipFill>
+        <p:spPr>
+          <a:xfrm>
+            <a:off x="1032656" y="1830304"/>
+            <a:ext cx="431948" cy="431948"/>
+          </a:xfrm>
+          <a:prstGeom prst="rect">
+            <a:avLst/>
+          </a:prstGeom>
+        </p:spPr>
+      </p:pic>
+      <p:pic>
+        <p:nvPicPr>
+          <p:cNvPr id="3" name="Image 2">
+            <a:extLst>
+              <a:ext uri="{FF2B5EF4-FFF2-40B4-BE49-F238E27FC236}">
+                <a16:creationId xmlns:a16="http://schemas.microsoft.com/office/drawing/2014/main" id="{5A4FAA11-6BE9-478D-B42C-018989415F6C}"/>
+              </a:ext>
+            </a:extLst>
+          </p:cNvPr>
+          <p:cNvPicPr>
+            <a:picLocks noChangeAspect="1"/>
+          </p:cNvPicPr>
+          <p:nvPr/>
+        </p:nvPicPr>
+        <p:blipFill>
+          <a:blip r:embed="rId6">
+            <a:extLst>
+              <a:ext uri="{28A0092B-C50C-407E-A947-70E740481C1C}">
+                <a14:useLocalDpi xmlns:a14="http://schemas.microsoft.com/office/drawing/2010/main" val="0"/>
+              </a:ext>
+            </a:extLst>
+          </a:blip>
+          <a:stretch>
+            <a:fillRect/>
+          </a:stretch>
+        </p:blipFill>
+        <p:spPr>
+          <a:xfrm>
+            <a:off x="1830968" y="1025329"/>
+            <a:ext cx="1991003" cy="1609950"/>
+          </a:xfrm>
+          <a:prstGeom prst="rect">
+            <a:avLst/>
+          </a:prstGeom>
+        </p:spPr>
+      </p:pic>
+      <p:pic>
+        <p:nvPicPr>
+          <p:cNvPr id="15" name="Image 14">
+            <a:extLst>
+              <a:ext uri="{FF2B5EF4-FFF2-40B4-BE49-F238E27FC236}">
+                <a16:creationId xmlns:a16="http://schemas.microsoft.com/office/drawing/2014/main" id="{8A456185-6357-4F99-A6D3-F9C87F4C4996}"/>
+              </a:ext>
+            </a:extLst>
+          </p:cNvPr>
+          <p:cNvPicPr>
+            <a:picLocks noChangeAspect="1"/>
+          </p:cNvPicPr>
+          <p:nvPr/>
+        </p:nvPicPr>
+        <p:blipFill>
+          <a:blip r:embed="rId7">
+            <a:extLst>
+              <a:ext uri="{28A0092B-C50C-407E-A947-70E740481C1C}">
+                <a14:useLocalDpi xmlns:a14="http://schemas.microsoft.com/office/drawing/2010/main" val="0"/>
+              </a:ext>
+            </a:extLst>
+          </a:blip>
+          <a:stretch>
+            <a:fillRect/>
+          </a:stretch>
+        </p:blipFill>
+        <p:spPr>
+          <a:xfrm>
+            <a:off x="439635" y="2764674"/>
+            <a:ext cx="3429254" cy="3429254"/>
+          </a:xfrm>
+          <a:prstGeom prst="rect">
+            <a:avLst/>
+          </a:prstGeom>
+        </p:spPr>
+      </p:pic>
+      <p:pic>
+        <p:nvPicPr>
+          <p:cNvPr id="12" name="Image 11">
+            <a:extLst>
+              <a:ext uri="{FF2B5EF4-FFF2-40B4-BE49-F238E27FC236}">
+                <a16:creationId xmlns:a16="http://schemas.microsoft.com/office/drawing/2014/main" id="{68E9D8F7-3487-4CC3-9D1A-EE6C097ADD9E}"/>
+              </a:ext>
+            </a:extLst>
+          </p:cNvPr>
+          <p:cNvPicPr>
+            <a:picLocks noChangeAspect="1"/>
+          </p:cNvPicPr>
+          <p:nvPr/>
+        </p:nvPicPr>
+        <p:blipFill>
+          <a:blip r:embed="rId8">
+            <a:extLst>
+              <a:ext uri="{28A0092B-C50C-407E-A947-70E740481C1C}">
+                <a14:useLocalDpi xmlns:a14="http://schemas.microsoft.com/office/drawing/2010/main" val="0"/>
+              </a:ext>
+            </a:extLst>
+          </a:blip>
+          <a:stretch>
+            <a:fillRect/>
+          </a:stretch>
+        </p:blipFill>
+        <p:spPr>
+          <a:xfrm>
+            <a:off x="8786258" y="446568"/>
+            <a:ext cx="2640198" cy="686451"/>
+          </a:xfrm>
+          <a:prstGeom prst="rect">
+            <a:avLst/>
+          </a:prstGeom>
+        </p:spPr>
+      </p:pic>
     </p:spTree>
     <p:extLst>
       <p:ext uri="{BB962C8B-B14F-4D97-AF65-F5344CB8AC3E}">
@@ -3981,10 +5071,10 @@
       </p:grpSpPr>
       <p:pic>
         <p:nvPicPr>
-          <p:cNvPr id="4" name="Image 3">
-            <a:extLst>
-              <a:ext uri="{FF2B5EF4-FFF2-40B4-BE49-F238E27FC236}">
-                <a16:creationId xmlns:a16="http://schemas.microsoft.com/office/drawing/2014/main" id="{73C06D9E-47A3-42D2-9C61-BC112CF18DDD}"/>
+          <p:cNvPr id="8" name="Image 7">
+            <a:extLst>
+              <a:ext uri="{FF2B5EF4-FFF2-40B4-BE49-F238E27FC236}">
+                <a16:creationId xmlns:a16="http://schemas.microsoft.com/office/drawing/2014/main" id="{2BB7F850-4B86-4DBF-98FE-A9A7046C0979}"/>
               </a:ext>
             </a:extLst>
           </p:cNvPr>
@@ -4007,8 +5097,8 @@
         </p:blipFill>
         <p:spPr>
           <a:xfrm>
-            <a:off x="4056528" y="1916668"/>
-            <a:ext cx="4078941" cy="1066800"/>
+            <a:off x="-1" y="-691116"/>
+            <a:ext cx="12192000" cy="6858000"/>
           </a:xfrm>
           <a:prstGeom prst="rect">
             <a:avLst/>
@@ -4030,7 +5120,7 @@
         <p:spPr>
           <a:xfrm>
             <a:off x="1184274" y="3822701"/>
-            <a:ext cx="9823450" cy="1477328"/>
+            <a:ext cx="9823450" cy="923330"/>
           </a:xfrm>
           <a:prstGeom prst="rect">
             <a:avLst/>
@@ -4067,48 +5157,119 @@
               <a:rPr lang="fr-FR" dirty="0">
                 <a:latin typeface="Nunito Sans" panose="00000500000000000000" pitchFamily="2" charset="0"/>
               </a:rPr>
-              <a:t> et </a:t>
-            </a:r>
-            <a:r>
-              <a:rPr lang="fr-FR" dirty="0" err="1">
-                <a:latin typeface="Nunito Sans" panose="00000500000000000000" pitchFamily="2" charset="0"/>
-              </a:rPr>
-              <a:t>seen</a:t>
-            </a:r>
-            <a:r>
-              <a:rPr lang="fr-FR" dirty="0">
-                <a:latin typeface="Nunito Sans" panose="00000500000000000000" pitchFamily="2" charset="0"/>
-              </a:rPr>
-              <a:t> se voit attribuer la vue.</a:t>
-            </a:r>
-          </a:p>
-          <a:p>
-            <a:endParaRPr lang="fr-FR" dirty="0">
-              <a:latin typeface="Nunito Sans" panose="00000500000000000000" pitchFamily="2" charset="0"/>
-            </a:endParaRPr>
-          </a:p>
-          <a:p>
-            <a:r>
-              <a:rPr lang="fr-FR" dirty="0">
-                <a:latin typeface="Nunito Sans" panose="00000500000000000000" pitchFamily="2" charset="0"/>
-              </a:rPr>
-              <a:t>Le préfixe Un s’efface au profit de </a:t>
-            </a:r>
-            <a:r>
-              <a:rPr lang="fr-FR" dirty="0" err="1">
-                <a:latin typeface="Nunito Sans" panose="00000500000000000000" pitchFamily="2" charset="0"/>
-              </a:rPr>
-              <a:t>seen</a:t>
-            </a:r>
-            <a:r>
-              <a:rPr lang="fr-FR" dirty="0">
-                <a:latin typeface="Nunito Sans" panose="00000500000000000000" pitchFamily="2" charset="0"/>
-              </a:rPr>
-              <a:t> au même titre que quelqu’un d’invisible s’efface.</a:t>
-            </a:r>
-          </a:p>
-        </p:txBody>
-      </p:sp>
+              <a:t> et               se voit attribuer la vue.</a:t>
+            </a:r>
+          </a:p>
+        </p:txBody>
+      </p:sp>
+      <p:pic>
+        <p:nvPicPr>
+          <p:cNvPr id="7" name="Image 6">
+            <a:extLst>
+              <a:ext uri="{FF2B5EF4-FFF2-40B4-BE49-F238E27FC236}">
+                <a16:creationId xmlns:a16="http://schemas.microsoft.com/office/drawing/2014/main" id="{0B0A8D40-95E4-456E-82E9-189EF2230570}"/>
+              </a:ext>
+            </a:extLst>
+          </p:cNvPr>
+          <p:cNvPicPr>
+            <a:picLocks noChangeAspect="1"/>
+          </p:cNvPicPr>
+          <p:nvPr/>
+        </p:nvPicPr>
+        <p:blipFill>
+          <a:blip r:embed="rId3">
+            <a:extLst>
+              <a:ext uri="{28A0092B-C50C-407E-A947-70E740481C1C}">
+                <a14:useLocalDpi xmlns:a14="http://schemas.microsoft.com/office/drawing/2010/main" val="0"/>
+              </a:ext>
+            </a:extLst>
+          </a:blip>
+          <a:stretch>
+            <a:fillRect/>
+          </a:stretch>
+        </p:blipFill>
+        <p:spPr>
+          <a:xfrm>
+            <a:off x="7763986" y="4162247"/>
+            <a:ext cx="371483" cy="216237"/>
+          </a:xfrm>
+          <a:prstGeom prst="rect">
+            <a:avLst/>
+          </a:prstGeom>
+        </p:spPr>
+      </p:pic>
+      <p:pic>
+        <p:nvPicPr>
+          <p:cNvPr id="9" name="Image 8">
+            <a:extLst>
+              <a:ext uri="{FF2B5EF4-FFF2-40B4-BE49-F238E27FC236}">
+                <a16:creationId xmlns:a16="http://schemas.microsoft.com/office/drawing/2014/main" id="{D393854F-1213-485D-BF9B-793BD096172A}"/>
+              </a:ext>
+            </a:extLst>
+          </p:cNvPr>
+          <p:cNvPicPr>
+            <a:picLocks noChangeAspect="1"/>
+          </p:cNvPicPr>
+          <p:nvPr/>
+        </p:nvPicPr>
+        <p:blipFill>
+          <a:blip r:embed="rId4">
+            <a:extLst>
+              <a:ext uri="{28A0092B-C50C-407E-A947-70E740481C1C}">
+                <a14:useLocalDpi xmlns:a14="http://schemas.microsoft.com/office/drawing/2010/main" val="0"/>
+              </a:ext>
+            </a:extLst>
+          </a:blip>
+          <a:stretch>
+            <a:fillRect/>
+          </a:stretch>
+        </p:blipFill>
+        <p:spPr>
+          <a:xfrm>
+            <a:off x="10192935" y="4195603"/>
+            <a:ext cx="737239" cy="182881"/>
+          </a:xfrm>
+          <a:prstGeom prst="rect">
+            <a:avLst/>
+          </a:prstGeom>
+        </p:spPr>
+      </p:pic>
+      <p:pic>
+        <p:nvPicPr>
+          <p:cNvPr id="10" name="Image 9">
+            <a:extLst>
+              <a:ext uri="{FF2B5EF4-FFF2-40B4-BE49-F238E27FC236}">
+                <a16:creationId xmlns:a16="http://schemas.microsoft.com/office/drawing/2014/main" id="{112F4A78-FA01-4F0E-9266-FD0360EB71C3}"/>
+              </a:ext>
+            </a:extLst>
+          </p:cNvPr>
+          <p:cNvPicPr>
+            <a:picLocks noChangeAspect="1"/>
+          </p:cNvPicPr>
+          <p:nvPr/>
+        </p:nvPicPr>
+        <p:blipFill>
+          <a:blip r:embed="rId4">
+            <a:extLst>
+              <a:ext uri="{28A0092B-C50C-407E-A947-70E740481C1C}">
+                <a14:useLocalDpi xmlns:a14="http://schemas.microsoft.com/office/drawing/2010/main" val="0"/>
+              </a:ext>
+            </a:extLst>
+          </a:blip>
+          <a:stretch>
+            <a:fillRect/>
+          </a:stretch>
+        </p:blipFill>
+        <p:spPr>
+          <a:xfrm>
+            <a:off x="1560903" y="4469924"/>
+            <a:ext cx="737239" cy="182881"/>
+          </a:xfrm>
+          <a:prstGeom prst="rect">
+            <a:avLst/>
+          </a:prstGeom>
+        </p:spPr>
+      </p:pic>
     </p:spTree>
     <p:extLst>
       <p:ext uri="{BB962C8B-B14F-4D97-AF65-F5344CB8AC3E}">
@@ -4153,8 +5314,8 @@
         </p:nvSpPr>
         <p:spPr>
           <a:xfrm>
-            <a:off x="1056216" y="2050345"/>
-            <a:ext cx="9823450" cy="3139321"/>
+            <a:off x="1056216" y="1720735"/>
+            <a:ext cx="9823450" cy="3693319"/>
           </a:xfrm>
           <a:prstGeom prst="rect">
             <a:avLst/>
@@ -4228,14 +5389,39 @@
               <a:t>Il s’adaptera sans problème à toutes les tailles d’écran.</a:t>
             </a:r>
           </a:p>
+          <a:p>
+            <a:endParaRPr lang="fr-FR" dirty="0">
+              <a:latin typeface="Nunito Sans" panose="00000500000000000000" pitchFamily="2" charset="0"/>
+            </a:endParaRPr>
+          </a:p>
+          <a:p>
+            <a:r>
+              <a:rPr lang="fr-FR" dirty="0">
+                <a:latin typeface="Nunito Sans" panose="00000500000000000000" pitchFamily="2" charset="0"/>
+              </a:rPr>
+              <a:t>Les technologies utilisées dans cette exercice sont HTML, CSS, </a:t>
+            </a:r>
+            <a:r>
+              <a:rPr lang="fr-FR" dirty="0" err="1">
+                <a:latin typeface="Nunito Sans" panose="00000500000000000000" pitchFamily="2" charset="0"/>
+              </a:rPr>
+              <a:t>Figma</a:t>
+            </a:r>
+            <a:r>
+              <a:rPr lang="fr-FR" dirty="0">
+                <a:latin typeface="Nunito Sans" panose="00000500000000000000" pitchFamily="2" charset="0"/>
+              </a:rPr>
+              <a:t>, Photoshop et Illustrator.</a:t>
+            </a:r>
+          </a:p>
         </p:txBody>
       </p:sp>
       <p:pic>
         <p:nvPicPr>
-          <p:cNvPr id="6" name="Image 5">
-            <a:extLst>
-              <a:ext uri="{FF2B5EF4-FFF2-40B4-BE49-F238E27FC236}">
-                <a16:creationId xmlns:a16="http://schemas.microsoft.com/office/drawing/2014/main" id="{05DCFB71-9C1A-4E6D-9F66-595F52FAE89F}"/>
+          <p:cNvPr id="3" name="Image 2">
+            <a:extLst>
+              <a:ext uri="{FF2B5EF4-FFF2-40B4-BE49-F238E27FC236}">
+                <a16:creationId xmlns:a16="http://schemas.microsoft.com/office/drawing/2014/main" id="{122EE12B-875F-4CB8-B689-B94210176602}"/>
               </a:ext>
             </a:extLst>
           </p:cNvPr>
@@ -4258,8 +5444,8 @@
         </p:blipFill>
         <p:spPr>
           <a:xfrm>
-            <a:off x="9567333" y="-4120"/>
-            <a:ext cx="2624667" cy="686451"/>
+            <a:off x="8786258" y="446568"/>
+            <a:ext cx="2640198" cy="686451"/>
           </a:xfrm>
           <a:prstGeom prst="rect">
             <a:avLst/>
@@ -6449,42 +7635,6 @@
           </a:p>
         </p:txBody>
       </p:sp>
-      <p:pic>
-        <p:nvPicPr>
-          <p:cNvPr id="49" name="Image 48">
-            <a:extLst>
-              <a:ext uri="{FF2B5EF4-FFF2-40B4-BE49-F238E27FC236}">
-                <a16:creationId xmlns:a16="http://schemas.microsoft.com/office/drawing/2014/main" id="{095AA012-5584-4589-B5BD-6185592E4D3E}"/>
-              </a:ext>
-            </a:extLst>
-          </p:cNvPr>
-          <p:cNvPicPr>
-            <a:picLocks noChangeAspect="1"/>
-          </p:cNvPicPr>
-          <p:nvPr/>
-        </p:nvPicPr>
-        <p:blipFill>
-          <a:blip r:embed="rId2">
-            <a:extLst>
-              <a:ext uri="{28A0092B-C50C-407E-A947-70E740481C1C}">
-                <a14:useLocalDpi xmlns:a14="http://schemas.microsoft.com/office/drawing/2010/main" val="0"/>
-              </a:ext>
-            </a:extLst>
-          </a:blip>
-          <a:stretch>
-            <a:fillRect/>
-          </a:stretch>
-        </p:blipFill>
-        <p:spPr>
-          <a:xfrm>
-            <a:off x="9567333" y="-4120"/>
-            <a:ext cx="2624667" cy="686451"/>
-          </a:xfrm>
-          <a:prstGeom prst="rect">
-            <a:avLst/>
-          </a:prstGeom>
-        </p:spPr>
-      </p:pic>
       <p:sp>
         <p:nvSpPr>
           <p:cNvPr id="2" name="Rectangle 1">
@@ -6537,6 +7687,42 @@
           </a:p>
         </p:txBody>
       </p:sp>
+      <p:pic>
+        <p:nvPicPr>
+          <p:cNvPr id="52" name="Image 51">
+            <a:extLst>
+              <a:ext uri="{FF2B5EF4-FFF2-40B4-BE49-F238E27FC236}">
+                <a16:creationId xmlns:a16="http://schemas.microsoft.com/office/drawing/2014/main" id="{2A3BE500-B15B-4CF7-990A-ED1E3FC9C6F6}"/>
+              </a:ext>
+            </a:extLst>
+          </p:cNvPr>
+          <p:cNvPicPr>
+            <a:picLocks noChangeAspect="1"/>
+          </p:cNvPicPr>
+          <p:nvPr/>
+        </p:nvPicPr>
+        <p:blipFill>
+          <a:blip r:embed="rId2">
+            <a:extLst>
+              <a:ext uri="{28A0092B-C50C-407E-A947-70E740481C1C}">
+                <a14:useLocalDpi xmlns:a14="http://schemas.microsoft.com/office/drawing/2010/main" val="0"/>
+              </a:ext>
+            </a:extLst>
+          </a:blip>
+          <a:stretch>
+            <a:fillRect/>
+          </a:stretch>
+        </p:blipFill>
+        <p:spPr>
+          <a:xfrm>
+            <a:off x="8786258" y="446568"/>
+            <a:ext cx="2640198" cy="686451"/>
+          </a:xfrm>
+          <a:prstGeom prst="rect">
+            <a:avLst/>
+          </a:prstGeom>
+        </p:spPr>
+      </p:pic>
     </p:spTree>
     <p:extLst>
       <p:ext uri="{BB962C8B-B14F-4D97-AF65-F5344CB8AC3E}">
@@ -6567,42 +7753,6 @@
           <a:chExt cx="0" cy="0"/>
         </a:xfrm>
       </p:grpSpPr>
-      <p:pic>
-        <p:nvPicPr>
-          <p:cNvPr id="4" name="Image 3">
-            <a:extLst>
-              <a:ext uri="{FF2B5EF4-FFF2-40B4-BE49-F238E27FC236}">
-                <a16:creationId xmlns:a16="http://schemas.microsoft.com/office/drawing/2014/main" id="{B88B342E-9C17-493A-B067-A50AA81093E6}"/>
-              </a:ext>
-            </a:extLst>
-          </p:cNvPr>
-          <p:cNvPicPr>
-            <a:picLocks noChangeAspect="1"/>
-          </p:cNvPicPr>
-          <p:nvPr/>
-        </p:nvPicPr>
-        <p:blipFill>
-          <a:blip r:embed="rId2">
-            <a:extLst>
-              <a:ext uri="{28A0092B-C50C-407E-A947-70E740481C1C}">
-                <a14:useLocalDpi xmlns:a14="http://schemas.microsoft.com/office/drawing/2010/main" val="0"/>
-              </a:ext>
-            </a:extLst>
-          </a:blip>
-          <a:stretch>
-            <a:fillRect/>
-          </a:stretch>
-        </p:blipFill>
-        <p:spPr>
-          <a:xfrm>
-            <a:off x="9567333" y="-4120"/>
-            <a:ext cx="2624667" cy="686451"/>
-          </a:xfrm>
-          <a:prstGeom prst="rect">
-            <a:avLst/>
-          </a:prstGeom>
-        </p:spPr>
-      </p:pic>
       <p:sp>
         <p:nvSpPr>
           <p:cNvPr id="6" name="ZoneTexte 5">
@@ -6642,10 +7792,270 @@
       </p:sp>
       <p:sp>
         <p:nvSpPr>
-          <p:cNvPr id="10" name="Ellipse 9">
-            <a:extLst>
-              <a:ext uri="{FF2B5EF4-FFF2-40B4-BE49-F238E27FC236}">
-                <a16:creationId xmlns:a16="http://schemas.microsoft.com/office/drawing/2014/main" id="{3EAC4868-0EE5-44ED-92CB-65673674ABEC}"/>
+          <p:cNvPr id="11" name="ZoneTexte 10">
+            <a:extLst>
+              <a:ext uri="{FF2B5EF4-FFF2-40B4-BE49-F238E27FC236}">
+                <a16:creationId xmlns:a16="http://schemas.microsoft.com/office/drawing/2014/main" id="{29549137-4BCB-4BE4-9DDA-267CD579C587}"/>
+              </a:ext>
+            </a:extLst>
+          </p:cNvPr>
+          <p:cNvSpPr txBox="1"/>
+          <p:nvPr/>
+        </p:nvSpPr>
+        <p:spPr>
+          <a:xfrm>
+            <a:off x="5063341" y="2717224"/>
+            <a:ext cx="2626918" cy="1754326"/>
+          </a:xfrm>
+          <a:prstGeom prst="rect">
+            <a:avLst/>
+          </a:prstGeom>
+          <a:noFill/>
+        </p:spPr>
+        <p:txBody>
+          <a:bodyPr wrap="square" rtlCol="0">
+            <a:spAutoFit/>
+          </a:bodyPr>
+          <a:lstStyle/>
+          <a:p>
+            <a:pPr marL="285750" indent="-285750">
+              <a:buFont typeface="Arial" panose="020B0604020202020204" pitchFamily="34" charset="0"/>
+              <a:buChar char="•"/>
+            </a:pPr>
+            <a:r>
+              <a:rPr lang="fr-FR" dirty="0">
+                <a:latin typeface="Nunito Sans" panose="00000500000000000000" pitchFamily="2" charset="0"/>
+              </a:rPr>
+              <a:t>Intégration des articles</a:t>
+            </a:r>
+          </a:p>
+          <a:p>
+            <a:pPr marL="285750" indent="-285750">
+              <a:buFont typeface="Arial" panose="020B0604020202020204" pitchFamily="34" charset="0"/>
+              <a:buChar char="•"/>
+            </a:pPr>
+            <a:r>
+              <a:rPr lang="fr-FR" dirty="0">
+                <a:latin typeface="Nunito Sans" panose="00000500000000000000" pitchFamily="2" charset="0"/>
+              </a:rPr>
+              <a:t>Réflexions autour des zoning et wireframe</a:t>
+            </a:r>
+          </a:p>
+          <a:p>
+            <a:endParaRPr lang="fr-FR" dirty="0">
+              <a:latin typeface="Nunito Sans" panose="00000500000000000000" pitchFamily="2" charset="0"/>
+            </a:endParaRPr>
+          </a:p>
+        </p:txBody>
+      </p:sp>
+      <p:sp>
+        <p:nvSpPr>
+          <p:cNvPr id="12" name="ZoneTexte 11">
+            <a:extLst>
+              <a:ext uri="{FF2B5EF4-FFF2-40B4-BE49-F238E27FC236}">
+                <a16:creationId xmlns:a16="http://schemas.microsoft.com/office/drawing/2014/main" id="{E9CB8387-16D2-4096-A1D3-0A12F01C1C2D}"/>
+              </a:ext>
+            </a:extLst>
+          </p:cNvPr>
+          <p:cNvSpPr txBox="1"/>
+          <p:nvPr/>
+        </p:nvSpPr>
+        <p:spPr>
+          <a:xfrm>
+            <a:off x="952174" y="2133949"/>
+            <a:ext cx="3394443" cy="2031325"/>
+          </a:xfrm>
+          <a:prstGeom prst="rect">
+            <a:avLst/>
+          </a:prstGeom>
+          <a:noFill/>
+        </p:spPr>
+        <p:txBody>
+          <a:bodyPr wrap="square" rtlCol="0">
+            <a:spAutoFit/>
+          </a:bodyPr>
+          <a:lstStyle/>
+          <a:p>
+            <a:pPr marL="285750" indent="-285750">
+              <a:buFont typeface="Arial" panose="020B0604020202020204" pitchFamily="34" charset="0"/>
+              <a:buChar char="•"/>
+            </a:pPr>
+            <a:r>
+              <a:rPr lang="fr-FR" dirty="0">
+                <a:latin typeface="Nunito Sans" panose="00000500000000000000" pitchFamily="2" charset="0"/>
+              </a:rPr>
+              <a:t>Mise en place du style.css</a:t>
+            </a:r>
+          </a:p>
+          <a:p>
+            <a:pPr marL="285750" indent="-285750">
+              <a:buFont typeface="Arial" panose="020B0604020202020204" pitchFamily="34" charset="0"/>
+              <a:buChar char="•"/>
+            </a:pPr>
+            <a:r>
+              <a:rPr lang="fr-FR" dirty="0">
+                <a:latin typeface="Nunito Sans" panose="00000500000000000000" pitchFamily="2" charset="0"/>
+              </a:rPr>
+              <a:t>Relecture des articles</a:t>
+            </a:r>
+          </a:p>
+          <a:p>
+            <a:pPr marL="285750" indent="-285750">
+              <a:buFont typeface="Arial" panose="020B0604020202020204" pitchFamily="34" charset="0"/>
+              <a:buChar char="•"/>
+            </a:pPr>
+            <a:r>
+              <a:rPr lang="fr-FR" dirty="0">
+                <a:latin typeface="Nunito Sans" panose="00000500000000000000" pitchFamily="2" charset="0"/>
+              </a:rPr>
+              <a:t>Conception du logo</a:t>
+            </a:r>
+          </a:p>
+          <a:p>
+            <a:pPr marL="285750" indent="-285750">
+              <a:buFont typeface="Arial" panose="020B0604020202020204" pitchFamily="34" charset="0"/>
+              <a:buChar char="•"/>
+            </a:pPr>
+            <a:r>
+              <a:rPr lang="fr-FR" dirty="0">
+                <a:latin typeface="Nunito Sans" panose="00000500000000000000" pitchFamily="2" charset="0"/>
+              </a:rPr>
+              <a:t>Réalisations des zoning</a:t>
+            </a:r>
+          </a:p>
+          <a:p>
+            <a:pPr marL="285750" indent="-285750">
+              <a:buFont typeface="Arial" panose="020B0604020202020204" pitchFamily="34" charset="0"/>
+              <a:buChar char="•"/>
+            </a:pPr>
+            <a:r>
+              <a:rPr lang="fr-FR" dirty="0">
+                <a:latin typeface="Nunito Sans" panose="00000500000000000000" pitchFamily="2" charset="0"/>
+              </a:rPr>
+              <a:t>Réalisations des wireframe</a:t>
+            </a:r>
+          </a:p>
+          <a:p>
+            <a:pPr marL="285750" indent="-285750">
+              <a:buFont typeface="Arial" panose="020B0604020202020204" pitchFamily="34" charset="0"/>
+              <a:buChar char="•"/>
+            </a:pPr>
+            <a:r>
+              <a:rPr lang="fr-FR" dirty="0">
+                <a:latin typeface="Nunito Sans" panose="00000500000000000000" pitchFamily="2" charset="0"/>
+              </a:rPr>
+              <a:t>Réalisations des maquettes</a:t>
+            </a:r>
+          </a:p>
+          <a:p>
+            <a:pPr marL="285750" indent="-285750">
+              <a:buFont typeface="Arial" panose="020B0604020202020204" pitchFamily="34" charset="0"/>
+              <a:buChar char="•"/>
+            </a:pPr>
+            <a:r>
+              <a:rPr lang="fr-FR" dirty="0">
+                <a:latin typeface="Nunito Sans" panose="00000500000000000000" pitchFamily="2" charset="0"/>
+              </a:rPr>
+              <a:t>Conception du responsive</a:t>
+            </a:r>
+          </a:p>
+        </p:txBody>
+      </p:sp>
+      <p:sp>
+        <p:nvSpPr>
+          <p:cNvPr id="13" name="ZoneTexte 12">
+            <a:extLst>
+              <a:ext uri="{FF2B5EF4-FFF2-40B4-BE49-F238E27FC236}">
+                <a16:creationId xmlns:a16="http://schemas.microsoft.com/office/drawing/2014/main" id="{E3546C05-8A73-4C44-881B-E1273B516E56}"/>
+              </a:ext>
+            </a:extLst>
+          </p:cNvPr>
+          <p:cNvSpPr txBox="1"/>
+          <p:nvPr/>
+        </p:nvSpPr>
+        <p:spPr>
+          <a:xfrm>
+            <a:off x="7695756" y="2135449"/>
+            <a:ext cx="4024963" cy="2308324"/>
+          </a:xfrm>
+          <a:prstGeom prst="rect">
+            <a:avLst/>
+          </a:prstGeom>
+          <a:noFill/>
+        </p:spPr>
+        <p:txBody>
+          <a:bodyPr wrap="square" rtlCol="0">
+            <a:spAutoFit/>
+          </a:bodyPr>
+          <a:lstStyle/>
+          <a:p>
+            <a:pPr marL="285750" indent="-285750">
+              <a:buFont typeface="Arial" panose="020B0604020202020204" pitchFamily="34" charset="0"/>
+              <a:buChar char="•"/>
+            </a:pPr>
+            <a:r>
+              <a:rPr lang="fr-FR" dirty="0">
+                <a:latin typeface="Nunito Sans" panose="00000500000000000000" pitchFamily="2" charset="0"/>
+              </a:rPr>
+              <a:t>Rédaction du dossier de conception</a:t>
+            </a:r>
+          </a:p>
+          <a:p>
+            <a:pPr marL="285750" indent="-285750">
+              <a:buFont typeface="Arial" panose="020B0604020202020204" pitchFamily="34" charset="0"/>
+              <a:buChar char="•"/>
+            </a:pPr>
+            <a:r>
+              <a:rPr lang="fr-FR" dirty="0">
+                <a:latin typeface="Nunito Sans" panose="00000500000000000000" pitchFamily="2" charset="0"/>
+              </a:rPr>
+              <a:t>Rédaction des pages ‘’à propos’’, ‘’contact’’ et ‘’mentions légales’’</a:t>
+            </a:r>
+          </a:p>
+          <a:p>
+            <a:pPr marL="285750" indent="-285750">
+              <a:buFont typeface="Arial" panose="020B0604020202020204" pitchFamily="34" charset="0"/>
+              <a:buChar char="•"/>
+            </a:pPr>
+            <a:r>
+              <a:rPr lang="fr-FR" dirty="0">
+                <a:latin typeface="Nunito Sans" panose="00000500000000000000" pitchFamily="2" charset="0"/>
+              </a:rPr>
+              <a:t>Rédaction du sitemap.xml</a:t>
+            </a:r>
+          </a:p>
+          <a:p>
+            <a:pPr marL="285750" indent="-285750">
+              <a:buFont typeface="Arial" panose="020B0604020202020204" pitchFamily="34" charset="0"/>
+              <a:buChar char="•"/>
+            </a:pPr>
+            <a:r>
+              <a:rPr lang="fr-FR" dirty="0">
+                <a:latin typeface="Nunito Sans" panose="00000500000000000000" pitchFamily="2" charset="0"/>
+              </a:rPr>
+              <a:t>Dessin des visuels des rubriques</a:t>
+            </a:r>
+          </a:p>
+          <a:p>
+            <a:pPr marL="285750" indent="-285750">
+              <a:buFont typeface="Arial" panose="020B0604020202020204" pitchFamily="34" charset="0"/>
+              <a:buChar char="•"/>
+            </a:pPr>
+            <a:r>
+              <a:rPr lang="fr-FR" dirty="0">
+                <a:latin typeface="Nunito Sans" panose="00000500000000000000" pitchFamily="2" charset="0"/>
+              </a:rPr>
+              <a:t>Organisation du repository sur GitHub</a:t>
+            </a:r>
+          </a:p>
+        </p:txBody>
+      </p:sp>
+      <p:sp>
+        <p:nvSpPr>
+          <p:cNvPr id="14" name="Ellipse 13">
+            <a:extLst>
+              <a:ext uri="{FF2B5EF4-FFF2-40B4-BE49-F238E27FC236}">
+                <a16:creationId xmlns:a16="http://schemas.microsoft.com/office/drawing/2014/main" id="{DFF6BC69-14B0-485B-8BB6-FF5A38CF0E95}"/>
               </a:ext>
             </a:extLst>
           </p:cNvPr>
@@ -6654,8 +8064,8 @@
         </p:nvSpPr>
         <p:spPr>
           <a:xfrm>
-            <a:off x="4154875" y="652317"/>
-            <a:ext cx="7164695" cy="6108127"/>
+            <a:off x="423119" y="682331"/>
+            <a:ext cx="7164695" cy="6078113"/>
           </a:xfrm>
           <a:prstGeom prst="ellipse">
             <a:avLst/>
@@ -6694,10 +8104,10 @@
       </p:sp>
       <p:sp>
         <p:nvSpPr>
-          <p:cNvPr id="11" name="ZoneTexte 10">
-            <a:extLst>
-              <a:ext uri="{FF2B5EF4-FFF2-40B4-BE49-F238E27FC236}">
-                <a16:creationId xmlns:a16="http://schemas.microsoft.com/office/drawing/2014/main" id="{29549137-4BCB-4BE4-9DDA-267CD579C587}"/>
+          <p:cNvPr id="15" name="ZoneTexte 14">
+            <a:extLst>
+              <a:ext uri="{FF2B5EF4-FFF2-40B4-BE49-F238E27FC236}">
+                <a16:creationId xmlns:a16="http://schemas.microsoft.com/office/drawing/2014/main" id="{0BE129DD-D479-42ED-B633-881C37F8BA1F}"/>
               </a:ext>
             </a:extLst>
           </p:cNvPr>
@@ -6706,8 +8116,8 @@
         </p:nvSpPr>
         <p:spPr>
           <a:xfrm>
-            <a:off x="4686961" y="2413337"/>
-            <a:ext cx="2626918" cy="1754326"/>
+            <a:off x="2183022" y="1327773"/>
+            <a:ext cx="3394443" cy="369332"/>
           </a:xfrm>
           <a:prstGeom prst="rect">
             <a:avLst/>
@@ -6720,30 +8130,64 @@
           </a:bodyPr>
           <a:lstStyle/>
           <a:p>
-            <a:pPr marL="285750" indent="-285750">
-              <a:buFont typeface="Arial" panose="020B0604020202020204" pitchFamily="34" charset="0"/>
-              <a:buChar char="•"/>
-            </a:pPr>
             <a:r>
               <a:rPr lang="fr-FR" dirty="0">
                 <a:latin typeface="Nunito Sans" panose="00000500000000000000" pitchFamily="2" charset="0"/>
               </a:rPr>
-              <a:t>Intégration des articles</a:t>
-            </a:r>
-          </a:p>
-          <a:p>
-            <a:pPr marL="285750" indent="-285750">
-              <a:buFont typeface="Arial" panose="020B0604020202020204" pitchFamily="34" charset="0"/>
-              <a:buChar char="•"/>
-            </a:pPr>
+              <a:t>Luc </a:t>
+            </a:r>
+            <a:r>
+              <a:rPr lang="fr-FR" dirty="0" err="1">
+                <a:latin typeface="Nunito Sans" panose="00000500000000000000" pitchFamily="2" charset="0"/>
+              </a:rPr>
+              <a:t>Leneuf</a:t>
+            </a:r>
+            <a:endParaRPr lang="fr-FR" dirty="0">
+              <a:latin typeface="Nunito Sans" panose="00000500000000000000" pitchFamily="2" charset="0"/>
+            </a:endParaRPr>
+          </a:p>
+        </p:txBody>
+      </p:sp>
+      <p:sp>
+        <p:nvSpPr>
+          <p:cNvPr id="17" name="ZoneTexte 16">
+            <a:extLst>
+              <a:ext uri="{FF2B5EF4-FFF2-40B4-BE49-F238E27FC236}">
+                <a16:creationId xmlns:a16="http://schemas.microsoft.com/office/drawing/2014/main" id="{FF96A14E-8A09-4A6D-99BD-EAC270AADC49}"/>
+              </a:ext>
+            </a:extLst>
+          </p:cNvPr>
+          <p:cNvSpPr txBox="1"/>
+          <p:nvPr/>
+        </p:nvSpPr>
+        <p:spPr>
+          <a:xfrm>
+            <a:off x="7051777" y="1327773"/>
+            <a:ext cx="3394443" cy="369332"/>
+          </a:xfrm>
+          <a:prstGeom prst="rect">
+            <a:avLst/>
+          </a:prstGeom>
+          <a:noFill/>
+        </p:spPr>
+        <p:txBody>
+          <a:bodyPr wrap="square" rtlCol="0">
+            <a:spAutoFit/>
+          </a:bodyPr>
+          <a:lstStyle/>
+          <a:p>
             <a:r>
               <a:rPr lang="fr-FR" dirty="0">
                 <a:latin typeface="Nunito Sans" panose="00000500000000000000" pitchFamily="2" charset="0"/>
               </a:rPr>
-              <a:t>Réflexions autour des zoning et wireframe</a:t>
-            </a:r>
-          </a:p>
-          <a:p>
+              <a:t>Nicolas </a:t>
+            </a:r>
+            <a:r>
+              <a:rPr lang="fr-FR" dirty="0" err="1">
+                <a:latin typeface="Nunito Sans" panose="00000500000000000000" pitchFamily="2" charset="0"/>
+              </a:rPr>
+              <a:t>Maës</a:t>
+            </a:r>
             <a:endParaRPr lang="fr-FR" dirty="0">
               <a:latin typeface="Nunito Sans" panose="00000500000000000000" pitchFamily="2" charset="0"/>
             </a:endParaRPr>
@@ -6752,224 +8196,10 @@
       </p:sp>
       <p:sp>
         <p:nvSpPr>
-          <p:cNvPr id="12" name="ZoneTexte 11">
-            <a:extLst>
-              <a:ext uri="{FF2B5EF4-FFF2-40B4-BE49-F238E27FC236}">
-                <a16:creationId xmlns:a16="http://schemas.microsoft.com/office/drawing/2014/main" id="{E9CB8387-16D2-4096-A1D3-0A12F01C1C2D}"/>
-              </a:ext>
-            </a:extLst>
-          </p:cNvPr>
-          <p:cNvSpPr txBox="1"/>
-          <p:nvPr/>
-        </p:nvSpPr>
-        <p:spPr>
-          <a:xfrm>
-            <a:off x="760432" y="2413337"/>
-            <a:ext cx="3394443" cy="2031325"/>
-          </a:xfrm>
-          <a:prstGeom prst="rect">
-            <a:avLst/>
-          </a:prstGeom>
-          <a:noFill/>
-        </p:spPr>
-        <p:txBody>
-          <a:bodyPr wrap="square" rtlCol="0">
-            <a:spAutoFit/>
-          </a:bodyPr>
-          <a:lstStyle/>
-          <a:p>
-            <a:pPr marL="285750" indent="-285750">
-              <a:buFont typeface="Arial" panose="020B0604020202020204" pitchFamily="34" charset="0"/>
-              <a:buChar char="•"/>
-            </a:pPr>
-            <a:r>
-              <a:rPr lang="fr-FR" dirty="0">
-                <a:latin typeface="Nunito Sans" panose="00000500000000000000" pitchFamily="2" charset="0"/>
-              </a:rPr>
-              <a:t>Mise en place du style.css</a:t>
-            </a:r>
-          </a:p>
-          <a:p>
-            <a:pPr marL="285750" indent="-285750">
-              <a:buFont typeface="Arial" panose="020B0604020202020204" pitchFamily="34" charset="0"/>
-              <a:buChar char="•"/>
-            </a:pPr>
-            <a:r>
-              <a:rPr lang="fr-FR" dirty="0">
-                <a:latin typeface="Nunito Sans" panose="00000500000000000000" pitchFamily="2" charset="0"/>
-              </a:rPr>
-              <a:t>Relecture des articles</a:t>
-            </a:r>
-          </a:p>
-          <a:p>
-            <a:pPr marL="285750" indent="-285750">
-              <a:buFont typeface="Arial" panose="020B0604020202020204" pitchFamily="34" charset="0"/>
-              <a:buChar char="•"/>
-            </a:pPr>
-            <a:r>
-              <a:rPr lang="fr-FR" dirty="0">
-                <a:latin typeface="Nunito Sans" panose="00000500000000000000" pitchFamily="2" charset="0"/>
-              </a:rPr>
-              <a:t>Conception du logo</a:t>
-            </a:r>
-          </a:p>
-          <a:p>
-            <a:pPr marL="285750" indent="-285750">
-              <a:buFont typeface="Arial" panose="020B0604020202020204" pitchFamily="34" charset="0"/>
-              <a:buChar char="•"/>
-            </a:pPr>
-            <a:r>
-              <a:rPr lang="fr-FR" dirty="0">
-                <a:latin typeface="Nunito Sans" panose="00000500000000000000" pitchFamily="2" charset="0"/>
-              </a:rPr>
-              <a:t>Réalisations des zoning</a:t>
-            </a:r>
-          </a:p>
-          <a:p>
-            <a:pPr marL="285750" indent="-285750">
-              <a:buFont typeface="Arial" panose="020B0604020202020204" pitchFamily="34" charset="0"/>
-              <a:buChar char="•"/>
-            </a:pPr>
-            <a:r>
-              <a:rPr lang="fr-FR" dirty="0">
-                <a:latin typeface="Nunito Sans" panose="00000500000000000000" pitchFamily="2" charset="0"/>
-              </a:rPr>
-              <a:t>Réalisations des wireframe</a:t>
-            </a:r>
-          </a:p>
-          <a:p>
-            <a:pPr marL="285750" indent="-285750">
-              <a:buFont typeface="Arial" panose="020B0604020202020204" pitchFamily="34" charset="0"/>
-              <a:buChar char="•"/>
-            </a:pPr>
-            <a:r>
-              <a:rPr lang="fr-FR" dirty="0">
-                <a:latin typeface="Nunito Sans" panose="00000500000000000000" pitchFamily="2" charset="0"/>
-              </a:rPr>
-              <a:t>Réalisations des maquettes</a:t>
-            </a:r>
-          </a:p>
-          <a:p>
-            <a:pPr marL="285750" indent="-285750">
-              <a:buFont typeface="Arial" panose="020B0604020202020204" pitchFamily="34" charset="0"/>
-              <a:buChar char="•"/>
-            </a:pPr>
-            <a:r>
-              <a:rPr lang="fr-FR" dirty="0">
-                <a:latin typeface="Nunito Sans" panose="00000500000000000000" pitchFamily="2" charset="0"/>
-              </a:rPr>
-              <a:t>Conception du responsive</a:t>
-            </a:r>
-          </a:p>
-        </p:txBody>
-      </p:sp>
-      <p:sp>
-        <p:nvSpPr>
-          <p:cNvPr id="13" name="ZoneTexte 12">
-            <a:extLst>
-              <a:ext uri="{FF2B5EF4-FFF2-40B4-BE49-F238E27FC236}">
-                <a16:creationId xmlns:a16="http://schemas.microsoft.com/office/drawing/2014/main" id="{E3546C05-8A73-4C44-881B-E1273B516E56}"/>
-              </a:ext>
-            </a:extLst>
-          </p:cNvPr>
-          <p:cNvSpPr txBox="1"/>
-          <p:nvPr/>
-        </p:nvSpPr>
-        <p:spPr>
-          <a:xfrm>
-            <a:off x="7549318" y="2413337"/>
-            <a:ext cx="4024963" cy="2585323"/>
-          </a:xfrm>
-          <a:prstGeom prst="rect">
-            <a:avLst/>
-          </a:prstGeom>
-          <a:noFill/>
-        </p:spPr>
-        <p:txBody>
-          <a:bodyPr wrap="square" rtlCol="0">
-            <a:spAutoFit/>
-          </a:bodyPr>
-          <a:lstStyle/>
-          <a:p>
-            <a:pPr marL="285750" indent="-285750">
-              <a:buFont typeface="Arial" panose="020B0604020202020204" pitchFamily="34" charset="0"/>
-              <a:buChar char="•"/>
-            </a:pPr>
-            <a:r>
-              <a:rPr lang="fr-FR" dirty="0">
-                <a:latin typeface="Nunito Sans" panose="00000500000000000000" pitchFamily="2" charset="0"/>
-              </a:rPr>
-              <a:t>Rédaction du dossier de conception</a:t>
-            </a:r>
-          </a:p>
-          <a:p>
-            <a:pPr marL="285750" indent="-285750">
-              <a:buFont typeface="Arial" panose="020B0604020202020204" pitchFamily="34" charset="0"/>
-              <a:buChar char="•"/>
-            </a:pPr>
-            <a:r>
-              <a:rPr lang="fr-FR" dirty="0">
-                <a:latin typeface="Nunito Sans" panose="00000500000000000000" pitchFamily="2" charset="0"/>
-              </a:rPr>
-              <a:t>Rédaction des pages ‘’à propos’’, ‘’contact’’ et ‘’mentions légales’’</a:t>
-            </a:r>
-          </a:p>
-          <a:p>
-            <a:pPr marL="285750" indent="-285750">
-              <a:buFont typeface="Arial" panose="020B0604020202020204" pitchFamily="34" charset="0"/>
-              <a:buChar char="•"/>
-            </a:pPr>
-            <a:r>
-              <a:rPr lang="fr-FR" dirty="0">
-                <a:latin typeface="Nunito Sans" panose="00000500000000000000" pitchFamily="2" charset="0"/>
-              </a:rPr>
-              <a:t>Rédaction du sitemap.xml</a:t>
-            </a:r>
-          </a:p>
-          <a:p>
-            <a:pPr marL="285750" indent="-285750">
-              <a:buFont typeface="Arial" panose="020B0604020202020204" pitchFamily="34" charset="0"/>
-              <a:buChar char="•"/>
-            </a:pPr>
-            <a:r>
-              <a:rPr lang="fr-FR" dirty="0">
-                <a:latin typeface="Nunito Sans" panose="00000500000000000000" pitchFamily="2" charset="0"/>
-              </a:rPr>
-              <a:t>Rédaction du robot.txt</a:t>
-            </a:r>
-          </a:p>
-          <a:p>
-            <a:pPr marL="285750" indent="-285750">
-              <a:buFont typeface="Arial" panose="020B0604020202020204" pitchFamily="34" charset="0"/>
-              <a:buChar char="•"/>
-            </a:pPr>
-            <a:r>
-              <a:rPr lang="fr-FR" dirty="0">
-                <a:latin typeface="Nunito Sans" panose="00000500000000000000" pitchFamily="2" charset="0"/>
-              </a:rPr>
-              <a:t>Dessin des visuels des rubriques</a:t>
-            </a:r>
-          </a:p>
-          <a:p>
-            <a:pPr marL="285750" indent="-285750">
-              <a:buFont typeface="Arial" panose="020B0604020202020204" pitchFamily="34" charset="0"/>
-              <a:buChar char="•"/>
-            </a:pPr>
-            <a:r>
-              <a:rPr lang="fr-FR" dirty="0">
-                <a:latin typeface="Nunito Sans" panose="00000500000000000000" pitchFamily="2" charset="0"/>
-              </a:rPr>
-              <a:t>Organisation du repository sur GitHub</a:t>
-            </a:r>
-          </a:p>
-        </p:txBody>
-      </p:sp>
-      <p:sp>
-        <p:nvSpPr>
-          <p:cNvPr id="14" name="Ellipse 13">
-            <a:extLst>
-              <a:ext uri="{FF2B5EF4-FFF2-40B4-BE49-F238E27FC236}">
-                <a16:creationId xmlns:a16="http://schemas.microsoft.com/office/drawing/2014/main" id="{DFF6BC69-14B0-485B-8BB6-FF5A38CF0E95}"/>
+          <p:cNvPr id="18" name="Ellipse 17">
+            <a:extLst>
+              <a:ext uri="{FF2B5EF4-FFF2-40B4-BE49-F238E27FC236}">
+                <a16:creationId xmlns:a16="http://schemas.microsoft.com/office/drawing/2014/main" id="{BB2331A9-34A4-4DCE-92F1-12FB73A6DA02}"/>
               </a:ext>
             </a:extLst>
           </p:cNvPr>
@@ -6978,7 +8208,7 @@
         </p:nvSpPr>
         <p:spPr>
           <a:xfrm>
-            <a:off x="297897" y="682331"/>
+            <a:off x="4686961" y="555331"/>
             <a:ext cx="7164695" cy="6078113"/>
           </a:xfrm>
           <a:prstGeom prst="ellipse">
@@ -7016,98 +8246,42 @@
           </a:p>
         </p:txBody>
       </p:sp>
-      <p:sp>
-        <p:nvSpPr>
-          <p:cNvPr id="15" name="ZoneTexte 14">
-            <a:extLst>
-              <a:ext uri="{FF2B5EF4-FFF2-40B4-BE49-F238E27FC236}">
-                <a16:creationId xmlns:a16="http://schemas.microsoft.com/office/drawing/2014/main" id="{0BE129DD-D479-42ED-B633-881C37F8BA1F}"/>
-              </a:ext>
-            </a:extLst>
-          </p:cNvPr>
-          <p:cNvSpPr txBox="1"/>
-          <p:nvPr/>
-        </p:nvSpPr>
-        <p:spPr>
-          <a:xfrm>
-            <a:off x="2183022" y="1327773"/>
-            <a:ext cx="3394443" cy="369332"/>
+      <p:pic>
+        <p:nvPicPr>
+          <p:cNvPr id="19" name="Image 18">
+            <a:extLst>
+              <a:ext uri="{FF2B5EF4-FFF2-40B4-BE49-F238E27FC236}">
+                <a16:creationId xmlns:a16="http://schemas.microsoft.com/office/drawing/2014/main" id="{55F00574-B3B9-4C8E-B1C9-F9980F3B71D5}"/>
+              </a:ext>
+            </a:extLst>
+          </p:cNvPr>
+          <p:cNvPicPr>
+            <a:picLocks noChangeAspect="1"/>
+          </p:cNvPicPr>
+          <p:nvPr/>
+        </p:nvPicPr>
+        <p:blipFill>
+          <a:blip r:embed="rId2">
+            <a:extLst>
+              <a:ext uri="{28A0092B-C50C-407E-A947-70E740481C1C}">
+                <a14:useLocalDpi xmlns:a14="http://schemas.microsoft.com/office/drawing/2010/main" val="0"/>
+              </a:ext>
+            </a:extLst>
+          </a:blip>
+          <a:stretch>
+            <a:fillRect/>
+          </a:stretch>
+        </p:blipFill>
+        <p:spPr>
+          <a:xfrm>
+            <a:off x="8786258" y="446568"/>
+            <a:ext cx="2640198" cy="686451"/>
           </a:xfrm>
           <a:prstGeom prst="rect">
             <a:avLst/>
           </a:prstGeom>
-          <a:noFill/>
-        </p:spPr>
-        <p:txBody>
-          <a:bodyPr wrap="square" rtlCol="0">
-            <a:spAutoFit/>
-          </a:bodyPr>
-          <a:lstStyle/>
-          <a:p>
-            <a:r>
-              <a:rPr lang="fr-FR" dirty="0">
-                <a:latin typeface="Nunito Sans" panose="00000500000000000000" pitchFamily="2" charset="0"/>
-              </a:rPr>
-              <a:t>Luc </a:t>
-            </a:r>
-            <a:r>
-              <a:rPr lang="fr-FR" dirty="0" err="1">
-                <a:latin typeface="Nunito Sans" panose="00000500000000000000" pitchFamily="2" charset="0"/>
-              </a:rPr>
-              <a:t>Leneuf</a:t>
-            </a:r>
-            <a:endParaRPr lang="fr-FR" dirty="0">
-              <a:latin typeface="Nunito Sans" panose="00000500000000000000" pitchFamily="2" charset="0"/>
-            </a:endParaRPr>
-          </a:p>
-        </p:txBody>
-      </p:sp>
-      <p:sp>
-        <p:nvSpPr>
-          <p:cNvPr id="17" name="ZoneTexte 16">
-            <a:extLst>
-              <a:ext uri="{FF2B5EF4-FFF2-40B4-BE49-F238E27FC236}">
-                <a16:creationId xmlns:a16="http://schemas.microsoft.com/office/drawing/2014/main" id="{FF96A14E-8A09-4A6D-99BD-EAC270AADC49}"/>
-              </a:ext>
-            </a:extLst>
-          </p:cNvPr>
-          <p:cNvSpPr txBox="1"/>
-          <p:nvPr/>
-        </p:nvSpPr>
-        <p:spPr>
-          <a:xfrm>
-            <a:off x="7026377" y="1327773"/>
-            <a:ext cx="3394443" cy="369332"/>
-          </a:xfrm>
-          <a:prstGeom prst="rect">
-            <a:avLst/>
-          </a:prstGeom>
-          <a:noFill/>
-        </p:spPr>
-        <p:txBody>
-          <a:bodyPr wrap="square" rtlCol="0">
-            <a:spAutoFit/>
-          </a:bodyPr>
-          <a:lstStyle/>
-          <a:p>
-            <a:r>
-              <a:rPr lang="fr-FR" dirty="0">
-                <a:latin typeface="Nunito Sans" panose="00000500000000000000" pitchFamily="2" charset="0"/>
-              </a:rPr>
-              <a:t>Nicolas </a:t>
-            </a:r>
-            <a:r>
-              <a:rPr lang="fr-FR" dirty="0" err="1">
-                <a:latin typeface="Nunito Sans" panose="00000500000000000000" pitchFamily="2" charset="0"/>
-              </a:rPr>
-              <a:t>Maës</a:t>
-            </a:r>
-            <a:endParaRPr lang="fr-FR" dirty="0">
-              <a:latin typeface="Nunito Sans" panose="00000500000000000000" pitchFamily="2" charset="0"/>
-            </a:endParaRPr>
-          </a:p>
-        </p:txBody>
-      </p:sp>
+        </p:spPr>
+      </p:pic>
     </p:spTree>
     <p:extLst>
       <p:ext uri="{BB962C8B-B14F-4D97-AF65-F5344CB8AC3E}">
@@ -7138,67 +8312,31 @@
           <a:chExt cx="0" cy="0"/>
         </a:xfrm>
       </p:grpSpPr>
-      <p:pic>
-        <p:nvPicPr>
-          <p:cNvPr id="49" name="Image 48">
-            <a:extLst>
-              <a:ext uri="{FF2B5EF4-FFF2-40B4-BE49-F238E27FC236}">
-                <a16:creationId xmlns:a16="http://schemas.microsoft.com/office/drawing/2014/main" id="{095AA012-5584-4589-B5BD-6185592E4D3E}"/>
-              </a:ext>
-            </a:extLst>
-          </p:cNvPr>
-          <p:cNvPicPr>
-            <a:picLocks noChangeAspect="1"/>
-          </p:cNvPicPr>
-          <p:nvPr/>
-        </p:nvPicPr>
-        <p:blipFill>
-          <a:blip r:embed="rId2">
-            <a:extLst>
-              <a:ext uri="{28A0092B-C50C-407E-A947-70E740481C1C}">
-                <a14:useLocalDpi xmlns:a14="http://schemas.microsoft.com/office/drawing/2010/main" val="0"/>
-              </a:ext>
-            </a:extLst>
-          </a:blip>
-          <a:stretch>
-            <a:fillRect/>
-          </a:stretch>
-        </p:blipFill>
-        <p:spPr>
-          <a:xfrm>
-            <a:off x="9567333" y="-4120"/>
-            <a:ext cx="2624667" cy="686451"/>
+      <p:sp>
+        <p:nvSpPr>
+          <p:cNvPr id="4" name="Rectangle 3">
+            <a:extLst>
+              <a:ext uri="{FF2B5EF4-FFF2-40B4-BE49-F238E27FC236}">
+                <a16:creationId xmlns:a16="http://schemas.microsoft.com/office/drawing/2014/main" id="{F34AAAE9-79A1-4C82-B2B0-3E836B400F29}"/>
+              </a:ext>
+            </a:extLst>
+          </p:cNvPr>
+          <p:cNvSpPr/>
+          <p:nvPr/>
+        </p:nvSpPr>
+        <p:spPr>
+          <a:xfrm>
+            <a:off x="0" y="652317"/>
+            <a:ext cx="12188844" cy="6254212"/>
           </a:xfrm>
           <a:prstGeom prst="rect">
             <a:avLst/>
           </a:prstGeom>
-        </p:spPr>
-      </p:pic>
-      <p:sp>
-        <p:nvSpPr>
-          <p:cNvPr id="3" name="Rectangle 2">
-            <a:extLst>
-              <a:ext uri="{FF2B5EF4-FFF2-40B4-BE49-F238E27FC236}">
-                <a16:creationId xmlns:a16="http://schemas.microsoft.com/office/drawing/2014/main" id="{0176022A-89EC-4566-9AA8-A0BFDC24DEFE}"/>
-              </a:ext>
-            </a:extLst>
-          </p:cNvPr>
-          <p:cNvSpPr/>
-          <p:nvPr/>
-        </p:nvSpPr>
-        <p:spPr>
-          <a:xfrm>
-            <a:off x="424070" y="1338468"/>
-            <a:ext cx="3419061" cy="5300869"/>
-          </a:xfrm>
-          <a:prstGeom prst="rect">
-            <a:avLst/>
-          </a:prstGeom>
-          <a:noFill/>
+          <a:solidFill>
+            <a:srgbClr val="D1D1D1"/>
+          </a:solidFill>
           <a:ln>
-            <a:solidFill>
-              <a:srgbClr val="60D8E5"/>
-            </a:solidFill>
+            <a:noFill/>
           </a:ln>
         </p:spPr>
         <p:style>
@@ -7222,16 +8360,16 @@
           <a:lstStyle/>
           <a:p>
             <a:pPr algn="ctr"/>
-            <a:endParaRPr lang="fr-FR"/>
-          </a:p>
-        </p:txBody>
-      </p:sp>
-      <p:sp>
-        <p:nvSpPr>
-          <p:cNvPr id="52" name="Rectangle 51">
-            <a:extLst>
-              <a:ext uri="{FF2B5EF4-FFF2-40B4-BE49-F238E27FC236}">
-                <a16:creationId xmlns:a16="http://schemas.microsoft.com/office/drawing/2014/main" id="{F4219553-3EF8-4F77-906D-D140ECDCA0AC}"/>
+            <a:endParaRPr lang="fr-FR" dirty="0"/>
+          </a:p>
+        </p:txBody>
+      </p:sp>
+      <p:sp>
+        <p:nvSpPr>
+          <p:cNvPr id="3" name="Rectangle 2">
+            <a:extLst>
+              <a:ext uri="{FF2B5EF4-FFF2-40B4-BE49-F238E27FC236}">
+                <a16:creationId xmlns:a16="http://schemas.microsoft.com/office/drawing/2014/main" id="{0176022A-89EC-4566-9AA8-A0BFDC24DEFE}"/>
               </a:ext>
             </a:extLst>
           </p:cNvPr>
@@ -7240,17 +8378,17 @@
         </p:nvSpPr>
         <p:spPr>
           <a:xfrm>
-            <a:off x="4386469" y="1338468"/>
+            <a:off x="424070" y="1338468"/>
             <a:ext cx="3419061" cy="5300869"/>
           </a:xfrm>
           <a:prstGeom prst="rect">
             <a:avLst/>
           </a:prstGeom>
-          <a:noFill/>
+          <a:solidFill>
+            <a:schemeClr val="bg1"/>
+          </a:solidFill>
           <a:ln>
-            <a:solidFill>
-              <a:schemeClr val="tx1"/>
-            </a:solidFill>
+            <a:noFill/>
           </a:ln>
         </p:spPr>
         <p:style>
@@ -7280,10 +8418,10 @@
       </p:sp>
       <p:sp>
         <p:nvSpPr>
-          <p:cNvPr id="53" name="Rectangle 52">
-            <a:extLst>
-              <a:ext uri="{FF2B5EF4-FFF2-40B4-BE49-F238E27FC236}">
-                <a16:creationId xmlns:a16="http://schemas.microsoft.com/office/drawing/2014/main" id="{E0BC3746-8CA3-44C7-9C76-7E1E5C1A10F2}"/>
+          <p:cNvPr id="52" name="Rectangle 51">
+            <a:extLst>
+              <a:ext uri="{FF2B5EF4-FFF2-40B4-BE49-F238E27FC236}">
+                <a16:creationId xmlns:a16="http://schemas.microsoft.com/office/drawing/2014/main" id="{F4219553-3EF8-4F77-906D-D140ECDCA0AC}"/>
               </a:ext>
             </a:extLst>
           </p:cNvPr>
@@ -7292,17 +8430,17 @@
         </p:nvSpPr>
         <p:spPr>
           <a:xfrm>
-            <a:off x="8348869" y="1338468"/>
+            <a:off x="4386469" y="1338468"/>
             <a:ext cx="3419061" cy="5300869"/>
           </a:xfrm>
           <a:prstGeom prst="rect">
             <a:avLst/>
           </a:prstGeom>
-          <a:noFill/>
+          <a:solidFill>
+            <a:schemeClr val="bg1"/>
+          </a:solidFill>
           <a:ln>
-            <a:solidFill>
-              <a:schemeClr val="tx1"/>
-            </a:solidFill>
+            <a:noFill/>
           </a:ln>
         </p:spPr>
         <p:style>
@@ -7332,10 +8470,10 @@
       </p:sp>
       <p:sp>
         <p:nvSpPr>
-          <p:cNvPr id="55" name="Rectangle 54">
-            <a:extLst>
-              <a:ext uri="{FF2B5EF4-FFF2-40B4-BE49-F238E27FC236}">
-                <a16:creationId xmlns:a16="http://schemas.microsoft.com/office/drawing/2014/main" id="{E53BC51B-B7F5-40B0-9E8A-1439F5F58E42}"/>
+          <p:cNvPr id="53" name="Rectangle 52">
+            <a:extLst>
+              <a:ext uri="{FF2B5EF4-FFF2-40B4-BE49-F238E27FC236}">
+                <a16:creationId xmlns:a16="http://schemas.microsoft.com/office/drawing/2014/main" id="{E0BC3746-8CA3-44C7-9C76-7E1E5C1A10F2}"/>
               </a:ext>
             </a:extLst>
           </p:cNvPr>
@@ -7344,14 +8482,14 @@
         </p:nvSpPr>
         <p:spPr>
           <a:xfrm>
-            <a:off x="695738" y="1557132"/>
-            <a:ext cx="2869097" cy="3372678"/>
+            <a:off x="8348869" y="1338468"/>
+            <a:ext cx="3419061" cy="5300869"/>
           </a:xfrm>
           <a:prstGeom prst="rect">
             <a:avLst/>
           </a:prstGeom>
           <a:solidFill>
-            <a:srgbClr val="60D8E5"/>
+            <a:schemeClr val="bg1"/>
           </a:solidFill>
           <a:ln>
             <a:noFill/>
@@ -7384,10 +8522,10 @@
       </p:sp>
       <p:sp>
         <p:nvSpPr>
-          <p:cNvPr id="56" name="Rectangle 55">
-            <a:extLst>
-              <a:ext uri="{FF2B5EF4-FFF2-40B4-BE49-F238E27FC236}">
-                <a16:creationId xmlns:a16="http://schemas.microsoft.com/office/drawing/2014/main" id="{36549CD0-44F1-40A8-9476-EE331D0E4475}"/>
+          <p:cNvPr id="55" name="Rectangle 54">
+            <a:extLst>
+              <a:ext uri="{FF2B5EF4-FFF2-40B4-BE49-F238E27FC236}">
+                <a16:creationId xmlns:a16="http://schemas.microsoft.com/office/drawing/2014/main" id="{E53BC51B-B7F5-40B0-9E8A-1439F5F58E42}"/>
               </a:ext>
             </a:extLst>
           </p:cNvPr>
@@ -7396,17 +8534,17 @@
         </p:nvSpPr>
         <p:spPr>
           <a:xfrm>
-            <a:off x="8623850" y="1557132"/>
+            <a:off x="695738" y="1557132"/>
             <a:ext cx="2869097" cy="3372678"/>
           </a:xfrm>
           <a:prstGeom prst="rect">
             <a:avLst/>
           </a:prstGeom>
-          <a:noFill/>
+          <a:solidFill>
+            <a:srgbClr val="60D8E5"/>
+          </a:solidFill>
           <a:ln>
-            <a:solidFill>
-              <a:schemeClr val="tx1"/>
-            </a:solidFill>
+            <a:noFill/>
           </a:ln>
         </p:spPr>
         <p:style>
@@ -7436,10 +8574,10 @@
       </p:sp>
       <p:sp>
         <p:nvSpPr>
-          <p:cNvPr id="58" name="Rectangle 57">
-            <a:extLst>
-              <a:ext uri="{FF2B5EF4-FFF2-40B4-BE49-F238E27FC236}">
-                <a16:creationId xmlns:a16="http://schemas.microsoft.com/office/drawing/2014/main" id="{18F54FB1-C328-4445-B4B8-AE121AC446C0}"/>
+          <p:cNvPr id="56" name="Rectangle 55">
+            <a:extLst>
+              <a:ext uri="{FF2B5EF4-FFF2-40B4-BE49-F238E27FC236}">
+                <a16:creationId xmlns:a16="http://schemas.microsoft.com/office/drawing/2014/main" id="{36549CD0-44F1-40A8-9476-EE331D0E4475}"/>
               </a:ext>
             </a:extLst>
           </p:cNvPr>
@@ -7448,7 +8586,7 @@
         </p:nvSpPr>
         <p:spPr>
           <a:xfrm>
-            <a:off x="4661450" y="1557132"/>
+            <a:off x="8623850" y="1557132"/>
             <a:ext cx="2869097" cy="3372678"/>
           </a:xfrm>
           <a:prstGeom prst="rect">
@@ -7488,6 +8626,58 @@
       </p:sp>
       <p:sp>
         <p:nvSpPr>
+          <p:cNvPr id="58" name="Rectangle 57">
+            <a:extLst>
+              <a:ext uri="{FF2B5EF4-FFF2-40B4-BE49-F238E27FC236}">
+                <a16:creationId xmlns:a16="http://schemas.microsoft.com/office/drawing/2014/main" id="{18F54FB1-C328-4445-B4B8-AE121AC446C0}"/>
+              </a:ext>
+            </a:extLst>
+          </p:cNvPr>
+          <p:cNvSpPr/>
+          <p:nvPr/>
+        </p:nvSpPr>
+        <p:spPr>
+          <a:xfrm>
+            <a:off x="4661450" y="1557132"/>
+            <a:ext cx="2869097" cy="3372678"/>
+          </a:xfrm>
+          <a:prstGeom prst="rect">
+            <a:avLst/>
+          </a:prstGeom>
+          <a:noFill/>
+          <a:ln>
+            <a:solidFill>
+              <a:schemeClr val="tx1"/>
+            </a:solidFill>
+          </a:ln>
+        </p:spPr>
+        <p:style>
+          <a:lnRef idx="2">
+            <a:schemeClr val="accent1">
+              <a:shade val="50000"/>
+            </a:schemeClr>
+          </a:lnRef>
+          <a:fillRef idx="1">
+            <a:schemeClr val="accent1"/>
+          </a:fillRef>
+          <a:effectRef idx="0">
+            <a:schemeClr val="accent1"/>
+          </a:effectRef>
+          <a:fontRef idx="minor">
+            <a:schemeClr val="lt1"/>
+          </a:fontRef>
+        </p:style>
+        <p:txBody>
+          <a:bodyPr rtlCol="0" anchor="ctr"/>
+          <a:lstStyle/>
+          <a:p>
+            <a:pPr algn="ctr"/>
+            <a:endParaRPr lang="fr-FR"/>
+          </a:p>
+        </p:txBody>
+      </p:sp>
+      <p:sp>
+        <p:nvSpPr>
           <p:cNvPr id="59" name="ZoneTexte 58">
             <a:extLst>
               <a:ext uri="{FF2B5EF4-FFF2-40B4-BE49-F238E27FC236}">
@@ -7506,7 +8696,9 @@
           <a:prstGeom prst="rect">
             <a:avLst/>
           </a:prstGeom>
-          <a:noFill/>
+          <a:solidFill>
+            <a:schemeClr val="bg1"/>
+          </a:solidFill>
         </p:spPr>
         <p:txBody>
           <a:bodyPr wrap="square" rtlCol="0">
@@ -7577,6 +8769,42 @@
           </a:p>
         </p:txBody>
       </p:sp>
+      <p:pic>
+        <p:nvPicPr>
+          <p:cNvPr id="14" name="Image 13">
+            <a:extLst>
+              <a:ext uri="{FF2B5EF4-FFF2-40B4-BE49-F238E27FC236}">
+                <a16:creationId xmlns:a16="http://schemas.microsoft.com/office/drawing/2014/main" id="{C413A142-9DCF-4AD5-852C-191A5E16ED85}"/>
+              </a:ext>
+            </a:extLst>
+          </p:cNvPr>
+          <p:cNvPicPr>
+            <a:picLocks noChangeAspect="1"/>
+          </p:cNvPicPr>
+          <p:nvPr/>
+        </p:nvPicPr>
+        <p:blipFill>
+          <a:blip r:embed="rId2">
+            <a:extLst>
+              <a:ext uri="{28A0092B-C50C-407E-A947-70E740481C1C}">
+                <a14:useLocalDpi xmlns:a14="http://schemas.microsoft.com/office/drawing/2010/main" val="0"/>
+              </a:ext>
+            </a:extLst>
+          </a:blip>
+          <a:stretch>
+            <a:fillRect/>
+          </a:stretch>
+        </p:blipFill>
+        <p:spPr>
+          <a:xfrm>
+            <a:off x="8786258" y="446568"/>
+            <a:ext cx="2640198" cy="686451"/>
+          </a:xfrm>
+          <a:prstGeom prst="rect">
+            <a:avLst/>
+          </a:prstGeom>
+        </p:spPr>
+      </p:pic>
     </p:spTree>
     <p:extLst>
       <p:ext uri="{BB962C8B-B14F-4D97-AF65-F5344CB8AC3E}">
@@ -7607,12 +8835,168 @@
           <a:chExt cx="0" cy="0"/>
         </a:xfrm>
       </p:grpSpPr>
+      <p:sp>
+        <p:nvSpPr>
+          <p:cNvPr id="59" name="ZoneTexte 58">
+            <a:extLst>
+              <a:ext uri="{FF2B5EF4-FFF2-40B4-BE49-F238E27FC236}">
+                <a16:creationId xmlns:a16="http://schemas.microsoft.com/office/drawing/2014/main" id="{B8B4C23B-5AE8-4936-905F-2A0EC5568E70}"/>
+              </a:ext>
+            </a:extLst>
+          </p:cNvPr>
+          <p:cNvSpPr txBox="1"/>
+          <p:nvPr/>
+        </p:nvSpPr>
+        <p:spPr>
+          <a:xfrm>
+            <a:off x="77948" y="67542"/>
+            <a:ext cx="3394444" cy="584775"/>
+          </a:xfrm>
+          <a:prstGeom prst="rect">
+            <a:avLst/>
+          </a:prstGeom>
+          <a:noFill/>
+        </p:spPr>
+        <p:txBody>
+          <a:bodyPr wrap="square" rtlCol="0">
+            <a:spAutoFit/>
+          </a:bodyPr>
+          <a:lstStyle/>
+          <a:p>
+            <a:r>
+              <a:rPr lang="fr-FR" sz="3200" dirty="0">
+                <a:latin typeface="Nunito Sans" panose="00000500000000000000" pitchFamily="2" charset="0"/>
+              </a:rPr>
+              <a:t>Police d’écriture</a:t>
+            </a:r>
+          </a:p>
+        </p:txBody>
+      </p:sp>
+      <p:sp>
+        <p:nvSpPr>
+          <p:cNvPr id="2" name="ZoneTexte 1">
+            <a:extLst>
+              <a:ext uri="{FF2B5EF4-FFF2-40B4-BE49-F238E27FC236}">
+                <a16:creationId xmlns:a16="http://schemas.microsoft.com/office/drawing/2014/main" id="{3E649FCF-34D9-4D09-970A-6871F7D18EC1}"/>
+              </a:ext>
+            </a:extLst>
+          </p:cNvPr>
+          <p:cNvSpPr txBox="1"/>
+          <p:nvPr/>
+        </p:nvSpPr>
+        <p:spPr>
+          <a:xfrm>
+            <a:off x="4711700" y="1646245"/>
+            <a:ext cx="2768600" cy="646331"/>
+          </a:xfrm>
+          <a:prstGeom prst="rect">
+            <a:avLst/>
+          </a:prstGeom>
+          <a:noFill/>
+        </p:spPr>
+        <p:txBody>
+          <a:bodyPr wrap="square" rtlCol="0">
+            <a:spAutoFit/>
+          </a:bodyPr>
+          <a:lstStyle/>
+          <a:p>
+            <a:r>
+              <a:rPr lang="fr-FR" sz="3600" b="1" dirty="0" err="1">
+                <a:latin typeface="Nunito Sans" panose="00000500000000000000" pitchFamily="2" charset="0"/>
+              </a:rPr>
+              <a:t>Nunito</a:t>
+            </a:r>
+            <a:r>
+              <a:rPr lang="fr-FR" sz="3600" b="1" dirty="0">
+                <a:latin typeface="Nunito Sans" panose="00000500000000000000" pitchFamily="2" charset="0"/>
+              </a:rPr>
+              <a:t> Sans</a:t>
+            </a:r>
+          </a:p>
+        </p:txBody>
+      </p:sp>
+      <p:sp>
+        <p:nvSpPr>
+          <p:cNvPr id="12" name="ZoneTexte 11">
+            <a:extLst>
+              <a:ext uri="{FF2B5EF4-FFF2-40B4-BE49-F238E27FC236}">
+                <a16:creationId xmlns:a16="http://schemas.microsoft.com/office/drawing/2014/main" id="{8C9D006B-42EF-4731-A26F-79F97E5DB238}"/>
+              </a:ext>
+            </a:extLst>
+          </p:cNvPr>
+          <p:cNvSpPr txBox="1"/>
+          <p:nvPr/>
+        </p:nvSpPr>
+        <p:spPr>
+          <a:xfrm>
+            <a:off x="1742546" y="2903431"/>
+            <a:ext cx="8706908" cy="2308324"/>
+          </a:xfrm>
+          <a:prstGeom prst="rect">
+            <a:avLst/>
+          </a:prstGeom>
+          <a:noFill/>
+        </p:spPr>
+        <p:txBody>
+          <a:bodyPr wrap="square" rtlCol="0">
+            <a:spAutoFit/>
+          </a:bodyPr>
+          <a:lstStyle/>
+          <a:p>
+            <a:r>
+              <a:rPr lang="fr-FR" sz="3600" dirty="0" err="1">
+                <a:latin typeface="Nunito Sans" panose="00000500000000000000" pitchFamily="2" charset="0"/>
+              </a:rPr>
+              <a:t>abcdefghijklmnopqrstuvwxyz</a:t>
+            </a:r>
+            <a:endParaRPr lang="fr-FR" sz="3600" dirty="0">
+              <a:latin typeface="Nunito Sans" panose="00000500000000000000" pitchFamily="2" charset="0"/>
+            </a:endParaRPr>
+          </a:p>
+          <a:p>
+            <a:r>
+              <a:rPr lang="fr-FR" sz="3600" dirty="0">
+                <a:latin typeface="Nunito Sans" panose="00000500000000000000" pitchFamily="2" charset="0"/>
+              </a:rPr>
+              <a:t>ABCDEFGHIJKLMNOPQRSTUVWSYX</a:t>
+            </a:r>
+          </a:p>
+          <a:p>
+            <a:r>
+              <a:rPr lang="fr-FR" sz="3600" dirty="0">
+                <a:latin typeface="Nunito Sans" panose="00000500000000000000" pitchFamily="2" charset="0"/>
+              </a:rPr>
+              <a:t>123456789</a:t>
+            </a:r>
+          </a:p>
+          <a:p>
+            <a:r>
+              <a:rPr lang="fr-FR" sz="3600" dirty="0">
+                <a:latin typeface="Nunito Sans" panose="00000500000000000000" pitchFamily="2" charset="0"/>
+              </a:rPr>
+              <a:t>« !?()</a:t>
+            </a:r>
+            <a:r>
+              <a:rPr lang="fr-FR" sz="3600" dirty="0" err="1">
+                <a:latin typeface="Nunito Sans" panose="00000500000000000000" pitchFamily="2" charset="0"/>
+              </a:rPr>
+              <a:t>àçéù</a:t>
+            </a:r>
+            <a:r>
+              <a:rPr lang="fr-FR" sz="3600" dirty="0">
+                <a:latin typeface="Nunito Sans" panose="00000500000000000000" pitchFamily="2" charset="0"/>
+              </a:rPr>
+              <a:t>#»</a:t>
+            </a:r>
+          </a:p>
+        </p:txBody>
+      </p:sp>
       <p:pic>
         <p:nvPicPr>
-          <p:cNvPr id="49" name="Image 48">
-            <a:extLst>
-              <a:ext uri="{FF2B5EF4-FFF2-40B4-BE49-F238E27FC236}">
-                <a16:creationId xmlns:a16="http://schemas.microsoft.com/office/drawing/2014/main" id="{095AA012-5584-4589-B5BD-6185592E4D3E}"/>
+          <p:cNvPr id="7" name="Image 6">
+            <a:extLst>
+              <a:ext uri="{FF2B5EF4-FFF2-40B4-BE49-F238E27FC236}">
+                <a16:creationId xmlns:a16="http://schemas.microsoft.com/office/drawing/2014/main" id="{22DF00A0-455E-4DEE-B684-A20E118359CB}"/>
               </a:ext>
             </a:extLst>
           </p:cNvPr>
@@ -7635,174 +9019,14 @@
         </p:blipFill>
         <p:spPr>
           <a:xfrm>
-            <a:off x="9567333" y="-4120"/>
-            <a:ext cx="2624667" cy="686451"/>
+            <a:off x="8786258" y="446568"/>
+            <a:ext cx="2640198" cy="686451"/>
           </a:xfrm>
           <a:prstGeom prst="rect">
             <a:avLst/>
           </a:prstGeom>
         </p:spPr>
       </p:pic>
-      <p:sp>
-        <p:nvSpPr>
-          <p:cNvPr id="59" name="ZoneTexte 58">
-            <a:extLst>
-              <a:ext uri="{FF2B5EF4-FFF2-40B4-BE49-F238E27FC236}">
-                <a16:creationId xmlns:a16="http://schemas.microsoft.com/office/drawing/2014/main" id="{B8B4C23B-5AE8-4936-905F-2A0EC5568E70}"/>
-              </a:ext>
-            </a:extLst>
-          </p:cNvPr>
-          <p:cNvSpPr txBox="1"/>
-          <p:nvPr/>
-        </p:nvSpPr>
-        <p:spPr>
-          <a:xfrm>
-            <a:off x="77948" y="67542"/>
-            <a:ext cx="3394444" cy="584775"/>
-          </a:xfrm>
-          <a:prstGeom prst="rect">
-            <a:avLst/>
-          </a:prstGeom>
-          <a:noFill/>
-        </p:spPr>
-        <p:txBody>
-          <a:bodyPr wrap="square" rtlCol="0">
-            <a:spAutoFit/>
-          </a:bodyPr>
-          <a:lstStyle/>
-          <a:p>
-            <a:r>
-              <a:rPr lang="fr-FR" sz="3200" dirty="0">
-                <a:latin typeface="Nunito Sans" panose="00000500000000000000" pitchFamily="2" charset="0"/>
-              </a:rPr>
-              <a:t>Polices</a:t>
-            </a:r>
-          </a:p>
-        </p:txBody>
-      </p:sp>
-      <p:sp>
-        <p:nvSpPr>
-          <p:cNvPr id="2" name="ZoneTexte 1">
-            <a:extLst>
-              <a:ext uri="{FF2B5EF4-FFF2-40B4-BE49-F238E27FC236}">
-                <a16:creationId xmlns:a16="http://schemas.microsoft.com/office/drawing/2014/main" id="{3E649FCF-34D9-4D09-970A-6871F7D18EC1}"/>
-              </a:ext>
-            </a:extLst>
-          </p:cNvPr>
-          <p:cNvSpPr txBox="1"/>
-          <p:nvPr/>
-        </p:nvSpPr>
-        <p:spPr>
-          <a:xfrm>
-            <a:off x="4711700" y="1646245"/>
-            <a:ext cx="2768600" cy="646331"/>
-          </a:xfrm>
-          <a:prstGeom prst="rect">
-            <a:avLst/>
-          </a:prstGeom>
-          <a:noFill/>
-        </p:spPr>
-        <p:txBody>
-          <a:bodyPr wrap="square" rtlCol="0">
-            <a:spAutoFit/>
-          </a:bodyPr>
-          <a:lstStyle/>
-          <a:p>
-            <a:r>
-              <a:rPr lang="fr-FR" sz="3600" b="1" dirty="0" err="1">
-                <a:latin typeface="Nunito Sans" panose="00000500000000000000" pitchFamily="2" charset="0"/>
-              </a:rPr>
-              <a:t>Nunito</a:t>
-            </a:r>
-            <a:r>
-              <a:rPr lang="fr-FR" sz="3600" b="1" dirty="0">
-                <a:latin typeface="Nunito Sans" panose="00000500000000000000" pitchFamily="2" charset="0"/>
-              </a:rPr>
-              <a:t> Sans</a:t>
-            </a:r>
-          </a:p>
-        </p:txBody>
-      </p:sp>
-      <p:sp>
-        <p:nvSpPr>
-          <p:cNvPr id="12" name="ZoneTexte 11">
-            <a:extLst>
-              <a:ext uri="{FF2B5EF4-FFF2-40B4-BE49-F238E27FC236}">
-                <a16:creationId xmlns:a16="http://schemas.microsoft.com/office/drawing/2014/main" id="{8C9D006B-42EF-4731-A26F-79F97E5DB238}"/>
-              </a:ext>
-            </a:extLst>
-          </p:cNvPr>
-          <p:cNvSpPr txBox="1"/>
-          <p:nvPr/>
-        </p:nvSpPr>
-        <p:spPr>
-          <a:xfrm>
-            <a:off x="1742546" y="3286503"/>
-            <a:ext cx="8706908" cy="2308324"/>
-          </a:xfrm>
-          <a:prstGeom prst="rect">
-            <a:avLst/>
-          </a:prstGeom>
-          <a:noFill/>
-        </p:spPr>
-        <p:txBody>
-          <a:bodyPr wrap="square" rtlCol="0">
-            <a:spAutoFit/>
-          </a:bodyPr>
-          <a:lstStyle/>
-          <a:p>
-            <a:pPr algn="ctr"/>
-            <a:r>
-              <a:rPr lang="fr-FR" sz="3600" dirty="0" err="1">
-                <a:latin typeface="Nunito Sans" panose="00000500000000000000" pitchFamily="2" charset="0"/>
-              </a:rPr>
-              <a:t>abcdefghijklmnopqrstuvwxyz</a:t>
-            </a:r>
-            <a:endParaRPr lang="fr-FR" sz="3600" dirty="0">
-              <a:latin typeface="Nunito Sans" panose="00000500000000000000" pitchFamily="2" charset="0"/>
-            </a:endParaRPr>
-          </a:p>
-          <a:p>
-            <a:pPr algn="ctr"/>
-            <a:r>
-              <a:rPr lang="fr-FR" sz="3600" dirty="0">
-                <a:latin typeface="Nunito Sans" panose="00000500000000000000" pitchFamily="2" charset="0"/>
-              </a:rPr>
-              <a:t>ABCDEFGHIJKLMNOPQRSTUVWSYX</a:t>
-            </a:r>
-          </a:p>
-          <a:p>
-            <a:pPr algn="ctr"/>
-            <a:r>
-              <a:rPr lang="fr-FR" sz="3600" dirty="0">
-                <a:latin typeface="Nunito Sans" panose="00000500000000000000" pitchFamily="2" charset="0"/>
-              </a:rPr>
-              <a:t>123456789</a:t>
-            </a:r>
-          </a:p>
-          <a:p>
-            <a:pPr algn="ctr"/>
-            <a:r>
-              <a:rPr lang="fr-FR" sz="3600" dirty="0">
-                <a:latin typeface="Nunito Sans" panose="00000500000000000000" pitchFamily="2" charset="0"/>
-              </a:rPr>
-              <a:t>« !?()</a:t>
-            </a:r>
-            <a:r>
-              <a:rPr lang="fr-FR" sz="3600" dirty="0" err="1">
-                <a:latin typeface="Nunito Sans" panose="00000500000000000000" pitchFamily="2" charset="0"/>
-              </a:rPr>
-              <a:t>àçéù</a:t>
-            </a:r>
-            <a:r>
-              <a:rPr lang="fr-FR" sz="3600" dirty="0">
-                <a:latin typeface="Nunito Sans" panose="00000500000000000000" pitchFamily="2" charset="0"/>
-              </a:rPr>
-              <a:t>#»</a:t>
-            </a:r>
-          </a:p>
-        </p:txBody>
-      </p:sp>
     </p:spTree>
     <p:extLst>
       <p:ext uri="{BB962C8B-B14F-4D97-AF65-F5344CB8AC3E}">
@@ -7835,10 +9059,10 @@
       </p:grpSpPr>
       <p:pic>
         <p:nvPicPr>
-          <p:cNvPr id="49" name="Image 48">
-            <a:extLst>
-              <a:ext uri="{FF2B5EF4-FFF2-40B4-BE49-F238E27FC236}">
-                <a16:creationId xmlns:a16="http://schemas.microsoft.com/office/drawing/2014/main" id="{095AA012-5584-4589-B5BD-6185592E4D3E}"/>
+          <p:cNvPr id="7" name="Image 6">
+            <a:extLst>
+              <a:ext uri="{FF2B5EF4-FFF2-40B4-BE49-F238E27FC236}">
+                <a16:creationId xmlns:a16="http://schemas.microsoft.com/office/drawing/2014/main" id="{427BDFED-5383-45E6-A1A4-57D9CCCA223D}"/>
               </a:ext>
             </a:extLst>
           </p:cNvPr>
@@ -7861,8 +9085,8 @@
         </p:blipFill>
         <p:spPr>
           <a:xfrm>
-            <a:off x="9567333" y="-4120"/>
-            <a:ext cx="2624667" cy="686451"/>
+            <a:off x="1423813" y="1133019"/>
+            <a:ext cx="8770213" cy="4933245"/>
           </a:xfrm>
           <a:prstGeom prst="rect">
             <a:avLst/>
@@ -7906,10 +9130,46 @@
           </a:p>
         </p:txBody>
       </p:sp>
+      <p:pic>
+        <p:nvPicPr>
+          <p:cNvPr id="6" name="Image 5">
+            <a:extLst>
+              <a:ext uri="{FF2B5EF4-FFF2-40B4-BE49-F238E27FC236}">
+                <a16:creationId xmlns:a16="http://schemas.microsoft.com/office/drawing/2014/main" id="{68D75605-896E-49A0-ABDC-8D2A57D48F62}"/>
+              </a:ext>
+            </a:extLst>
+          </p:cNvPr>
+          <p:cNvPicPr>
+            <a:picLocks noChangeAspect="1"/>
+          </p:cNvPicPr>
+          <p:nvPr/>
+        </p:nvPicPr>
+        <p:blipFill>
+          <a:blip r:embed="rId3">
+            <a:extLst>
+              <a:ext uri="{28A0092B-C50C-407E-A947-70E740481C1C}">
+                <a14:useLocalDpi xmlns:a14="http://schemas.microsoft.com/office/drawing/2010/main" val="0"/>
+              </a:ext>
+            </a:extLst>
+          </a:blip>
+          <a:stretch>
+            <a:fillRect/>
+          </a:stretch>
+        </p:blipFill>
+        <p:spPr>
+          <a:xfrm>
+            <a:off x="8786258" y="446568"/>
+            <a:ext cx="2640198" cy="686451"/>
+          </a:xfrm>
+          <a:prstGeom prst="rect">
+            <a:avLst/>
+          </a:prstGeom>
+        </p:spPr>
+      </p:pic>
     </p:spTree>
     <p:extLst>
       <p:ext uri="{BB962C8B-B14F-4D97-AF65-F5344CB8AC3E}">
-        <p14:creationId xmlns:p14="http://schemas.microsoft.com/office/powerpoint/2010/main" val="2306348081"/>
+        <p14:creationId xmlns:p14="http://schemas.microsoft.com/office/powerpoint/2010/main" val="2643586712"/>
       </p:ext>
     </p:extLst>
   </p:cSld>
@@ -7936,12 +9196,49 @@
           <a:chExt cx="0" cy="0"/>
         </a:xfrm>
       </p:grpSpPr>
+      <p:sp>
+        <p:nvSpPr>
+          <p:cNvPr id="9" name="ZoneTexte 8">
+            <a:extLst>
+              <a:ext uri="{FF2B5EF4-FFF2-40B4-BE49-F238E27FC236}">
+                <a16:creationId xmlns:a16="http://schemas.microsoft.com/office/drawing/2014/main" id="{29E704EF-0DC2-4823-97A3-6694FCC299FE}"/>
+              </a:ext>
+            </a:extLst>
+          </p:cNvPr>
+          <p:cNvSpPr txBox="1"/>
+          <p:nvPr/>
+        </p:nvSpPr>
+        <p:spPr>
+          <a:xfrm>
+            <a:off x="77948" y="67542"/>
+            <a:ext cx="3394444" cy="584775"/>
+          </a:xfrm>
+          <a:prstGeom prst="rect">
+            <a:avLst/>
+          </a:prstGeom>
+          <a:noFill/>
+        </p:spPr>
+        <p:txBody>
+          <a:bodyPr wrap="square" rtlCol="0">
+            <a:spAutoFit/>
+          </a:bodyPr>
+          <a:lstStyle/>
+          <a:p>
+            <a:r>
+              <a:rPr lang="fr-FR" sz="3200" dirty="0">
+                <a:latin typeface="Nunito Sans" panose="00000500000000000000" pitchFamily="2" charset="0"/>
+              </a:rPr>
+              <a:t>Zoning</a:t>
+            </a:r>
+          </a:p>
+        </p:txBody>
+      </p:sp>
       <p:pic>
         <p:nvPicPr>
-          <p:cNvPr id="49" name="Image 48">
-            <a:extLst>
-              <a:ext uri="{FF2B5EF4-FFF2-40B4-BE49-F238E27FC236}">
-                <a16:creationId xmlns:a16="http://schemas.microsoft.com/office/drawing/2014/main" id="{095AA012-5584-4589-B5BD-6185592E4D3E}"/>
+          <p:cNvPr id="3" name="Image 2">
+            <a:extLst>
+              <a:ext uri="{FF2B5EF4-FFF2-40B4-BE49-F238E27FC236}">
+                <a16:creationId xmlns:a16="http://schemas.microsoft.com/office/drawing/2014/main" id="{83F54D46-3981-4EF5-B5C3-2F1E703A14D0}"/>
               </a:ext>
             </a:extLst>
           </p:cNvPr>
@@ -7964,55 +9261,54 @@
         </p:blipFill>
         <p:spPr>
           <a:xfrm>
-            <a:off x="9567333" y="-4120"/>
-            <a:ext cx="2624667" cy="686451"/>
+            <a:off x="2550412" y="508496"/>
+            <a:ext cx="6041608" cy="5841008"/>
           </a:xfrm>
           <a:prstGeom prst="rect">
             <a:avLst/>
           </a:prstGeom>
         </p:spPr>
       </p:pic>
-      <p:sp>
-        <p:nvSpPr>
-          <p:cNvPr id="9" name="ZoneTexte 8">
-            <a:extLst>
-              <a:ext uri="{FF2B5EF4-FFF2-40B4-BE49-F238E27FC236}">
-                <a16:creationId xmlns:a16="http://schemas.microsoft.com/office/drawing/2014/main" id="{29E704EF-0DC2-4823-97A3-6694FCC299FE}"/>
-              </a:ext>
-            </a:extLst>
-          </p:cNvPr>
-          <p:cNvSpPr txBox="1"/>
-          <p:nvPr/>
-        </p:nvSpPr>
-        <p:spPr>
-          <a:xfrm>
-            <a:off x="77948" y="67542"/>
-            <a:ext cx="3394444" cy="584775"/>
+      <p:pic>
+        <p:nvPicPr>
+          <p:cNvPr id="6" name="Image 5">
+            <a:extLst>
+              <a:ext uri="{FF2B5EF4-FFF2-40B4-BE49-F238E27FC236}">
+                <a16:creationId xmlns:a16="http://schemas.microsoft.com/office/drawing/2014/main" id="{DF70DFA1-47B4-4CB0-87EC-15B3BE5F14CD}"/>
+              </a:ext>
+            </a:extLst>
+          </p:cNvPr>
+          <p:cNvPicPr>
+            <a:picLocks noChangeAspect="1"/>
+          </p:cNvPicPr>
+          <p:nvPr/>
+        </p:nvPicPr>
+        <p:blipFill>
+          <a:blip r:embed="rId3">
+            <a:extLst>
+              <a:ext uri="{28A0092B-C50C-407E-A947-70E740481C1C}">
+                <a14:useLocalDpi xmlns:a14="http://schemas.microsoft.com/office/drawing/2010/main" val="0"/>
+              </a:ext>
+            </a:extLst>
+          </a:blip>
+          <a:stretch>
+            <a:fillRect/>
+          </a:stretch>
+        </p:blipFill>
+        <p:spPr>
+          <a:xfrm>
+            <a:off x="8719610" y="508496"/>
+            <a:ext cx="2640198" cy="686451"/>
           </a:xfrm>
           <a:prstGeom prst="rect">
             <a:avLst/>
           </a:prstGeom>
-          <a:noFill/>
-        </p:spPr>
-        <p:txBody>
-          <a:bodyPr wrap="square" rtlCol="0">
-            <a:spAutoFit/>
-          </a:bodyPr>
-          <a:lstStyle/>
-          <a:p>
-            <a:r>
-              <a:rPr lang="fr-FR" sz="3200" dirty="0">
-                <a:latin typeface="Nunito Sans" panose="00000500000000000000" pitchFamily="2" charset="0"/>
-              </a:rPr>
-              <a:t>Wireframe</a:t>
-            </a:r>
-          </a:p>
-        </p:txBody>
-      </p:sp>
+        </p:spPr>
+      </p:pic>
     </p:spTree>
     <p:extLst>
       <p:ext uri="{BB962C8B-B14F-4D97-AF65-F5344CB8AC3E}">
-        <p14:creationId xmlns:p14="http://schemas.microsoft.com/office/powerpoint/2010/main" val="2673464143"/>
+        <p14:creationId xmlns:p14="http://schemas.microsoft.com/office/powerpoint/2010/main" val="4063405821"/>
       </p:ext>
     </p:extLst>
   </p:cSld>

</xml_diff>